<commit_message>
Update DBA Best Practices with DMVs.pptx
</commit_message>
<xml_diff>
--- a/GroupBy Conference 2019/DBA Best Practices with DMVs.pptx
+++ b/GroupBy Conference 2019/DBA Best Practices with DMVs.pptx
@@ -8,10 +8,10 @@
     <p:sldMasterId id="2147483748" r:id="rId4"/>
   </p:sldMasterIdLst>
   <p:notesMasterIdLst>
-    <p:notesMasterId r:id="rId92"/>
+    <p:notesMasterId r:id="rId94"/>
   </p:notesMasterIdLst>
   <p:handoutMasterIdLst>
-    <p:handoutMasterId r:id="rId93"/>
+    <p:handoutMasterId r:id="rId95"/>
   </p:handoutMasterIdLst>
   <p:sldIdLst>
     <p:sldId id="259" r:id="rId5"/>
@@ -84,23 +84,25 @@
     <p:sldId id="280" r:id="rId72"/>
     <p:sldId id="307" r:id="rId73"/>
     <p:sldId id="301" r:id="rId74"/>
-    <p:sldId id="331" r:id="rId75"/>
-    <p:sldId id="334" r:id="rId76"/>
-    <p:sldId id="329" r:id="rId77"/>
-    <p:sldId id="381" r:id="rId78"/>
-    <p:sldId id="370" r:id="rId79"/>
-    <p:sldId id="380" r:id="rId80"/>
-    <p:sldId id="360" r:id="rId81"/>
-    <p:sldId id="371" r:id="rId82"/>
-    <p:sldId id="388" r:id="rId83"/>
-    <p:sldId id="288" r:id="rId84"/>
-    <p:sldId id="260" r:id="rId85"/>
-    <p:sldId id="376" r:id="rId86"/>
-    <p:sldId id="377" r:id="rId87"/>
-    <p:sldId id="378" r:id="rId88"/>
-    <p:sldId id="264" r:id="rId89"/>
-    <p:sldId id="414" r:id="rId90"/>
-    <p:sldId id="413" r:id="rId91"/>
+    <p:sldId id="424" r:id="rId75"/>
+    <p:sldId id="425" r:id="rId76"/>
+    <p:sldId id="331" r:id="rId77"/>
+    <p:sldId id="334" r:id="rId78"/>
+    <p:sldId id="329" r:id="rId79"/>
+    <p:sldId id="381" r:id="rId80"/>
+    <p:sldId id="370" r:id="rId81"/>
+    <p:sldId id="380" r:id="rId82"/>
+    <p:sldId id="360" r:id="rId83"/>
+    <p:sldId id="371" r:id="rId84"/>
+    <p:sldId id="388" r:id="rId85"/>
+    <p:sldId id="288" r:id="rId86"/>
+    <p:sldId id="260" r:id="rId87"/>
+    <p:sldId id="376" r:id="rId88"/>
+    <p:sldId id="377" r:id="rId89"/>
+    <p:sldId id="378" r:id="rId90"/>
+    <p:sldId id="264" r:id="rId91"/>
+    <p:sldId id="414" r:id="rId92"/>
+    <p:sldId id="413" r:id="rId93"/>
   </p:sldIdLst>
   <p:sldSz cx="12192000" cy="6858000"/>
   <p:notesSz cx="6858000" cy="9144000"/>
@@ -235,13 +237,1021 @@
 <file path=ppt/revisionInfo.xml><?xml version="1.0" encoding="utf-8"?>
 <p1510:revInfo xmlns:a="http://schemas.openxmlformats.org/drawingml/2006/main" xmlns:r="http://schemas.openxmlformats.org/officeDocument/2006/relationships" xmlns:p1510="http://schemas.microsoft.com/office/powerpoint/2015/10/main">
   <p1510:revLst>
-    <p1510:client id="{E43EA3F4-5CFF-4A8A-9561-5E0414B33ACD}" v="1005" dt="2019-06-29T15:49:00.993"/>
+    <p1510:client id="{BADA0C79-E504-4993-B00D-9734B7A44D50}" v="20" dt="2019-10-10T17:05:31.412"/>
   </p1510:revLst>
 </p1510:revInfo>
 </file>
 
 <file path=ppt/changesInfos/changesInfo1.xml><?xml version="1.0" encoding="utf-8"?>
 <pc:chgInfo xmlns:a="http://schemas.openxmlformats.org/drawingml/2006/main" xmlns:r="http://schemas.openxmlformats.org/officeDocument/2006/relationships" xmlns:ac="http://schemas.microsoft.com/office/drawing/2013/main/command" xmlns:pc="http://schemas.microsoft.com/office/powerpoint/2013/main/command">
+  <pc:docChgLst>
+    <pc:chgData name="william a" userId="c66c7249b60d4ab2" providerId="LiveId" clId="{E43EA3F4-5CFF-4A8A-9561-5E0414B33ACD}"/>
+    <pc:docChg chg="undo custSel addSld delSld modSld sldOrd">
+      <pc:chgData name="william a" userId="c66c7249b60d4ab2" providerId="LiveId" clId="{E43EA3F4-5CFF-4A8A-9561-5E0414B33ACD}" dt="2019-06-29T15:49:00.993" v="4550"/>
+      <pc:docMkLst>
+        <pc:docMk/>
+      </pc:docMkLst>
+      <pc:sldChg chg="modSp">
+        <pc:chgData name="william a" userId="c66c7249b60d4ab2" providerId="LiveId" clId="{E43EA3F4-5CFF-4A8A-9561-5E0414B33ACD}" dt="2019-06-29T02:37:30.903" v="1692" actId="20577"/>
+        <pc:sldMkLst>
+          <pc:docMk/>
+          <pc:sldMk cId="0" sldId="259"/>
+        </pc:sldMkLst>
+        <pc:spChg chg="mod">
+          <ac:chgData name="william a" userId="c66c7249b60d4ab2" providerId="LiveId" clId="{E43EA3F4-5CFF-4A8A-9561-5E0414B33ACD}" dt="2019-06-29T02:37:30.903" v="1692" actId="20577"/>
+          <ac:spMkLst>
+            <pc:docMk/>
+            <pc:sldMk cId="0" sldId="259"/>
+            <ac:spMk id="5" creationId="{00000000-0000-0000-0000-000000000000}"/>
+          </ac:spMkLst>
+        </pc:spChg>
+      </pc:sldChg>
+      <pc:sldChg chg="modAnim">
+        <pc:chgData name="william a" userId="c66c7249b60d4ab2" providerId="LiveId" clId="{E43EA3F4-5CFF-4A8A-9561-5E0414B33ACD}" dt="2019-06-29T15:49:00.993" v="4550"/>
+        <pc:sldMkLst>
+          <pc:docMk/>
+          <pc:sldMk cId="0" sldId="263"/>
+        </pc:sldMkLst>
+      </pc:sldChg>
+      <pc:sldChg chg="modSp">
+        <pc:chgData name="william a" userId="c66c7249b60d4ab2" providerId="LiveId" clId="{E43EA3F4-5CFF-4A8A-9561-5E0414B33ACD}" dt="2019-06-24T19:42:54.234" v="408" actId="20577"/>
+        <pc:sldMkLst>
+          <pc:docMk/>
+          <pc:sldMk cId="0" sldId="265"/>
+        </pc:sldMkLst>
+        <pc:spChg chg="mod">
+          <ac:chgData name="william a" userId="c66c7249b60d4ab2" providerId="LiveId" clId="{E43EA3F4-5CFF-4A8A-9561-5E0414B33ACD}" dt="2019-06-24T19:42:54.234" v="408" actId="20577"/>
+          <ac:spMkLst>
+            <pc:docMk/>
+            <pc:sldMk cId="0" sldId="265"/>
+            <ac:spMk id="3" creationId="{00000000-0000-0000-0000-000000000000}"/>
+          </ac:spMkLst>
+        </pc:spChg>
+      </pc:sldChg>
+      <pc:sldChg chg="modSp">
+        <pc:chgData name="william a" userId="c66c7249b60d4ab2" providerId="LiveId" clId="{E43EA3F4-5CFF-4A8A-9561-5E0414B33ACD}" dt="2019-06-29T03:38:26.350" v="4505" actId="27636"/>
+        <pc:sldMkLst>
+          <pc:docMk/>
+          <pc:sldMk cId="0" sldId="266"/>
+        </pc:sldMkLst>
+        <pc:spChg chg="mod">
+          <ac:chgData name="william a" userId="c66c7249b60d4ab2" providerId="LiveId" clId="{E43EA3F4-5CFF-4A8A-9561-5E0414B33ACD}" dt="2019-06-29T03:38:26.350" v="4505" actId="27636"/>
+          <ac:spMkLst>
+            <pc:docMk/>
+            <pc:sldMk cId="0" sldId="266"/>
+            <ac:spMk id="3" creationId="{00000000-0000-0000-0000-000000000000}"/>
+          </ac:spMkLst>
+        </pc:spChg>
+      </pc:sldChg>
+      <pc:sldChg chg="modSp">
+        <pc:chgData name="william a" userId="c66c7249b60d4ab2" providerId="LiveId" clId="{E43EA3F4-5CFF-4A8A-9561-5E0414B33ACD}" dt="2019-06-29T03:21:06.142" v="3969" actId="20577"/>
+        <pc:sldMkLst>
+          <pc:docMk/>
+          <pc:sldMk cId="0" sldId="268"/>
+        </pc:sldMkLst>
+        <pc:spChg chg="mod">
+          <ac:chgData name="william a" userId="c66c7249b60d4ab2" providerId="LiveId" clId="{E43EA3F4-5CFF-4A8A-9561-5E0414B33ACD}" dt="2019-06-29T03:21:06.142" v="3969" actId="20577"/>
+          <ac:spMkLst>
+            <pc:docMk/>
+            <pc:sldMk cId="0" sldId="268"/>
+            <ac:spMk id="3" creationId="{00000000-0000-0000-0000-000000000000}"/>
+          </ac:spMkLst>
+        </pc:spChg>
+      </pc:sldChg>
+      <pc:sldChg chg="modSp del">
+        <pc:chgData name="william a" userId="c66c7249b60d4ab2" providerId="LiveId" clId="{E43EA3F4-5CFF-4A8A-9561-5E0414B33ACD}" dt="2019-06-29T02:52:01.794" v="2564" actId="2696"/>
+        <pc:sldMkLst>
+          <pc:docMk/>
+          <pc:sldMk cId="0" sldId="269"/>
+        </pc:sldMkLst>
+        <pc:spChg chg="mod">
+          <ac:chgData name="william a" userId="c66c7249b60d4ab2" providerId="LiveId" clId="{E43EA3F4-5CFF-4A8A-9561-5E0414B33ACD}" dt="2019-06-29T02:51:32.343" v="2541"/>
+          <ac:spMkLst>
+            <pc:docMk/>
+            <pc:sldMk cId="0" sldId="269"/>
+            <ac:spMk id="3" creationId="{00000000-0000-0000-0000-000000000000}"/>
+          </ac:spMkLst>
+        </pc:spChg>
+      </pc:sldChg>
+      <pc:sldChg chg="modSp">
+        <pc:chgData name="william a" userId="c66c7249b60d4ab2" providerId="LiveId" clId="{E43EA3F4-5CFF-4A8A-9561-5E0414B33ACD}" dt="2019-06-29T03:21:46.757" v="4037" actId="20577"/>
+        <pc:sldMkLst>
+          <pc:docMk/>
+          <pc:sldMk cId="0" sldId="270"/>
+        </pc:sldMkLst>
+        <pc:spChg chg="mod">
+          <ac:chgData name="william a" userId="c66c7249b60d4ab2" providerId="LiveId" clId="{E43EA3F4-5CFF-4A8A-9561-5E0414B33ACD}" dt="2019-06-29T03:21:46.757" v="4037" actId="20577"/>
+          <ac:spMkLst>
+            <pc:docMk/>
+            <pc:sldMk cId="0" sldId="270"/>
+            <ac:spMk id="3" creationId="{00000000-0000-0000-0000-000000000000}"/>
+          </ac:spMkLst>
+        </pc:spChg>
+      </pc:sldChg>
+      <pc:sldChg chg="modSp">
+        <pc:chgData name="william a" userId="c66c7249b60d4ab2" providerId="LiveId" clId="{E43EA3F4-5CFF-4A8A-9561-5E0414B33ACD}" dt="2019-06-29T03:22:16.749" v="4066" actId="20577"/>
+        <pc:sldMkLst>
+          <pc:docMk/>
+          <pc:sldMk cId="0" sldId="271"/>
+        </pc:sldMkLst>
+        <pc:spChg chg="mod">
+          <ac:chgData name="william a" userId="c66c7249b60d4ab2" providerId="LiveId" clId="{E43EA3F4-5CFF-4A8A-9561-5E0414B33ACD}" dt="2019-06-29T03:22:16.749" v="4066" actId="20577"/>
+          <ac:spMkLst>
+            <pc:docMk/>
+            <pc:sldMk cId="0" sldId="271"/>
+            <ac:spMk id="3" creationId="{00000000-0000-0000-0000-000000000000}"/>
+          </ac:spMkLst>
+        </pc:spChg>
+      </pc:sldChg>
+      <pc:sldChg chg="modSp">
+        <pc:chgData name="william a" userId="c66c7249b60d4ab2" providerId="LiveId" clId="{E43EA3F4-5CFF-4A8A-9561-5E0414B33ACD}" dt="2019-06-29T03:23:32.499" v="4181" actId="20577"/>
+        <pc:sldMkLst>
+          <pc:docMk/>
+          <pc:sldMk cId="0" sldId="272"/>
+        </pc:sldMkLst>
+        <pc:spChg chg="mod">
+          <ac:chgData name="william a" userId="c66c7249b60d4ab2" providerId="LiveId" clId="{E43EA3F4-5CFF-4A8A-9561-5E0414B33ACD}" dt="2019-06-29T03:23:32.499" v="4181" actId="20577"/>
+          <ac:spMkLst>
+            <pc:docMk/>
+            <pc:sldMk cId="0" sldId="272"/>
+            <ac:spMk id="3" creationId="{00000000-0000-0000-0000-000000000000}"/>
+          </ac:spMkLst>
+        </pc:spChg>
+      </pc:sldChg>
+      <pc:sldChg chg="modSp">
+        <pc:chgData name="william a" userId="c66c7249b60d4ab2" providerId="LiveId" clId="{E43EA3F4-5CFF-4A8A-9561-5E0414B33ACD}" dt="2019-06-24T19:06:32.463" v="0" actId="20577"/>
+        <pc:sldMkLst>
+          <pc:docMk/>
+          <pc:sldMk cId="0" sldId="275"/>
+        </pc:sldMkLst>
+        <pc:spChg chg="mod">
+          <ac:chgData name="william a" userId="c66c7249b60d4ab2" providerId="LiveId" clId="{E43EA3F4-5CFF-4A8A-9561-5E0414B33ACD}" dt="2019-06-24T19:06:32.463" v="0" actId="20577"/>
+          <ac:spMkLst>
+            <pc:docMk/>
+            <pc:sldMk cId="0" sldId="275"/>
+            <ac:spMk id="3" creationId="{00000000-0000-0000-0000-000000000000}"/>
+          </ac:spMkLst>
+        </pc:spChg>
+      </pc:sldChg>
+      <pc:sldChg chg="modSp">
+        <pc:chgData name="william a" userId="c66c7249b60d4ab2" providerId="LiveId" clId="{E43EA3F4-5CFF-4A8A-9561-5E0414B33ACD}" dt="2019-06-24T19:22:06.004" v="117" actId="6549"/>
+        <pc:sldMkLst>
+          <pc:docMk/>
+          <pc:sldMk cId="0" sldId="278"/>
+        </pc:sldMkLst>
+        <pc:spChg chg="mod">
+          <ac:chgData name="william a" userId="c66c7249b60d4ab2" providerId="LiveId" clId="{E43EA3F4-5CFF-4A8A-9561-5E0414B33ACD}" dt="2019-06-24T19:22:06.004" v="117" actId="6549"/>
+          <ac:spMkLst>
+            <pc:docMk/>
+            <pc:sldMk cId="0" sldId="278"/>
+            <ac:spMk id="3" creationId="{00000000-0000-0000-0000-000000000000}"/>
+          </ac:spMkLst>
+        </pc:spChg>
+      </pc:sldChg>
+      <pc:sldChg chg="modSp">
+        <pc:chgData name="william a" userId="c66c7249b60d4ab2" providerId="LiveId" clId="{E43EA3F4-5CFF-4A8A-9561-5E0414B33ACD}" dt="2019-06-29T02:54:33.919" v="2731" actId="20577"/>
+        <pc:sldMkLst>
+          <pc:docMk/>
+          <pc:sldMk cId="0" sldId="279"/>
+        </pc:sldMkLst>
+        <pc:spChg chg="mod">
+          <ac:chgData name="william a" userId="c66c7249b60d4ab2" providerId="LiveId" clId="{E43EA3F4-5CFF-4A8A-9561-5E0414B33ACD}" dt="2019-06-29T02:54:33.919" v="2731" actId="20577"/>
+          <ac:spMkLst>
+            <pc:docMk/>
+            <pc:sldMk cId="0" sldId="279"/>
+            <ac:spMk id="3" creationId="{00000000-0000-0000-0000-000000000000}"/>
+          </ac:spMkLst>
+        </pc:spChg>
+      </pc:sldChg>
+      <pc:sldChg chg="modSp">
+        <pc:chgData name="william a" userId="c66c7249b60d4ab2" providerId="LiveId" clId="{E43EA3F4-5CFF-4A8A-9561-5E0414B33ACD}" dt="2019-06-24T19:42:10.181" v="397" actId="403"/>
+        <pc:sldMkLst>
+          <pc:docMk/>
+          <pc:sldMk cId="0" sldId="280"/>
+        </pc:sldMkLst>
+        <pc:spChg chg="mod">
+          <ac:chgData name="william a" userId="c66c7249b60d4ab2" providerId="LiveId" clId="{E43EA3F4-5CFF-4A8A-9561-5E0414B33ACD}" dt="2019-06-24T19:42:10.181" v="397" actId="403"/>
+          <ac:spMkLst>
+            <pc:docMk/>
+            <pc:sldMk cId="0" sldId="280"/>
+            <ac:spMk id="3" creationId="{00000000-0000-0000-0000-000000000000}"/>
+          </ac:spMkLst>
+        </pc:spChg>
+      </pc:sldChg>
+      <pc:sldChg chg="addSp delSp modSp add del modTransition">
+        <pc:chgData name="william a" userId="c66c7249b60d4ab2" providerId="LiveId" clId="{E43EA3F4-5CFF-4A8A-9561-5E0414B33ACD}" dt="2019-06-24T20:12:54.850" v="1116"/>
+        <pc:sldMkLst>
+          <pc:docMk/>
+          <pc:sldMk cId="3735990624" sldId="285"/>
+        </pc:sldMkLst>
+        <pc:spChg chg="mod">
+          <ac:chgData name="william a" userId="c66c7249b60d4ab2" providerId="LiveId" clId="{E43EA3F4-5CFF-4A8A-9561-5E0414B33ACD}" dt="2019-06-24T20:07:36.897" v="960" actId="20577"/>
+          <ac:spMkLst>
+            <pc:docMk/>
+            <pc:sldMk cId="3735990624" sldId="285"/>
+            <ac:spMk id="2" creationId="{3A456A49-D9F1-4953-8152-0834928543C1}"/>
+          </ac:spMkLst>
+        </pc:spChg>
+        <pc:spChg chg="del ord">
+          <ac:chgData name="william a" userId="c66c7249b60d4ab2" providerId="LiveId" clId="{E43EA3F4-5CFF-4A8A-9561-5E0414B33ACD}" dt="2019-06-24T20:03:09.646" v="735" actId="478"/>
+          <ac:spMkLst>
+            <pc:docMk/>
+            <pc:sldMk cId="3735990624" sldId="285"/>
+            <ac:spMk id="4" creationId="{00000000-0000-0000-0000-000000000000}"/>
+          </ac:spMkLst>
+        </pc:spChg>
+        <pc:spChg chg="add del ord">
+          <ac:chgData name="william a" userId="c66c7249b60d4ab2" providerId="LiveId" clId="{E43EA3F4-5CFF-4A8A-9561-5E0414B33ACD}" dt="2019-06-24T20:02:28.766" v="723"/>
+          <ac:spMkLst>
+            <pc:docMk/>
+            <pc:sldMk cId="3735990624" sldId="285"/>
+            <ac:spMk id="5" creationId="{01E8506E-EEDD-4275-B082-80FB528E1A34}"/>
+          </ac:spMkLst>
+        </pc:spChg>
+        <pc:spChg chg="add del mod">
+          <ac:chgData name="william a" userId="c66c7249b60d4ab2" providerId="LiveId" clId="{E43EA3F4-5CFF-4A8A-9561-5E0414B33ACD}" dt="2019-06-24T20:03:34.537" v="747" actId="478"/>
+          <ac:spMkLst>
+            <pc:docMk/>
+            <pc:sldMk cId="3735990624" sldId="285"/>
+            <ac:spMk id="5" creationId="{3D418325-DEB8-469B-81CB-51A987AD0608}"/>
+          </ac:spMkLst>
+        </pc:spChg>
+        <pc:spChg chg="add del ord">
+          <ac:chgData name="william a" userId="c66c7249b60d4ab2" providerId="LiveId" clId="{E43EA3F4-5CFF-4A8A-9561-5E0414B33ACD}" dt="2019-06-24T20:03:33.640" v="746" actId="478"/>
+          <ac:spMkLst>
+            <pc:docMk/>
+            <pc:sldMk cId="3735990624" sldId="285"/>
+            <ac:spMk id="6" creationId="{09AD0167-1569-4EB7-8D28-11961AE88B25}"/>
+          </ac:spMkLst>
+        </pc:spChg>
+        <pc:spChg chg="add del">
+          <ac:chgData name="william a" userId="c66c7249b60d4ab2" providerId="LiveId" clId="{E43EA3F4-5CFF-4A8A-9561-5E0414B33ACD}" dt="2019-06-24T20:03:31.497" v="745"/>
+          <ac:spMkLst>
+            <pc:docMk/>
+            <pc:sldMk cId="3735990624" sldId="285"/>
+            <ac:spMk id="7" creationId="{17B9027F-896F-4934-8B5E-A8C916DE6601}"/>
+          </ac:spMkLst>
+        </pc:spChg>
+        <pc:spChg chg="add mod">
+          <ac:chgData name="william a" userId="c66c7249b60d4ab2" providerId="LiveId" clId="{E43EA3F4-5CFF-4A8A-9561-5E0414B33ACD}" dt="2019-06-24T20:12:54.850" v="1116"/>
+          <ac:spMkLst>
+            <pc:docMk/>
+            <pc:sldMk cId="3735990624" sldId="285"/>
+            <ac:spMk id="8" creationId="{F09ACA30-36CC-402B-AF9D-A02BACFBC203}"/>
+          </ac:spMkLst>
+        </pc:spChg>
+      </pc:sldChg>
+      <pc:sldChg chg="modTransition">
+        <pc:chgData name="william a" userId="c66c7249b60d4ab2" providerId="LiveId" clId="{E43EA3F4-5CFF-4A8A-9561-5E0414B33ACD}" dt="2019-06-24T20:11:39.824" v="961"/>
+        <pc:sldMkLst>
+          <pc:docMk/>
+          <pc:sldMk cId="0" sldId="289"/>
+        </pc:sldMkLst>
+      </pc:sldChg>
+      <pc:sldChg chg="modSp ord">
+        <pc:chgData name="william a" userId="c66c7249b60d4ab2" providerId="LiveId" clId="{E43EA3F4-5CFF-4A8A-9561-5E0414B33ACD}" dt="2019-06-29T03:31:39.088" v="4349" actId="27636"/>
+        <pc:sldMkLst>
+          <pc:docMk/>
+          <pc:sldMk cId="0" sldId="291"/>
+        </pc:sldMkLst>
+        <pc:spChg chg="mod">
+          <ac:chgData name="william a" userId="c66c7249b60d4ab2" providerId="LiveId" clId="{E43EA3F4-5CFF-4A8A-9561-5E0414B33ACD}" dt="2019-06-29T03:31:39.088" v="4349" actId="27636"/>
+          <ac:spMkLst>
+            <pc:docMk/>
+            <pc:sldMk cId="0" sldId="291"/>
+            <ac:spMk id="3" creationId="{00000000-0000-0000-0000-000000000000}"/>
+          </ac:spMkLst>
+        </pc:spChg>
+      </pc:sldChg>
+      <pc:sldChg chg="delSp modSp">
+        <pc:chgData name="william a" userId="c66c7249b60d4ab2" providerId="LiveId" clId="{E43EA3F4-5CFF-4A8A-9561-5E0414B33ACD}" dt="2019-06-29T03:29:35.800" v="4263" actId="6549"/>
+        <pc:sldMkLst>
+          <pc:docMk/>
+          <pc:sldMk cId="0" sldId="292"/>
+        </pc:sldMkLst>
+        <pc:spChg chg="mod">
+          <ac:chgData name="william a" userId="c66c7249b60d4ab2" providerId="LiveId" clId="{E43EA3F4-5CFF-4A8A-9561-5E0414B33ACD}" dt="2019-06-29T03:29:35.800" v="4263" actId="6549"/>
+          <ac:spMkLst>
+            <pc:docMk/>
+            <pc:sldMk cId="0" sldId="292"/>
+            <ac:spMk id="3" creationId="{00000000-0000-0000-0000-000000000000}"/>
+          </ac:spMkLst>
+        </pc:spChg>
+        <pc:spChg chg="del">
+          <ac:chgData name="william a" userId="c66c7249b60d4ab2" providerId="LiveId" clId="{E43EA3F4-5CFF-4A8A-9561-5E0414B33ACD}" dt="2019-06-24T20:02:35.073" v="727"/>
+          <ac:spMkLst>
+            <pc:docMk/>
+            <pc:sldMk cId="0" sldId="292"/>
+            <ac:spMk id="5" creationId="{5D5E73BF-C273-4462-B680-A0848E61409B}"/>
+          </ac:spMkLst>
+        </pc:spChg>
+      </pc:sldChg>
+      <pc:sldChg chg="addSp modSp modTransition">
+        <pc:chgData name="william a" userId="c66c7249b60d4ab2" providerId="LiveId" clId="{E43EA3F4-5CFF-4A8A-9561-5E0414B33ACD}" dt="2019-06-24T20:12:36.040" v="1094"/>
+        <pc:sldMkLst>
+          <pc:docMk/>
+          <pc:sldMk cId="0" sldId="293"/>
+        </pc:sldMkLst>
+        <pc:spChg chg="add mod">
+          <ac:chgData name="william a" userId="c66c7249b60d4ab2" providerId="LiveId" clId="{E43EA3F4-5CFF-4A8A-9561-5E0414B33ACD}" dt="2019-06-24T19:44:36.348" v="446" actId="1076"/>
+          <ac:spMkLst>
+            <pc:docMk/>
+            <pc:sldMk cId="0" sldId="293"/>
+            <ac:spMk id="3" creationId="{B42A7BDD-03AA-4C4E-8631-4A4395668282}"/>
+          </ac:spMkLst>
+        </pc:spChg>
+        <pc:spChg chg="mod">
+          <ac:chgData name="william a" userId="c66c7249b60d4ab2" providerId="LiveId" clId="{E43EA3F4-5CFF-4A8A-9561-5E0414B33ACD}" dt="2019-06-24T19:44:24.678" v="442" actId="20577"/>
+          <ac:spMkLst>
+            <pc:docMk/>
+            <pc:sldMk cId="0" sldId="293"/>
+            <ac:spMk id="5" creationId="{00000000-0000-0000-0000-000000000000}"/>
+          </ac:spMkLst>
+        </pc:spChg>
+      </pc:sldChg>
+      <pc:sldChg chg="modTransition">
+        <pc:chgData name="william a" userId="c66c7249b60d4ab2" providerId="LiveId" clId="{E43EA3F4-5CFF-4A8A-9561-5E0414B33ACD}" dt="2019-06-29T03:29:58.440" v="4264"/>
+        <pc:sldMkLst>
+          <pc:docMk/>
+          <pc:sldMk cId="0" sldId="294"/>
+        </pc:sldMkLst>
+      </pc:sldChg>
+      <pc:sldChg chg="modSp">
+        <pc:chgData name="william a" userId="c66c7249b60d4ab2" providerId="LiveId" clId="{E43EA3F4-5CFF-4A8A-9561-5E0414B33ACD}" dt="2019-06-24T19:43:06.712" v="417" actId="20577"/>
+        <pc:sldMkLst>
+          <pc:docMk/>
+          <pc:sldMk cId="0" sldId="295"/>
+        </pc:sldMkLst>
+        <pc:spChg chg="mod">
+          <ac:chgData name="william a" userId="c66c7249b60d4ab2" providerId="LiveId" clId="{E43EA3F4-5CFF-4A8A-9561-5E0414B33ACD}" dt="2019-06-24T19:43:06.712" v="417" actId="20577"/>
+          <ac:spMkLst>
+            <pc:docMk/>
+            <pc:sldMk cId="0" sldId="295"/>
+            <ac:spMk id="3" creationId="{00000000-0000-0000-0000-000000000000}"/>
+          </ac:spMkLst>
+        </pc:spChg>
+      </pc:sldChg>
+      <pc:sldChg chg="modSp modAnim">
+        <pc:chgData name="william a" userId="c66c7249b60d4ab2" providerId="LiveId" clId="{E43EA3F4-5CFF-4A8A-9561-5E0414B33ACD}" dt="2019-06-29T03:38:10.258" v="4501" actId="6549"/>
+        <pc:sldMkLst>
+          <pc:docMk/>
+          <pc:sldMk cId="0" sldId="296"/>
+        </pc:sldMkLst>
+        <pc:spChg chg="mod">
+          <ac:chgData name="william a" userId="c66c7249b60d4ab2" providerId="LiveId" clId="{E43EA3F4-5CFF-4A8A-9561-5E0414B33ACD}" dt="2019-06-29T03:38:10.258" v="4501" actId="6549"/>
+          <ac:spMkLst>
+            <pc:docMk/>
+            <pc:sldMk cId="0" sldId="296"/>
+            <ac:spMk id="3" creationId="{00000000-0000-0000-0000-000000000000}"/>
+          </ac:spMkLst>
+        </pc:spChg>
+      </pc:sldChg>
+      <pc:sldChg chg="modSp">
+        <pc:chgData name="william a" userId="c66c7249b60d4ab2" providerId="LiveId" clId="{E43EA3F4-5CFF-4A8A-9561-5E0414B33ACD}" dt="2019-06-29T02:50:01.504" v="2508" actId="20577"/>
+        <pc:sldMkLst>
+          <pc:docMk/>
+          <pc:sldMk cId="0" sldId="297"/>
+        </pc:sldMkLst>
+        <pc:spChg chg="mod">
+          <ac:chgData name="william a" userId="c66c7249b60d4ab2" providerId="LiveId" clId="{E43EA3F4-5CFF-4A8A-9561-5E0414B33ACD}" dt="2019-06-29T02:50:01.504" v="2508" actId="20577"/>
+          <ac:spMkLst>
+            <pc:docMk/>
+            <pc:sldMk cId="0" sldId="297"/>
+            <ac:spMk id="3" creationId="{00000000-0000-0000-0000-000000000000}"/>
+          </ac:spMkLst>
+        </pc:spChg>
+      </pc:sldChg>
+      <pc:sldChg chg="delSp del modAnim">
+        <pc:chgData name="william a" userId="c66c7249b60d4ab2" providerId="LiveId" clId="{E43EA3F4-5CFF-4A8A-9561-5E0414B33ACD}" dt="2019-06-29T03:12:41.379" v="3313" actId="2696"/>
+        <pc:sldMkLst>
+          <pc:docMk/>
+          <pc:sldMk cId="0" sldId="298"/>
+        </pc:sldMkLst>
+        <pc:picChg chg="del">
+          <ac:chgData name="william a" userId="c66c7249b60d4ab2" providerId="LiveId" clId="{E43EA3F4-5CFF-4A8A-9561-5E0414B33ACD}" dt="2019-06-29T03:12:37.773" v="3312"/>
+          <ac:picMkLst>
+            <pc:docMk/>
+            <pc:sldMk cId="0" sldId="298"/>
+            <ac:picMk id="1030" creationId="{00000000-0000-0000-0000-000000000000}"/>
+          </ac:picMkLst>
+        </pc:picChg>
+      </pc:sldChg>
+      <pc:sldChg chg="modSp">
+        <pc:chgData name="william a" userId="c66c7249b60d4ab2" providerId="LiveId" clId="{E43EA3F4-5CFF-4A8A-9561-5E0414B33ACD}" dt="2019-06-29T03:36:40.126" v="4492" actId="403"/>
+        <pc:sldMkLst>
+          <pc:docMk/>
+          <pc:sldMk cId="2095978093" sldId="307"/>
+        </pc:sldMkLst>
+        <pc:spChg chg="mod">
+          <ac:chgData name="william a" userId="c66c7249b60d4ab2" providerId="LiveId" clId="{E43EA3F4-5CFF-4A8A-9561-5E0414B33ACD}" dt="2019-06-29T03:36:40.126" v="4492" actId="403"/>
+          <ac:spMkLst>
+            <pc:docMk/>
+            <pc:sldMk cId="2095978093" sldId="307"/>
+            <ac:spMk id="3" creationId="{00000000-0000-0000-0000-000000000000}"/>
+          </ac:spMkLst>
+        </pc:spChg>
+      </pc:sldChg>
+      <pc:sldChg chg="modSp">
+        <pc:chgData name="william a" userId="c66c7249b60d4ab2" providerId="LiveId" clId="{E43EA3F4-5CFF-4A8A-9561-5E0414B33ACD}" dt="2019-06-29T03:28:05.824" v="4205" actId="20577"/>
+        <pc:sldMkLst>
+          <pc:docMk/>
+          <pc:sldMk cId="4142047571" sldId="317"/>
+        </pc:sldMkLst>
+        <pc:spChg chg="mod">
+          <ac:chgData name="william a" userId="c66c7249b60d4ab2" providerId="LiveId" clId="{E43EA3F4-5CFF-4A8A-9561-5E0414B33ACD}" dt="2019-06-29T03:28:05.824" v="4205" actId="20577"/>
+          <ac:spMkLst>
+            <pc:docMk/>
+            <pc:sldMk cId="4142047571" sldId="317"/>
+            <ac:spMk id="3" creationId="{00000000-0000-0000-0000-000000000000}"/>
+          </ac:spMkLst>
+        </pc:spChg>
+      </pc:sldChg>
+      <pc:sldChg chg="modSp ord">
+        <pc:chgData name="william a" userId="c66c7249b60d4ab2" providerId="LiveId" clId="{E43EA3F4-5CFF-4A8A-9561-5E0414B33ACD}" dt="2019-06-24T20:13:11.857" v="1134" actId="20577"/>
+        <pc:sldMkLst>
+          <pc:docMk/>
+          <pc:sldMk cId="1369847391" sldId="318"/>
+        </pc:sldMkLst>
+        <pc:spChg chg="mod">
+          <ac:chgData name="william a" userId="c66c7249b60d4ab2" providerId="LiveId" clId="{E43EA3F4-5CFF-4A8A-9561-5E0414B33ACD}" dt="2019-06-24T20:13:11.857" v="1134" actId="20577"/>
+          <ac:spMkLst>
+            <pc:docMk/>
+            <pc:sldMk cId="1369847391" sldId="318"/>
+            <ac:spMk id="2" creationId="{00000000-0000-0000-0000-000000000000}"/>
+          </ac:spMkLst>
+        </pc:spChg>
+        <pc:spChg chg="mod">
+          <ac:chgData name="william a" userId="c66c7249b60d4ab2" providerId="LiveId" clId="{E43EA3F4-5CFF-4A8A-9561-5E0414B33ACD}" dt="2019-06-24T20:00:38.176" v="568" actId="20577"/>
+          <ac:spMkLst>
+            <pc:docMk/>
+            <pc:sldMk cId="1369847391" sldId="318"/>
+            <ac:spMk id="3" creationId="{00000000-0000-0000-0000-000000000000}"/>
+          </ac:spMkLst>
+        </pc:spChg>
+      </pc:sldChg>
+      <pc:sldChg chg="modSp modTransition">
+        <pc:chgData name="william a" userId="c66c7249b60d4ab2" providerId="LiveId" clId="{E43EA3F4-5CFF-4A8A-9561-5E0414B33ACD}" dt="2019-06-24T19:07:17.726" v="2"/>
+        <pc:sldMkLst>
+          <pc:docMk/>
+          <pc:sldMk cId="3238583444" sldId="323"/>
+        </pc:sldMkLst>
+        <pc:spChg chg="mod">
+          <ac:chgData name="william a" userId="c66c7249b60d4ab2" providerId="LiveId" clId="{E43EA3F4-5CFF-4A8A-9561-5E0414B33ACD}" dt="2019-06-24T19:07:12.197" v="1" actId="33524"/>
+          <ac:spMkLst>
+            <pc:docMk/>
+            <pc:sldMk cId="3238583444" sldId="323"/>
+            <ac:spMk id="2" creationId="{00000000-0000-0000-0000-000000000000}"/>
+          </ac:spMkLst>
+        </pc:spChg>
+      </pc:sldChg>
+      <pc:sldChg chg="modSp">
+        <pc:chgData name="william a" userId="c66c7249b60d4ab2" providerId="LiveId" clId="{E43EA3F4-5CFF-4A8A-9561-5E0414B33ACD}" dt="2019-06-24T19:42:31.524" v="405" actId="20577"/>
+        <pc:sldMkLst>
+          <pc:docMk/>
+          <pc:sldMk cId="3798850818" sldId="324"/>
+        </pc:sldMkLst>
+        <pc:spChg chg="mod">
+          <ac:chgData name="william a" userId="c66c7249b60d4ab2" providerId="LiveId" clId="{E43EA3F4-5CFF-4A8A-9561-5E0414B33ACD}" dt="2019-06-24T19:42:31.524" v="405" actId="20577"/>
+          <ac:spMkLst>
+            <pc:docMk/>
+            <pc:sldMk cId="3798850818" sldId="324"/>
+            <ac:spMk id="3" creationId="{00000000-0000-0000-0000-000000000000}"/>
+          </ac:spMkLst>
+        </pc:spChg>
+      </pc:sldChg>
+      <pc:sldChg chg="modSp ord">
+        <pc:chgData name="william a" userId="c66c7249b60d4ab2" providerId="LiveId" clId="{E43EA3F4-5CFF-4A8A-9561-5E0414B33ACD}" dt="2019-06-29T03:17:09.250" v="3611"/>
+        <pc:sldMkLst>
+          <pc:docMk/>
+          <pc:sldMk cId="3647655776" sldId="326"/>
+        </pc:sldMkLst>
+        <pc:spChg chg="mod">
+          <ac:chgData name="william a" userId="c66c7249b60d4ab2" providerId="LiveId" clId="{E43EA3F4-5CFF-4A8A-9561-5E0414B33ACD}" dt="2019-06-29T03:16:55.869" v="3608" actId="20577"/>
+          <ac:spMkLst>
+            <pc:docMk/>
+            <pc:sldMk cId="3647655776" sldId="326"/>
+            <ac:spMk id="2" creationId="{3A456A49-D9F1-4953-8152-0834928543C1}"/>
+          </ac:spMkLst>
+        </pc:spChg>
+      </pc:sldChg>
+      <pc:sldChg chg="addSp delSp modSp ord">
+        <pc:chgData name="william a" userId="c66c7249b60d4ab2" providerId="LiveId" clId="{E43EA3F4-5CFF-4A8A-9561-5E0414B33ACD}" dt="2019-06-29T03:25:36.873" v="4195" actId="14100"/>
+        <pc:sldMkLst>
+          <pc:docMk/>
+          <pc:sldMk cId="2539014857" sldId="327"/>
+        </pc:sldMkLst>
+        <pc:spChg chg="mod">
+          <ac:chgData name="william a" userId="c66c7249b60d4ab2" providerId="LiveId" clId="{E43EA3F4-5CFF-4A8A-9561-5E0414B33ACD}" dt="2019-06-29T03:24:00.293" v="4191" actId="20577"/>
+          <ac:spMkLst>
+            <pc:docMk/>
+            <pc:sldMk cId="2539014857" sldId="327"/>
+            <ac:spMk id="2" creationId="{3A456A49-D9F1-4953-8152-0834928543C1}"/>
+          </ac:spMkLst>
+        </pc:spChg>
+        <pc:picChg chg="del">
+          <ac:chgData name="william a" userId="c66c7249b60d4ab2" providerId="LiveId" clId="{E43EA3F4-5CFF-4A8A-9561-5E0414B33ACD}" dt="2019-06-29T03:25:28.197" v="4192" actId="478"/>
+          <ac:picMkLst>
+            <pc:docMk/>
+            <pc:sldMk cId="2539014857" sldId="327"/>
+            <ac:picMk id="3" creationId="{3E554B8E-F21B-4143-BA9B-C2C52E093A35}"/>
+          </ac:picMkLst>
+        </pc:picChg>
+        <pc:picChg chg="add mod">
+          <ac:chgData name="william a" userId="c66c7249b60d4ab2" providerId="LiveId" clId="{E43EA3F4-5CFF-4A8A-9561-5E0414B33ACD}" dt="2019-06-29T03:25:36.873" v="4195" actId="14100"/>
+          <ac:picMkLst>
+            <pc:docMk/>
+            <pc:sldMk cId="2539014857" sldId="327"/>
+            <ac:picMk id="5" creationId="{75201CCD-63FE-4213-A177-424B54419BC3}"/>
+          </ac:picMkLst>
+        </pc:picChg>
+      </pc:sldChg>
+      <pc:sldChg chg="modSp">
+        <pc:chgData name="william a" userId="c66c7249b60d4ab2" providerId="LiveId" clId="{E43EA3F4-5CFF-4A8A-9561-5E0414B33ACD}" dt="2019-06-29T15:45:18.693" v="4528" actId="1036"/>
+        <pc:sldMkLst>
+          <pc:docMk/>
+          <pc:sldMk cId="2243704929" sldId="328"/>
+        </pc:sldMkLst>
+        <pc:spChg chg="mod">
+          <ac:chgData name="william a" userId="c66c7249b60d4ab2" providerId="LiveId" clId="{E43EA3F4-5CFF-4A8A-9561-5E0414B33ACD}" dt="2019-06-29T15:45:18.693" v="4528" actId="1036"/>
+          <ac:spMkLst>
+            <pc:docMk/>
+            <pc:sldMk cId="2243704929" sldId="328"/>
+            <ac:spMk id="3" creationId="{00000000-0000-0000-0000-000000000000}"/>
+          </ac:spMkLst>
+        </pc:spChg>
+      </pc:sldChg>
+      <pc:sldChg chg="modSp">
+        <pc:chgData name="william a" userId="c66c7249b60d4ab2" providerId="LiveId" clId="{E43EA3F4-5CFF-4A8A-9561-5E0414B33ACD}" dt="2019-06-24T19:41:20.210" v="386" actId="1076"/>
+        <pc:sldMkLst>
+          <pc:docMk/>
+          <pc:sldMk cId="2451175654" sldId="329"/>
+        </pc:sldMkLst>
+        <pc:spChg chg="mod">
+          <ac:chgData name="william a" userId="c66c7249b60d4ab2" providerId="LiveId" clId="{E43EA3F4-5CFF-4A8A-9561-5E0414B33ACD}" dt="2019-06-24T19:41:17.927" v="385" actId="27636"/>
+          <ac:spMkLst>
+            <pc:docMk/>
+            <pc:sldMk cId="2451175654" sldId="329"/>
+            <ac:spMk id="3" creationId="{00000000-0000-0000-0000-000000000000}"/>
+          </ac:spMkLst>
+        </pc:spChg>
+        <pc:picChg chg="mod">
+          <ac:chgData name="william a" userId="c66c7249b60d4ab2" providerId="LiveId" clId="{E43EA3F4-5CFF-4A8A-9561-5E0414B33ACD}" dt="2019-06-24T19:41:20.210" v="386" actId="1076"/>
+          <ac:picMkLst>
+            <pc:docMk/>
+            <pc:sldMk cId="2451175654" sldId="329"/>
+            <ac:picMk id="4" creationId="{00000000-0000-0000-0000-000000000000}"/>
+          </ac:picMkLst>
+        </pc:picChg>
+      </pc:sldChg>
+      <pc:sldChg chg="add del modTransition">
+        <pc:chgData name="william a" userId="c66c7249b60d4ab2" providerId="LiveId" clId="{E43EA3F4-5CFF-4A8A-9561-5E0414B33ACD}" dt="2019-06-24T19:41:41.814" v="390"/>
+        <pc:sldMkLst>
+          <pc:docMk/>
+          <pc:sldMk cId="4135181844" sldId="333"/>
+        </pc:sldMkLst>
+      </pc:sldChg>
+      <pc:sldChg chg="modSp">
+        <pc:chgData name="william a" userId="c66c7249b60d4ab2" providerId="LiveId" clId="{E43EA3F4-5CFF-4A8A-9561-5E0414B33ACD}" dt="2019-06-29T03:26:39.640" v="4200" actId="6549"/>
+        <pc:sldMkLst>
+          <pc:docMk/>
+          <pc:sldMk cId="2906491736" sldId="336"/>
+        </pc:sldMkLst>
+        <pc:spChg chg="mod">
+          <ac:chgData name="william a" userId="c66c7249b60d4ab2" providerId="LiveId" clId="{E43EA3F4-5CFF-4A8A-9561-5E0414B33ACD}" dt="2019-06-29T03:26:39.640" v="4200" actId="6549"/>
+          <ac:spMkLst>
+            <pc:docMk/>
+            <pc:sldMk cId="2906491736" sldId="336"/>
+            <ac:spMk id="9" creationId="{D909863E-BC8D-42CC-B70A-1CA3DE56567F}"/>
+          </ac:spMkLst>
+        </pc:spChg>
+      </pc:sldChg>
+      <pc:sldChg chg="modSp modAnim">
+        <pc:chgData name="william a" userId="c66c7249b60d4ab2" providerId="LiveId" clId="{E43EA3F4-5CFF-4A8A-9561-5E0414B33ACD}" dt="2019-06-29T15:47:35.288" v="4545"/>
+        <pc:sldMkLst>
+          <pc:docMk/>
+          <pc:sldMk cId="2254391894" sldId="338"/>
+        </pc:sldMkLst>
+        <pc:spChg chg="mod">
+          <ac:chgData name="william a" userId="c66c7249b60d4ab2" providerId="LiveId" clId="{E43EA3F4-5CFF-4A8A-9561-5E0414B33ACD}" dt="2019-06-29T15:47:18.984" v="4544" actId="12"/>
+          <ac:spMkLst>
+            <pc:docMk/>
+            <pc:sldMk cId="2254391894" sldId="338"/>
+            <ac:spMk id="2" creationId="{00000000-0000-0000-0000-000000000000}"/>
+          </ac:spMkLst>
+        </pc:spChg>
+      </pc:sldChg>
+      <pc:sldChg chg="modSp ord">
+        <pc:chgData name="william a" userId="c66c7249b60d4ab2" providerId="LiveId" clId="{E43EA3F4-5CFF-4A8A-9561-5E0414B33ACD}" dt="2019-06-29T15:46:59.703" v="4543"/>
+        <pc:sldMkLst>
+          <pc:docMk/>
+          <pc:sldMk cId="3917590187" sldId="343"/>
+        </pc:sldMkLst>
+        <pc:spChg chg="mod">
+          <ac:chgData name="william a" userId="c66c7249b60d4ab2" providerId="LiveId" clId="{E43EA3F4-5CFF-4A8A-9561-5E0414B33ACD}" dt="2019-06-24T19:54:31.049" v="545" actId="27636"/>
+          <ac:spMkLst>
+            <pc:docMk/>
+            <pc:sldMk cId="3917590187" sldId="343"/>
+            <ac:spMk id="3" creationId="{00000000-0000-0000-0000-000000000000}"/>
+          </ac:spMkLst>
+        </pc:spChg>
+      </pc:sldChg>
+      <pc:sldChg chg="addSp delSp modSp modAnim">
+        <pc:chgData name="william a" userId="c66c7249b60d4ab2" providerId="LiveId" clId="{E43EA3F4-5CFF-4A8A-9561-5E0414B33ACD}" dt="2019-06-29T15:48:48.780" v="4549"/>
+        <pc:sldMkLst>
+          <pc:docMk/>
+          <pc:sldMk cId="871226382" sldId="345"/>
+        </pc:sldMkLst>
+        <pc:spChg chg="mod">
+          <ac:chgData name="william a" userId="c66c7249b60d4ab2" providerId="LiveId" clId="{E43EA3F4-5CFF-4A8A-9561-5E0414B33ACD}" dt="2019-06-24T19:45:47.126" v="467" actId="6549"/>
+          <ac:spMkLst>
+            <pc:docMk/>
+            <pc:sldMk cId="871226382" sldId="345"/>
+            <ac:spMk id="3" creationId="{00000000-0000-0000-0000-000000000000}"/>
+          </ac:spMkLst>
+        </pc:spChg>
+        <pc:spChg chg="del mod">
+          <ac:chgData name="william a" userId="c66c7249b60d4ab2" providerId="LiveId" clId="{E43EA3F4-5CFF-4A8A-9561-5E0414B33ACD}" dt="2019-06-24T19:54:12.042" v="531" actId="478"/>
+          <ac:spMkLst>
+            <pc:docMk/>
+            <pc:sldMk cId="871226382" sldId="345"/>
+            <ac:spMk id="4" creationId="{00000000-0000-0000-0000-000000000000}"/>
+          </ac:spMkLst>
+        </pc:spChg>
+        <pc:spChg chg="mod">
+          <ac:chgData name="william a" userId="c66c7249b60d4ab2" providerId="LiveId" clId="{E43EA3F4-5CFF-4A8A-9561-5E0414B33ACD}" dt="2019-06-24T19:54:08.171" v="530" actId="1036"/>
+          <ac:spMkLst>
+            <pc:docMk/>
+            <pc:sldMk cId="871226382" sldId="345"/>
+            <ac:spMk id="7" creationId="{00000000-0000-0000-0000-000000000000}"/>
+          </ac:spMkLst>
+        </pc:spChg>
+        <pc:spChg chg="mod">
+          <ac:chgData name="william a" userId="c66c7249b60d4ab2" providerId="LiveId" clId="{E43EA3F4-5CFF-4A8A-9561-5E0414B33ACD}" dt="2019-06-24T19:54:08.171" v="530" actId="1036"/>
+          <ac:spMkLst>
+            <pc:docMk/>
+            <pc:sldMk cId="871226382" sldId="345"/>
+            <ac:spMk id="13" creationId="{80A4B527-055A-42D8-B8E5-34D0A6763AFC}"/>
+          </ac:spMkLst>
+        </pc:spChg>
+        <pc:picChg chg="del mod modCrop">
+          <ac:chgData name="william a" userId="c66c7249b60d4ab2" providerId="LiveId" clId="{E43EA3F4-5CFF-4A8A-9561-5E0414B33ACD}" dt="2019-06-24T19:48:13.384" v="489" actId="478"/>
+          <ac:picMkLst>
+            <pc:docMk/>
+            <pc:sldMk cId="871226382" sldId="345"/>
+            <ac:picMk id="5" creationId="{00000000-0000-0000-0000-000000000000}"/>
+          </ac:picMkLst>
+        </pc:picChg>
+        <pc:picChg chg="add del mod">
+          <ac:chgData name="william a" userId="c66c7249b60d4ab2" providerId="LiveId" clId="{E43EA3F4-5CFF-4A8A-9561-5E0414B33ACD}" dt="2019-06-24T19:48:18.072" v="493"/>
+          <ac:picMkLst>
+            <pc:docMk/>
+            <pc:sldMk cId="871226382" sldId="345"/>
+            <ac:picMk id="6" creationId="{9E96FD13-B5FF-43C7-A170-AB3A4A483A11}"/>
+          </ac:picMkLst>
+        </pc:picChg>
+        <pc:picChg chg="add mod ord">
+          <ac:chgData name="william a" userId="c66c7249b60d4ab2" providerId="LiveId" clId="{E43EA3F4-5CFF-4A8A-9561-5E0414B33ACD}" dt="2019-06-24T19:54:08.171" v="530" actId="1036"/>
+          <ac:picMkLst>
+            <pc:docMk/>
+            <pc:sldMk cId="871226382" sldId="345"/>
+            <ac:picMk id="8" creationId="{E88376E5-3143-47A1-B90A-DC5845D8FEA2}"/>
+          </ac:picMkLst>
+        </pc:picChg>
+      </pc:sldChg>
+      <pc:sldChg chg="modTransition">
+        <pc:chgData name="william a" userId="c66c7249b60d4ab2" providerId="LiveId" clId="{E43EA3F4-5CFF-4A8A-9561-5E0414B33ACD}" dt="2019-06-24T19:24:40.932" v="118"/>
+        <pc:sldMkLst>
+          <pc:docMk/>
+          <pc:sldMk cId="428579510" sldId="353"/>
+        </pc:sldMkLst>
+      </pc:sldChg>
+      <pc:sldChg chg="modSp">
+        <pc:chgData name="william a" userId="c66c7249b60d4ab2" providerId="LiveId" clId="{E43EA3F4-5CFF-4A8A-9561-5E0414B33ACD}" dt="2019-06-24T19:28:09.073" v="237" actId="15"/>
+        <pc:sldMkLst>
+          <pc:docMk/>
+          <pc:sldMk cId="4088082566" sldId="360"/>
+        </pc:sldMkLst>
+        <pc:spChg chg="mod">
+          <ac:chgData name="william a" userId="c66c7249b60d4ab2" providerId="LiveId" clId="{E43EA3F4-5CFF-4A8A-9561-5E0414B33ACD}" dt="2019-06-24T19:28:09.073" v="237" actId="15"/>
+          <ac:spMkLst>
+            <pc:docMk/>
+            <pc:sldMk cId="4088082566" sldId="360"/>
+            <ac:spMk id="3" creationId="{00000000-0000-0000-0000-000000000000}"/>
+          </ac:spMkLst>
+        </pc:spChg>
+      </pc:sldChg>
+      <pc:sldChg chg="modTransition">
+        <pc:chgData name="william a" userId="c66c7249b60d4ab2" providerId="LiveId" clId="{E43EA3F4-5CFF-4A8A-9561-5E0414B33ACD}" dt="2019-06-29T02:46:55.968" v="2352"/>
+        <pc:sldMkLst>
+          <pc:docMk/>
+          <pc:sldMk cId="1985756114" sldId="362"/>
+        </pc:sldMkLst>
+      </pc:sldChg>
+      <pc:sldChg chg="modSp">
+        <pc:chgData name="william a" userId="c66c7249b60d4ab2" providerId="LiveId" clId="{E43EA3F4-5CFF-4A8A-9561-5E0414B33ACD}" dt="2019-06-29T02:47:46.781" v="2360" actId="1035"/>
+        <pc:sldMkLst>
+          <pc:docMk/>
+          <pc:sldMk cId="361452273" sldId="363"/>
+        </pc:sldMkLst>
+        <pc:spChg chg="mod">
+          <ac:chgData name="william a" userId="c66c7249b60d4ab2" providerId="LiveId" clId="{E43EA3F4-5CFF-4A8A-9561-5E0414B33ACD}" dt="2019-06-29T02:47:46.781" v="2360" actId="1035"/>
+          <ac:spMkLst>
+            <pc:docMk/>
+            <pc:sldMk cId="361452273" sldId="363"/>
+            <ac:spMk id="3" creationId="{00000000-0000-0000-0000-000000000000}"/>
+          </ac:spMkLst>
+        </pc:spChg>
+      </pc:sldChg>
+      <pc:sldChg chg="modSp">
+        <pc:chgData name="william a" userId="c66c7249b60d4ab2" providerId="LiveId" clId="{E43EA3F4-5CFF-4A8A-9561-5E0414B33ACD}" dt="2019-06-29T02:54:15.802" v="2716" actId="20577"/>
+        <pc:sldMkLst>
+          <pc:docMk/>
+          <pc:sldMk cId="1952350759" sldId="366"/>
+        </pc:sldMkLst>
+        <pc:spChg chg="mod">
+          <ac:chgData name="william a" userId="c66c7249b60d4ab2" providerId="LiveId" clId="{E43EA3F4-5CFF-4A8A-9561-5E0414B33ACD}" dt="2019-06-29T02:54:15.802" v="2716" actId="20577"/>
+          <ac:spMkLst>
+            <pc:docMk/>
+            <pc:sldMk cId="1952350759" sldId="366"/>
+            <ac:spMk id="3" creationId="{00000000-0000-0000-0000-000000000000}"/>
+          </ac:spMkLst>
+        </pc:spChg>
+      </pc:sldChg>
+      <pc:sldChg chg="modSp">
+        <pc:chgData name="william a" userId="c66c7249b60d4ab2" providerId="LiveId" clId="{E43EA3F4-5CFF-4A8A-9561-5E0414B33ACD}" dt="2019-06-29T02:37:38.001" v="1694" actId="403"/>
+        <pc:sldMkLst>
+          <pc:docMk/>
+          <pc:sldMk cId="140071778" sldId="368"/>
+        </pc:sldMkLst>
+        <pc:spChg chg="mod">
+          <ac:chgData name="william a" userId="c66c7249b60d4ab2" providerId="LiveId" clId="{E43EA3F4-5CFF-4A8A-9561-5E0414B33ACD}" dt="2019-06-29T02:37:38.001" v="1694" actId="403"/>
+          <ac:spMkLst>
+            <pc:docMk/>
+            <pc:sldMk cId="140071778" sldId="368"/>
+            <ac:spMk id="3" creationId="{00000000-0000-0000-0000-000000000000}"/>
+          </ac:spMkLst>
+        </pc:spChg>
+      </pc:sldChg>
+      <pc:sldChg chg="modSp">
+        <pc:chgData name="william a" userId="c66c7249b60d4ab2" providerId="LiveId" clId="{E43EA3F4-5CFF-4A8A-9561-5E0414B33ACD}" dt="2019-06-24T19:27:09.979" v="154" actId="20577"/>
+        <pc:sldMkLst>
+          <pc:docMk/>
+          <pc:sldMk cId="870192496" sldId="371"/>
+        </pc:sldMkLst>
+        <pc:spChg chg="mod">
+          <ac:chgData name="william a" userId="c66c7249b60d4ab2" providerId="LiveId" clId="{E43EA3F4-5CFF-4A8A-9561-5E0414B33ACD}" dt="2019-06-24T19:27:09.979" v="154" actId="20577"/>
+          <ac:spMkLst>
+            <pc:docMk/>
+            <pc:sldMk cId="870192496" sldId="371"/>
+            <ac:spMk id="3" creationId="{00000000-0000-0000-0000-000000000000}"/>
+          </ac:spMkLst>
+        </pc:spChg>
+      </pc:sldChg>
+      <pc:sldChg chg="modSp ord">
+        <pc:chgData name="william a" userId="c66c7249b60d4ab2" providerId="LiveId" clId="{E43EA3F4-5CFF-4A8A-9561-5E0414B33ACD}" dt="2019-06-29T15:46:51.228" v="4542"/>
+        <pc:sldMkLst>
+          <pc:docMk/>
+          <pc:sldMk cId="1000541029" sldId="374"/>
+        </pc:sldMkLst>
+        <pc:spChg chg="mod">
+          <ac:chgData name="william a" userId="c66c7249b60d4ab2" providerId="LiveId" clId="{E43EA3F4-5CFF-4A8A-9561-5E0414B33ACD}" dt="2019-06-29T15:46:36.397" v="4541" actId="20577"/>
+          <ac:spMkLst>
+            <pc:docMk/>
+            <pc:sldMk cId="1000541029" sldId="374"/>
+            <ac:spMk id="3" creationId="{00000000-0000-0000-0000-000000000000}"/>
+          </ac:spMkLst>
+        </pc:spChg>
+      </pc:sldChg>
+      <pc:sldChg chg="modSp">
+        <pc:chgData name="william a" userId="c66c7249b60d4ab2" providerId="LiveId" clId="{E43EA3F4-5CFF-4A8A-9561-5E0414B33ACD}" dt="2019-06-24T19:29:47.433" v="375" actId="27636"/>
+        <pc:sldMkLst>
+          <pc:docMk/>
+          <pc:sldMk cId="847228155" sldId="380"/>
+        </pc:sldMkLst>
+        <pc:spChg chg="mod">
+          <ac:chgData name="william a" userId="c66c7249b60d4ab2" providerId="LiveId" clId="{E43EA3F4-5CFF-4A8A-9561-5E0414B33ACD}" dt="2019-06-24T19:29:47.433" v="375" actId="27636"/>
+          <ac:spMkLst>
+            <pc:docMk/>
+            <pc:sldMk cId="847228155" sldId="380"/>
+            <ac:spMk id="3" creationId="{00000000-0000-0000-0000-000000000000}"/>
+          </ac:spMkLst>
+        </pc:spChg>
+      </pc:sldChg>
+      <pc:sldChg chg="modSp">
+        <pc:chgData name="william a" userId="c66c7249b60d4ab2" providerId="LiveId" clId="{E43EA3F4-5CFF-4A8A-9561-5E0414B33ACD}" dt="2019-06-29T03:30:23.641" v="4266" actId="403"/>
+        <pc:sldMkLst>
+          <pc:docMk/>
+          <pc:sldMk cId="1794747222" sldId="384"/>
+        </pc:sldMkLst>
+        <pc:spChg chg="mod">
+          <ac:chgData name="william a" userId="c66c7249b60d4ab2" providerId="LiveId" clId="{E43EA3F4-5CFF-4A8A-9561-5E0414B33ACD}" dt="2019-06-29T03:30:23.641" v="4266" actId="403"/>
+          <ac:spMkLst>
+            <pc:docMk/>
+            <pc:sldMk cId="1794747222" sldId="384"/>
+            <ac:spMk id="3" creationId="{37511EB7-F0FB-452B-9183-F3E8CC5A75FB}"/>
+          </ac:spMkLst>
+        </pc:spChg>
+      </pc:sldChg>
+      <pc:sldChg chg="delSp">
+        <pc:chgData name="william a" userId="c66c7249b60d4ab2" providerId="LiveId" clId="{E43EA3F4-5CFF-4A8A-9561-5E0414B33ACD}" dt="2019-06-24T19:42:17.189" v="398" actId="478"/>
+        <pc:sldMkLst>
+          <pc:docMk/>
+          <pc:sldMk cId="3776688288" sldId="385"/>
+        </pc:sldMkLst>
+        <pc:spChg chg="del">
+          <ac:chgData name="william a" userId="c66c7249b60d4ab2" providerId="LiveId" clId="{E43EA3F4-5CFF-4A8A-9561-5E0414B33ACD}" dt="2019-06-24T19:42:17.189" v="398" actId="478"/>
+          <ac:spMkLst>
+            <pc:docMk/>
+            <pc:sldMk cId="3776688288" sldId="385"/>
+            <ac:spMk id="3" creationId="{BF21EC9F-82A9-44A3-ACCC-354C0E5F24BF}"/>
+          </ac:spMkLst>
+        </pc:spChg>
+      </pc:sldChg>
+      <pc:sldChg chg="modSp">
+        <pc:chgData name="william a" userId="c66c7249b60d4ab2" providerId="LiveId" clId="{E43EA3F4-5CFF-4A8A-9561-5E0414B33ACD}" dt="2019-06-29T15:43:54.591" v="4509" actId="12"/>
+        <pc:sldMkLst>
+          <pc:docMk/>
+          <pc:sldMk cId="2805776003" sldId="389"/>
+        </pc:sldMkLst>
+        <pc:spChg chg="mod">
+          <ac:chgData name="william a" userId="c66c7249b60d4ab2" providerId="LiveId" clId="{E43EA3F4-5CFF-4A8A-9561-5E0414B33ACD}" dt="2019-06-29T15:43:54.591" v="4509" actId="12"/>
+          <ac:spMkLst>
+            <pc:docMk/>
+            <pc:sldMk cId="2805776003" sldId="389"/>
+            <ac:spMk id="3" creationId="{00000000-0000-0000-0000-000000000000}"/>
+          </ac:spMkLst>
+        </pc:spChg>
+      </pc:sldChg>
+      <pc:sldChg chg="modTransition">
+        <pc:chgData name="william a" userId="c66c7249b60d4ab2" providerId="LiveId" clId="{E43EA3F4-5CFF-4A8A-9561-5E0414B33ACD}" dt="2019-06-29T03:27:15.143" v="4201"/>
+        <pc:sldMkLst>
+          <pc:docMk/>
+          <pc:sldMk cId="2719412598" sldId="392"/>
+        </pc:sldMkLst>
+      </pc:sldChg>
+      <pc:sldChg chg="modSp modAnim">
+        <pc:chgData name="william a" userId="c66c7249b60d4ab2" providerId="LiveId" clId="{E43EA3F4-5CFF-4A8A-9561-5E0414B33ACD}" dt="2019-06-29T15:48:37.118" v="4547"/>
+        <pc:sldMkLst>
+          <pc:docMk/>
+          <pc:sldMk cId="1686395800" sldId="395"/>
+        </pc:sldMkLst>
+        <pc:spChg chg="mod">
+          <ac:chgData name="william a" userId="c66c7249b60d4ab2" providerId="LiveId" clId="{E43EA3F4-5CFF-4A8A-9561-5E0414B33ACD}" dt="2019-06-29T03:26:23.477" v="4197" actId="404"/>
+          <ac:spMkLst>
+            <pc:docMk/>
+            <pc:sldMk cId="1686395800" sldId="395"/>
+            <ac:spMk id="9" creationId="{D909863E-BC8D-42CC-B70A-1CA3DE56567F}"/>
+          </ac:spMkLst>
+        </pc:spChg>
+      </pc:sldChg>
+      <pc:sldChg chg="modSp">
+        <pc:chgData name="william a" userId="c66c7249b60d4ab2" providerId="LiveId" clId="{E43EA3F4-5CFF-4A8A-9561-5E0414B33ACD}" dt="2019-06-29T15:45:50.514" v="4531" actId="404"/>
+        <pc:sldMkLst>
+          <pc:docMk/>
+          <pc:sldMk cId="2193851596" sldId="396"/>
+        </pc:sldMkLst>
+        <pc:spChg chg="mod">
+          <ac:chgData name="william a" userId="c66c7249b60d4ab2" providerId="LiveId" clId="{E43EA3F4-5CFF-4A8A-9561-5E0414B33ACD}" dt="2019-06-29T15:45:50.514" v="4531" actId="404"/>
+          <ac:spMkLst>
+            <pc:docMk/>
+            <pc:sldMk cId="2193851596" sldId="396"/>
+            <ac:spMk id="9" creationId="{D909863E-BC8D-42CC-B70A-1CA3DE56567F}"/>
+          </ac:spMkLst>
+        </pc:spChg>
+      </pc:sldChg>
+      <pc:sldChg chg="ord">
+        <pc:chgData name="william a" userId="c66c7249b60d4ab2" providerId="LiveId" clId="{E43EA3F4-5CFF-4A8A-9561-5E0414B33ACD}" dt="2019-06-29T03:37:21.035" v="4493"/>
+        <pc:sldMkLst>
+          <pc:docMk/>
+          <pc:sldMk cId="3065506444" sldId="412"/>
+        </pc:sldMkLst>
+      </pc:sldChg>
+      <pc:sldChg chg="addSp delSp modSp add del modTransition">
+        <pc:chgData name="william a" userId="c66c7249b60d4ab2" providerId="LiveId" clId="{E43EA3F4-5CFF-4A8A-9561-5E0414B33ACD}" dt="2019-06-24T20:12:52.384" v="1115" actId="20577"/>
+        <pc:sldMkLst>
+          <pc:docMk/>
+          <pc:sldMk cId="1387534095" sldId="417"/>
+        </pc:sldMkLst>
+        <pc:spChg chg="add mod">
+          <ac:chgData name="william a" userId="c66c7249b60d4ab2" providerId="LiveId" clId="{E43EA3F4-5CFF-4A8A-9561-5E0414B33ACD}" dt="2019-06-24T20:03:11.947" v="736" actId="478"/>
+          <ac:spMkLst>
+            <pc:docMk/>
+            <pc:sldMk cId="1387534095" sldId="417"/>
+            <ac:spMk id="3" creationId="{4BC99724-87B4-4279-9E00-1104F3DA7919}"/>
+          </ac:spMkLst>
+        </pc:spChg>
+        <pc:spChg chg="del">
+          <ac:chgData name="william a" userId="c66c7249b60d4ab2" providerId="LiveId" clId="{E43EA3F4-5CFF-4A8A-9561-5E0414B33ACD}" dt="2019-06-24T20:03:11.947" v="736" actId="478"/>
+          <ac:spMkLst>
+            <pc:docMk/>
+            <pc:sldMk cId="1387534095" sldId="417"/>
+            <ac:spMk id="4" creationId="{00000000-0000-0000-0000-000000000000}"/>
+          </ac:spMkLst>
+        </pc:spChg>
+        <pc:spChg chg="add del">
+          <ac:chgData name="william a" userId="c66c7249b60d4ab2" providerId="LiveId" clId="{E43EA3F4-5CFF-4A8A-9561-5E0414B33ACD}" dt="2019-06-24T20:02:29.118" v="724"/>
+          <ac:spMkLst>
+            <pc:docMk/>
+            <pc:sldMk cId="1387534095" sldId="417"/>
+            <ac:spMk id="6" creationId="{1B05D764-0F54-422E-86AC-85E6F06B6AB1}"/>
+          </ac:spMkLst>
+        </pc:spChg>
+        <pc:spChg chg="mod">
+          <ac:chgData name="william a" userId="c66c7249b60d4ab2" providerId="LiveId" clId="{E43EA3F4-5CFF-4A8A-9561-5E0414B33ACD}" dt="2019-06-24T20:05:45.162" v="793" actId="1076"/>
+          <ac:spMkLst>
+            <pc:docMk/>
+            <pc:sldMk cId="1387534095" sldId="417"/>
+            <ac:spMk id="7" creationId="{13427966-EC4E-4EB0-8FDC-07FC122433C2}"/>
+          </ac:spMkLst>
+        </pc:spChg>
+        <pc:spChg chg="add mod">
+          <ac:chgData name="william a" userId="c66c7249b60d4ab2" providerId="LiveId" clId="{E43EA3F4-5CFF-4A8A-9561-5E0414B33ACD}" dt="2019-06-24T20:12:52.384" v="1115" actId="20577"/>
+          <ac:spMkLst>
+            <pc:docMk/>
+            <pc:sldMk cId="1387534095" sldId="417"/>
+            <ac:spMk id="9" creationId="{2D226F2D-BA1D-4640-908E-0525F20DF626}"/>
+          </ac:spMkLst>
+        </pc:spChg>
+        <pc:spChg chg="add del mod">
+          <ac:chgData name="william a" userId="c66c7249b60d4ab2" providerId="LiveId" clId="{E43EA3F4-5CFF-4A8A-9561-5E0414B33ACD}" dt="2019-06-24T20:05:26.104" v="765"/>
+          <ac:spMkLst>
+            <pc:docMk/>
+            <pc:sldMk cId="1387534095" sldId="417"/>
+            <ac:spMk id="10" creationId="{EEECEA67-2AA9-401F-A382-F0CF189CAF5F}"/>
+          </ac:spMkLst>
+        </pc:spChg>
+        <pc:picChg chg="mod">
+          <ac:chgData name="william a" userId="c66c7249b60d4ab2" providerId="LiveId" clId="{E43EA3F4-5CFF-4A8A-9561-5E0414B33ACD}" dt="2019-06-24T20:05:10.637" v="761" actId="14100"/>
+          <ac:picMkLst>
+            <pc:docMk/>
+            <pc:sldMk cId="1387534095" sldId="417"/>
+            <ac:picMk id="5" creationId="{93B9AE32-94F5-4BC4-834E-98833E008AB2}"/>
+          </ac:picMkLst>
+        </pc:picChg>
+        <pc:picChg chg="mod">
+          <ac:chgData name="william a" userId="c66c7249b60d4ab2" providerId="LiveId" clId="{E43EA3F4-5CFF-4A8A-9561-5E0414B33ACD}" dt="2019-06-24T20:05:48.602" v="794" actId="1076"/>
+          <ac:picMkLst>
+            <pc:docMk/>
+            <pc:sldMk cId="1387534095" sldId="417"/>
+            <ac:picMk id="8" creationId="{DD966F39-4A86-48DC-AB70-1D9F158CF488}"/>
+          </ac:picMkLst>
+        </pc:picChg>
+      </pc:sldChg>
+      <pc:sldChg chg="modSp add">
+        <pc:chgData name="william a" userId="c66c7249b60d4ab2" providerId="LiveId" clId="{E43EA3F4-5CFF-4A8A-9561-5E0414B33ACD}" dt="2019-06-29T03:28:58.757" v="4262" actId="20577"/>
+        <pc:sldMkLst>
+          <pc:docMk/>
+          <pc:sldMk cId="1599106219" sldId="418"/>
+        </pc:sldMkLst>
+        <pc:spChg chg="mod">
+          <ac:chgData name="william a" userId="c66c7249b60d4ab2" providerId="LiveId" clId="{E43EA3F4-5CFF-4A8A-9561-5E0414B33ACD}" dt="2019-06-29T03:28:58.757" v="4262" actId="20577"/>
+          <ac:spMkLst>
+            <pc:docMk/>
+            <pc:sldMk cId="1599106219" sldId="418"/>
+            <ac:spMk id="3" creationId="{00000000-0000-0000-0000-000000000000}"/>
+          </ac:spMkLst>
+        </pc:spChg>
+      </pc:sldChg>
+      <pc:sldChg chg="modSp add ord">
+        <pc:chgData name="william a" userId="c66c7249b60d4ab2" providerId="LiveId" clId="{E43EA3F4-5CFF-4A8A-9561-5E0414B33ACD}" dt="2019-06-29T03:20:25.733" v="3871"/>
+        <pc:sldMkLst>
+          <pc:docMk/>
+          <pc:sldMk cId="3140931035" sldId="419"/>
+        </pc:sldMkLst>
+        <pc:spChg chg="mod">
+          <ac:chgData name="william a" userId="c66c7249b60d4ab2" providerId="LiveId" clId="{E43EA3F4-5CFF-4A8A-9561-5E0414B33ACD}" dt="2019-06-29T02:49:12.300" v="2501" actId="27636"/>
+          <ac:spMkLst>
+            <pc:docMk/>
+            <pc:sldMk cId="3140931035" sldId="419"/>
+            <ac:spMk id="3" creationId="{00000000-0000-0000-0000-000000000000}"/>
+          </ac:spMkLst>
+        </pc:spChg>
+      </pc:sldChg>
+      <pc:sldChg chg="addSp modSp add modAnim">
+        <pc:chgData name="william a" userId="c66c7249b60d4ab2" providerId="LiveId" clId="{E43EA3F4-5CFF-4A8A-9561-5E0414B33ACD}" dt="2019-06-29T15:48:12.014" v="4546"/>
+        <pc:sldMkLst>
+          <pc:docMk/>
+          <pc:sldMk cId="1556883112" sldId="420"/>
+        </pc:sldMkLst>
+        <pc:spChg chg="mod">
+          <ac:chgData name="william a" userId="c66c7249b60d4ab2" providerId="LiveId" clId="{E43EA3F4-5CFF-4A8A-9561-5E0414B33ACD}" dt="2019-06-29T03:14:25.622" v="3456" actId="20577"/>
+          <ac:spMkLst>
+            <pc:docMk/>
+            <pc:sldMk cId="1556883112" sldId="420"/>
+            <ac:spMk id="3" creationId="{00000000-0000-0000-0000-000000000000}"/>
+          </ac:spMkLst>
+        </pc:spChg>
+        <pc:picChg chg="add mod">
+          <ac:chgData name="william a" userId="c66c7249b60d4ab2" providerId="LiveId" clId="{E43EA3F4-5CFF-4A8A-9561-5E0414B33ACD}" dt="2019-06-29T03:14:32.493" v="3457" actId="1076"/>
+          <ac:picMkLst>
+            <pc:docMk/>
+            <pc:sldMk cId="1556883112" sldId="420"/>
+            <ac:picMk id="5" creationId="{FF0E237D-5D34-4914-8F02-AAAC6CA41611}"/>
+          </ac:picMkLst>
+        </pc:picChg>
+      </pc:sldChg>
+    </pc:docChg>
+  </pc:docChgLst>
   <pc:docChgLst>
     <pc:chgData name="william a" userId="c66c7249b60d4ab2" providerId="LiveId" clId="{C66AD216-9848-45B9-A3E9-A9D5A59453FA}"/>
     <pc:docChg chg="undo redo custSel addSld delSld modSld sldOrd modMainMaster">
@@ -1374,1008 +2384,126 @@
     </pc:docChg>
   </pc:docChgLst>
   <pc:docChgLst>
-    <pc:chgData name="william a" userId="c66c7249b60d4ab2" providerId="LiveId" clId="{E43EA3F4-5CFF-4A8A-9561-5E0414B33ACD}"/>
-    <pc:docChg chg="undo custSel addSld delSld modSld sldOrd">
-      <pc:chgData name="william a" userId="c66c7249b60d4ab2" providerId="LiveId" clId="{E43EA3F4-5CFF-4A8A-9561-5E0414B33ACD}" dt="2019-06-29T15:49:00.993" v="4550"/>
+    <pc:chgData name="william a" userId="c66c7249b60d4ab2" providerId="LiveId" clId="{BADA0C79-E504-4993-B00D-9734B7A44D50}"/>
+    <pc:docChg chg="custSel addSld modSld">
+      <pc:chgData name="william a" userId="c66c7249b60d4ab2" providerId="LiveId" clId="{BADA0C79-E504-4993-B00D-9734B7A44D50}" dt="2019-10-10T17:05:31.412" v="330" actId="27636"/>
       <pc:docMkLst>
         <pc:docMk/>
       </pc:docMkLst>
       <pc:sldChg chg="modSp">
-        <pc:chgData name="william a" userId="c66c7249b60d4ab2" providerId="LiveId" clId="{E43EA3F4-5CFF-4A8A-9561-5E0414B33ACD}" dt="2019-06-29T02:37:30.903" v="1692" actId="20577"/>
+        <pc:chgData name="william a" userId="c66c7249b60d4ab2" providerId="LiveId" clId="{BADA0C79-E504-4993-B00D-9734B7A44D50}" dt="2019-10-10T17:05:31.412" v="330" actId="27636"/>
         <pc:sldMkLst>
           <pc:docMk/>
-          <pc:sldMk cId="0" sldId="259"/>
+          <pc:sldMk cId="1965489894" sldId="413"/>
         </pc:sldMkLst>
         <pc:spChg chg="mod">
-          <ac:chgData name="william a" userId="c66c7249b60d4ab2" providerId="LiveId" clId="{E43EA3F4-5CFF-4A8A-9561-5E0414B33ACD}" dt="2019-06-29T02:37:30.903" v="1692" actId="20577"/>
+          <ac:chgData name="william a" userId="c66c7249b60d4ab2" providerId="LiveId" clId="{BADA0C79-E504-4993-B00D-9734B7A44D50}" dt="2019-10-10T17:05:31.412" v="330" actId="27636"/>
           <ac:spMkLst>
             <pc:docMk/>
-            <pc:sldMk cId="0" sldId="259"/>
+            <pc:sldMk cId="1965489894" sldId="413"/>
+            <ac:spMk id="3" creationId="{00000000-0000-0000-0000-000000000000}"/>
+          </ac:spMkLst>
+        </pc:spChg>
+        <pc:spChg chg="mod">
+          <ac:chgData name="william a" userId="c66c7249b60d4ab2" providerId="LiveId" clId="{BADA0C79-E504-4993-B00D-9734B7A44D50}" dt="2019-10-10T17:05:31.412" v="330" actId="27636"/>
+          <ac:spMkLst>
+            <pc:docMk/>
+            <pc:sldMk cId="1965489894" sldId="413"/>
+            <ac:spMk id="4" creationId="{00000000-0000-0000-0000-000000000000}"/>
+          </ac:spMkLst>
+        </pc:spChg>
+        <pc:spChg chg="mod">
+          <ac:chgData name="william a" userId="c66c7249b60d4ab2" providerId="LiveId" clId="{BADA0C79-E504-4993-B00D-9734B7A44D50}" dt="2019-10-10T17:05:31.412" v="330" actId="27636"/>
+          <ac:spMkLst>
+            <pc:docMk/>
+            <pc:sldMk cId="1965489894" sldId="413"/>
             <ac:spMk id="5" creationId="{00000000-0000-0000-0000-000000000000}"/>
           </ac:spMkLst>
         </pc:spChg>
+        <pc:picChg chg="mod">
+          <ac:chgData name="william a" userId="c66c7249b60d4ab2" providerId="LiveId" clId="{BADA0C79-E504-4993-B00D-9734B7A44D50}" dt="2019-10-10T17:05:31.412" v="330" actId="27636"/>
+          <ac:picMkLst>
+            <pc:docMk/>
+            <pc:sldMk cId="1965489894" sldId="413"/>
+            <ac:picMk id="6" creationId="{2BAE5041-34BB-4C0C-A938-11DDAAA023DE}"/>
+          </ac:picMkLst>
+        </pc:picChg>
       </pc:sldChg>
-      <pc:sldChg chg="modAnim">
-        <pc:chgData name="william a" userId="c66c7249b60d4ab2" providerId="LiveId" clId="{E43EA3F4-5CFF-4A8A-9561-5E0414B33ACD}" dt="2019-06-29T15:49:00.993" v="4550"/>
+      <pc:sldChg chg="delSp modSp add">
+        <pc:chgData name="william a" userId="c66c7249b60d4ab2" providerId="LiveId" clId="{BADA0C79-E504-4993-B00D-9734B7A44D50}" dt="2019-10-10T17:04:47.845" v="312" actId="478"/>
         <pc:sldMkLst>
           <pc:docMk/>
-          <pc:sldMk cId="0" sldId="263"/>
-        </pc:sldMkLst>
-      </pc:sldChg>
-      <pc:sldChg chg="modSp">
-        <pc:chgData name="william a" userId="c66c7249b60d4ab2" providerId="LiveId" clId="{E43EA3F4-5CFF-4A8A-9561-5E0414B33ACD}" dt="2019-06-24T19:42:54.234" v="408" actId="20577"/>
-        <pc:sldMkLst>
-          <pc:docMk/>
-          <pc:sldMk cId="0" sldId="265"/>
+          <pc:sldMk cId="3388669171" sldId="424"/>
         </pc:sldMkLst>
         <pc:spChg chg="mod">
-          <ac:chgData name="william a" userId="c66c7249b60d4ab2" providerId="LiveId" clId="{E43EA3F4-5CFF-4A8A-9561-5E0414B33ACD}" dt="2019-06-24T19:42:54.234" v="408" actId="20577"/>
+          <ac:chgData name="william a" userId="c66c7249b60d4ab2" providerId="LiveId" clId="{BADA0C79-E504-4993-B00D-9734B7A44D50}" dt="2019-10-10T16:57:39.410" v="18" actId="20577"/>
           <ac:spMkLst>
             <pc:docMk/>
-            <pc:sldMk cId="0" sldId="265"/>
-            <ac:spMk id="3" creationId="{00000000-0000-0000-0000-000000000000}"/>
+            <pc:sldMk cId="3388669171" sldId="424"/>
+            <ac:spMk id="2" creationId="{700E7978-6161-4C1D-855C-6B6FCC522E49}"/>
+          </ac:spMkLst>
+        </pc:spChg>
+        <pc:spChg chg="del">
+          <ac:chgData name="william a" userId="c66c7249b60d4ab2" providerId="LiveId" clId="{BADA0C79-E504-4993-B00D-9734B7A44D50}" dt="2019-10-10T17:04:47.845" v="312" actId="478"/>
+          <ac:spMkLst>
+            <pc:docMk/>
+            <pc:sldMk cId="3388669171" sldId="424"/>
+            <ac:spMk id="3" creationId="{FC191990-97AE-42C5-8D38-E723EB3FF20C}"/>
           </ac:spMkLst>
         </pc:spChg>
       </pc:sldChg>
-      <pc:sldChg chg="modSp">
-        <pc:chgData name="william a" userId="c66c7249b60d4ab2" providerId="LiveId" clId="{E43EA3F4-5CFF-4A8A-9561-5E0414B33ACD}" dt="2019-06-29T03:38:26.350" v="4505" actId="27636"/>
+      <pc:sldChg chg="addSp delSp modSp add">
+        <pc:chgData name="william a" userId="c66c7249b60d4ab2" providerId="LiveId" clId="{BADA0C79-E504-4993-B00D-9734B7A44D50}" dt="2019-10-10T17:03:49.819" v="311" actId="113"/>
         <pc:sldMkLst>
           <pc:docMk/>
-          <pc:sldMk cId="0" sldId="266"/>
+          <pc:sldMk cId="1487812985" sldId="425"/>
         </pc:sldMkLst>
         <pc:spChg chg="mod">
-          <ac:chgData name="william a" userId="c66c7249b60d4ab2" providerId="LiveId" clId="{E43EA3F4-5CFF-4A8A-9561-5E0414B33ACD}" dt="2019-06-29T03:38:26.350" v="4505" actId="27636"/>
+          <ac:chgData name="william a" userId="c66c7249b60d4ab2" providerId="LiveId" clId="{BADA0C79-E504-4993-B00D-9734B7A44D50}" dt="2019-10-10T16:57:51.855" v="22" actId="20577"/>
           <ac:spMkLst>
             <pc:docMk/>
-            <pc:sldMk cId="0" sldId="266"/>
-            <ac:spMk id="3" creationId="{00000000-0000-0000-0000-000000000000}"/>
-          </ac:spMkLst>
-        </pc:spChg>
-      </pc:sldChg>
-      <pc:sldChg chg="modSp">
-        <pc:chgData name="william a" userId="c66c7249b60d4ab2" providerId="LiveId" clId="{E43EA3F4-5CFF-4A8A-9561-5E0414B33ACD}" dt="2019-06-29T03:21:06.142" v="3969" actId="20577"/>
-        <pc:sldMkLst>
-          <pc:docMk/>
-          <pc:sldMk cId="0" sldId="268"/>
-        </pc:sldMkLst>
-        <pc:spChg chg="mod">
-          <ac:chgData name="william a" userId="c66c7249b60d4ab2" providerId="LiveId" clId="{E43EA3F4-5CFF-4A8A-9561-5E0414B33ACD}" dt="2019-06-29T03:21:06.142" v="3969" actId="20577"/>
-          <ac:spMkLst>
-            <pc:docMk/>
-            <pc:sldMk cId="0" sldId="268"/>
-            <ac:spMk id="3" creationId="{00000000-0000-0000-0000-000000000000}"/>
-          </ac:spMkLst>
-        </pc:spChg>
-      </pc:sldChg>
-      <pc:sldChg chg="modSp del">
-        <pc:chgData name="william a" userId="c66c7249b60d4ab2" providerId="LiveId" clId="{E43EA3F4-5CFF-4A8A-9561-5E0414B33ACD}" dt="2019-06-29T02:52:01.794" v="2564" actId="2696"/>
-        <pc:sldMkLst>
-          <pc:docMk/>
-          <pc:sldMk cId="0" sldId="269"/>
-        </pc:sldMkLst>
-        <pc:spChg chg="mod">
-          <ac:chgData name="william a" userId="c66c7249b60d4ab2" providerId="LiveId" clId="{E43EA3F4-5CFF-4A8A-9561-5E0414B33ACD}" dt="2019-06-29T02:51:32.343" v="2541"/>
-          <ac:spMkLst>
-            <pc:docMk/>
-            <pc:sldMk cId="0" sldId="269"/>
-            <ac:spMk id="3" creationId="{00000000-0000-0000-0000-000000000000}"/>
-          </ac:spMkLst>
-        </pc:spChg>
-      </pc:sldChg>
-      <pc:sldChg chg="modSp">
-        <pc:chgData name="william a" userId="c66c7249b60d4ab2" providerId="LiveId" clId="{E43EA3F4-5CFF-4A8A-9561-5E0414B33ACD}" dt="2019-06-29T03:21:46.757" v="4037" actId="20577"/>
-        <pc:sldMkLst>
-          <pc:docMk/>
-          <pc:sldMk cId="0" sldId="270"/>
-        </pc:sldMkLst>
-        <pc:spChg chg="mod">
-          <ac:chgData name="william a" userId="c66c7249b60d4ab2" providerId="LiveId" clId="{E43EA3F4-5CFF-4A8A-9561-5E0414B33ACD}" dt="2019-06-29T03:21:46.757" v="4037" actId="20577"/>
-          <ac:spMkLst>
-            <pc:docMk/>
-            <pc:sldMk cId="0" sldId="270"/>
-            <ac:spMk id="3" creationId="{00000000-0000-0000-0000-000000000000}"/>
-          </ac:spMkLst>
-        </pc:spChg>
-      </pc:sldChg>
-      <pc:sldChg chg="modSp">
-        <pc:chgData name="william a" userId="c66c7249b60d4ab2" providerId="LiveId" clId="{E43EA3F4-5CFF-4A8A-9561-5E0414B33ACD}" dt="2019-06-29T03:22:16.749" v="4066" actId="20577"/>
-        <pc:sldMkLst>
-          <pc:docMk/>
-          <pc:sldMk cId="0" sldId="271"/>
-        </pc:sldMkLst>
-        <pc:spChg chg="mod">
-          <ac:chgData name="william a" userId="c66c7249b60d4ab2" providerId="LiveId" clId="{E43EA3F4-5CFF-4A8A-9561-5E0414B33ACD}" dt="2019-06-29T03:22:16.749" v="4066" actId="20577"/>
-          <ac:spMkLst>
-            <pc:docMk/>
-            <pc:sldMk cId="0" sldId="271"/>
-            <ac:spMk id="3" creationId="{00000000-0000-0000-0000-000000000000}"/>
-          </ac:spMkLst>
-        </pc:spChg>
-      </pc:sldChg>
-      <pc:sldChg chg="modSp">
-        <pc:chgData name="william a" userId="c66c7249b60d4ab2" providerId="LiveId" clId="{E43EA3F4-5CFF-4A8A-9561-5E0414B33ACD}" dt="2019-06-29T03:23:32.499" v="4181" actId="20577"/>
-        <pc:sldMkLst>
-          <pc:docMk/>
-          <pc:sldMk cId="0" sldId="272"/>
-        </pc:sldMkLst>
-        <pc:spChg chg="mod">
-          <ac:chgData name="william a" userId="c66c7249b60d4ab2" providerId="LiveId" clId="{E43EA3F4-5CFF-4A8A-9561-5E0414B33ACD}" dt="2019-06-29T03:23:32.499" v="4181" actId="20577"/>
-          <ac:spMkLst>
-            <pc:docMk/>
-            <pc:sldMk cId="0" sldId="272"/>
-            <ac:spMk id="3" creationId="{00000000-0000-0000-0000-000000000000}"/>
-          </ac:spMkLst>
-        </pc:spChg>
-      </pc:sldChg>
-      <pc:sldChg chg="modSp">
-        <pc:chgData name="william a" userId="c66c7249b60d4ab2" providerId="LiveId" clId="{E43EA3F4-5CFF-4A8A-9561-5E0414B33ACD}" dt="2019-06-24T19:06:32.463" v="0" actId="20577"/>
-        <pc:sldMkLst>
-          <pc:docMk/>
-          <pc:sldMk cId="0" sldId="275"/>
-        </pc:sldMkLst>
-        <pc:spChg chg="mod">
-          <ac:chgData name="william a" userId="c66c7249b60d4ab2" providerId="LiveId" clId="{E43EA3F4-5CFF-4A8A-9561-5E0414B33ACD}" dt="2019-06-24T19:06:32.463" v="0" actId="20577"/>
-          <ac:spMkLst>
-            <pc:docMk/>
-            <pc:sldMk cId="0" sldId="275"/>
-            <ac:spMk id="3" creationId="{00000000-0000-0000-0000-000000000000}"/>
-          </ac:spMkLst>
-        </pc:spChg>
-      </pc:sldChg>
-      <pc:sldChg chg="modSp">
-        <pc:chgData name="william a" userId="c66c7249b60d4ab2" providerId="LiveId" clId="{E43EA3F4-5CFF-4A8A-9561-5E0414B33ACD}" dt="2019-06-24T19:22:06.004" v="117" actId="6549"/>
-        <pc:sldMkLst>
-          <pc:docMk/>
-          <pc:sldMk cId="0" sldId="278"/>
-        </pc:sldMkLst>
-        <pc:spChg chg="mod">
-          <ac:chgData name="william a" userId="c66c7249b60d4ab2" providerId="LiveId" clId="{E43EA3F4-5CFF-4A8A-9561-5E0414B33ACD}" dt="2019-06-24T19:22:06.004" v="117" actId="6549"/>
-          <ac:spMkLst>
-            <pc:docMk/>
-            <pc:sldMk cId="0" sldId="278"/>
-            <ac:spMk id="3" creationId="{00000000-0000-0000-0000-000000000000}"/>
-          </ac:spMkLst>
-        </pc:spChg>
-      </pc:sldChg>
-      <pc:sldChg chg="modSp">
-        <pc:chgData name="william a" userId="c66c7249b60d4ab2" providerId="LiveId" clId="{E43EA3F4-5CFF-4A8A-9561-5E0414B33ACD}" dt="2019-06-29T02:54:33.919" v="2731" actId="20577"/>
-        <pc:sldMkLst>
-          <pc:docMk/>
-          <pc:sldMk cId="0" sldId="279"/>
-        </pc:sldMkLst>
-        <pc:spChg chg="mod">
-          <ac:chgData name="william a" userId="c66c7249b60d4ab2" providerId="LiveId" clId="{E43EA3F4-5CFF-4A8A-9561-5E0414B33ACD}" dt="2019-06-29T02:54:33.919" v="2731" actId="20577"/>
-          <ac:spMkLst>
-            <pc:docMk/>
-            <pc:sldMk cId="0" sldId="279"/>
-            <ac:spMk id="3" creationId="{00000000-0000-0000-0000-000000000000}"/>
-          </ac:spMkLst>
-        </pc:spChg>
-      </pc:sldChg>
-      <pc:sldChg chg="modSp">
-        <pc:chgData name="william a" userId="c66c7249b60d4ab2" providerId="LiveId" clId="{E43EA3F4-5CFF-4A8A-9561-5E0414B33ACD}" dt="2019-06-24T19:42:10.181" v="397" actId="403"/>
-        <pc:sldMkLst>
-          <pc:docMk/>
-          <pc:sldMk cId="0" sldId="280"/>
-        </pc:sldMkLst>
-        <pc:spChg chg="mod">
-          <ac:chgData name="william a" userId="c66c7249b60d4ab2" providerId="LiveId" clId="{E43EA3F4-5CFF-4A8A-9561-5E0414B33ACD}" dt="2019-06-24T19:42:10.181" v="397" actId="403"/>
-          <ac:spMkLst>
-            <pc:docMk/>
-            <pc:sldMk cId="0" sldId="280"/>
-            <ac:spMk id="3" creationId="{00000000-0000-0000-0000-000000000000}"/>
-          </ac:spMkLst>
-        </pc:spChg>
-      </pc:sldChg>
-      <pc:sldChg chg="addSp delSp modSp add del modTransition">
-        <pc:chgData name="william a" userId="c66c7249b60d4ab2" providerId="LiveId" clId="{E43EA3F4-5CFF-4A8A-9561-5E0414B33ACD}" dt="2019-06-24T20:12:54.850" v="1116"/>
-        <pc:sldMkLst>
-          <pc:docMk/>
-          <pc:sldMk cId="3735990624" sldId="285"/>
-        </pc:sldMkLst>
-        <pc:spChg chg="mod">
-          <ac:chgData name="william a" userId="c66c7249b60d4ab2" providerId="LiveId" clId="{E43EA3F4-5CFF-4A8A-9561-5E0414B33ACD}" dt="2019-06-24T20:07:36.897" v="960" actId="20577"/>
-          <ac:spMkLst>
-            <pc:docMk/>
-            <pc:sldMk cId="3735990624" sldId="285"/>
-            <ac:spMk id="2" creationId="{3A456A49-D9F1-4953-8152-0834928543C1}"/>
-          </ac:spMkLst>
-        </pc:spChg>
-        <pc:spChg chg="del ord">
-          <ac:chgData name="william a" userId="c66c7249b60d4ab2" providerId="LiveId" clId="{E43EA3F4-5CFF-4A8A-9561-5E0414B33ACD}" dt="2019-06-24T20:03:09.646" v="735" actId="478"/>
-          <ac:spMkLst>
-            <pc:docMk/>
-            <pc:sldMk cId="3735990624" sldId="285"/>
-            <ac:spMk id="4" creationId="{00000000-0000-0000-0000-000000000000}"/>
-          </ac:spMkLst>
-        </pc:spChg>
-        <pc:spChg chg="add del ord">
-          <ac:chgData name="william a" userId="c66c7249b60d4ab2" providerId="LiveId" clId="{E43EA3F4-5CFF-4A8A-9561-5E0414B33ACD}" dt="2019-06-24T20:02:28.766" v="723"/>
-          <ac:spMkLst>
-            <pc:docMk/>
-            <pc:sldMk cId="3735990624" sldId="285"/>
-            <ac:spMk id="5" creationId="{01E8506E-EEDD-4275-B082-80FB528E1A34}"/>
-          </ac:spMkLst>
-        </pc:spChg>
-        <pc:spChg chg="add del mod">
-          <ac:chgData name="william a" userId="c66c7249b60d4ab2" providerId="LiveId" clId="{E43EA3F4-5CFF-4A8A-9561-5E0414B33ACD}" dt="2019-06-24T20:03:34.537" v="747" actId="478"/>
-          <ac:spMkLst>
-            <pc:docMk/>
-            <pc:sldMk cId="3735990624" sldId="285"/>
-            <ac:spMk id="5" creationId="{3D418325-DEB8-469B-81CB-51A987AD0608}"/>
-          </ac:spMkLst>
-        </pc:spChg>
-        <pc:spChg chg="add del ord">
-          <ac:chgData name="william a" userId="c66c7249b60d4ab2" providerId="LiveId" clId="{E43EA3F4-5CFF-4A8A-9561-5E0414B33ACD}" dt="2019-06-24T20:03:33.640" v="746" actId="478"/>
-          <ac:spMkLst>
-            <pc:docMk/>
-            <pc:sldMk cId="3735990624" sldId="285"/>
-            <ac:spMk id="6" creationId="{09AD0167-1569-4EB7-8D28-11961AE88B25}"/>
-          </ac:spMkLst>
-        </pc:spChg>
-        <pc:spChg chg="add del">
-          <ac:chgData name="william a" userId="c66c7249b60d4ab2" providerId="LiveId" clId="{E43EA3F4-5CFF-4A8A-9561-5E0414B33ACD}" dt="2019-06-24T20:03:31.497" v="745"/>
-          <ac:spMkLst>
-            <pc:docMk/>
-            <pc:sldMk cId="3735990624" sldId="285"/>
-            <ac:spMk id="7" creationId="{17B9027F-896F-4934-8B5E-A8C916DE6601}"/>
-          </ac:spMkLst>
-        </pc:spChg>
-        <pc:spChg chg="add mod">
-          <ac:chgData name="william a" userId="c66c7249b60d4ab2" providerId="LiveId" clId="{E43EA3F4-5CFF-4A8A-9561-5E0414B33ACD}" dt="2019-06-24T20:12:54.850" v="1116"/>
-          <ac:spMkLst>
-            <pc:docMk/>
-            <pc:sldMk cId="3735990624" sldId="285"/>
-            <ac:spMk id="8" creationId="{F09ACA30-36CC-402B-AF9D-A02BACFBC203}"/>
-          </ac:spMkLst>
-        </pc:spChg>
-      </pc:sldChg>
-      <pc:sldChg chg="modTransition">
-        <pc:chgData name="william a" userId="c66c7249b60d4ab2" providerId="LiveId" clId="{E43EA3F4-5CFF-4A8A-9561-5E0414B33ACD}" dt="2019-06-24T20:11:39.824" v="961"/>
-        <pc:sldMkLst>
-          <pc:docMk/>
-          <pc:sldMk cId="0" sldId="289"/>
-        </pc:sldMkLst>
-      </pc:sldChg>
-      <pc:sldChg chg="modSp ord">
-        <pc:chgData name="william a" userId="c66c7249b60d4ab2" providerId="LiveId" clId="{E43EA3F4-5CFF-4A8A-9561-5E0414B33ACD}" dt="2019-06-29T03:31:39.088" v="4349" actId="27636"/>
-        <pc:sldMkLst>
-          <pc:docMk/>
-          <pc:sldMk cId="0" sldId="291"/>
-        </pc:sldMkLst>
-        <pc:spChg chg="mod">
-          <ac:chgData name="william a" userId="c66c7249b60d4ab2" providerId="LiveId" clId="{E43EA3F4-5CFF-4A8A-9561-5E0414B33ACD}" dt="2019-06-29T03:31:39.088" v="4349" actId="27636"/>
-          <ac:spMkLst>
-            <pc:docMk/>
-            <pc:sldMk cId="0" sldId="291"/>
-            <ac:spMk id="3" creationId="{00000000-0000-0000-0000-000000000000}"/>
-          </ac:spMkLst>
-        </pc:spChg>
-      </pc:sldChg>
-      <pc:sldChg chg="delSp modSp">
-        <pc:chgData name="william a" userId="c66c7249b60d4ab2" providerId="LiveId" clId="{E43EA3F4-5CFF-4A8A-9561-5E0414B33ACD}" dt="2019-06-29T03:29:35.800" v="4263" actId="6549"/>
-        <pc:sldMkLst>
-          <pc:docMk/>
-          <pc:sldMk cId="0" sldId="292"/>
-        </pc:sldMkLst>
-        <pc:spChg chg="mod">
-          <ac:chgData name="william a" userId="c66c7249b60d4ab2" providerId="LiveId" clId="{E43EA3F4-5CFF-4A8A-9561-5E0414B33ACD}" dt="2019-06-29T03:29:35.800" v="4263" actId="6549"/>
-          <ac:spMkLst>
-            <pc:docMk/>
-            <pc:sldMk cId="0" sldId="292"/>
-            <ac:spMk id="3" creationId="{00000000-0000-0000-0000-000000000000}"/>
-          </ac:spMkLst>
-        </pc:spChg>
-        <pc:spChg chg="del">
-          <ac:chgData name="william a" userId="c66c7249b60d4ab2" providerId="LiveId" clId="{E43EA3F4-5CFF-4A8A-9561-5E0414B33ACD}" dt="2019-06-24T20:02:35.073" v="727"/>
-          <ac:spMkLst>
-            <pc:docMk/>
-            <pc:sldMk cId="0" sldId="292"/>
-            <ac:spMk id="5" creationId="{5D5E73BF-C273-4462-B680-A0848E61409B}"/>
-          </ac:spMkLst>
-        </pc:spChg>
-      </pc:sldChg>
-      <pc:sldChg chg="addSp modSp modTransition">
-        <pc:chgData name="william a" userId="c66c7249b60d4ab2" providerId="LiveId" clId="{E43EA3F4-5CFF-4A8A-9561-5E0414B33ACD}" dt="2019-06-24T20:12:36.040" v="1094"/>
-        <pc:sldMkLst>
-          <pc:docMk/>
-          <pc:sldMk cId="0" sldId="293"/>
-        </pc:sldMkLst>
-        <pc:spChg chg="add mod">
-          <ac:chgData name="william a" userId="c66c7249b60d4ab2" providerId="LiveId" clId="{E43EA3F4-5CFF-4A8A-9561-5E0414B33ACD}" dt="2019-06-24T19:44:36.348" v="446" actId="1076"/>
-          <ac:spMkLst>
-            <pc:docMk/>
-            <pc:sldMk cId="0" sldId="293"/>
-            <ac:spMk id="3" creationId="{B42A7BDD-03AA-4C4E-8631-4A4395668282}"/>
-          </ac:spMkLst>
-        </pc:spChg>
-        <pc:spChg chg="mod">
-          <ac:chgData name="william a" userId="c66c7249b60d4ab2" providerId="LiveId" clId="{E43EA3F4-5CFF-4A8A-9561-5E0414B33ACD}" dt="2019-06-24T19:44:24.678" v="442" actId="20577"/>
-          <ac:spMkLst>
-            <pc:docMk/>
-            <pc:sldMk cId="0" sldId="293"/>
-            <ac:spMk id="5" creationId="{00000000-0000-0000-0000-000000000000}"/>
-          </ac:spMkLst>
-        </pc:spChg>
-      </pc:sldChg>
-      <pc:sldChg chg="modTransition">
-        <pc:chgData name="william a" userId="c66c7249b60d4ab2" providerId="LiveId" clId="{E43EA3F4-5CFF-4A8A-9561-5E0414B33ACD}" dt="2019-06-29T03:29:58.440" v="4264"/>
-        <pc:sldMkLst>
-          <pc:docMk/>
-          <pc:sldMk cId="0" sldId="294"/>
-        </pc:sldMkLst>
-      </pc:sldChg>
-      <pc:sldChg chg="modSp">
-        <pc:chgData name="william a" userId="c66c7249b60d4ab2" providerId="LiveId" clId="{E43EA3F4-5CFF-4A8A-9561-5E0414B33ACD}" dt="2019-06-24T19:43:06.712" v="417" actId="20577"/>
-        <pc:sldMkLst>
-          <pc:docMk/>
-          <pc:sldMk cId="0" sldId="295"/>
-        </pc:sldMkLst>
-        <pc:spChg chg="mod">
-          <ac:chgData name="william a" userId="c66c7249b60d4ab2" providerId="LiveId" clId="{E43EA3F4-5CFF-4A8A-9561-5E0414B33ACD}" dt="2019-06-24T19:43:06.712" v="417" actId="20577"/>
-          <ac:spMkLst>
-            <pc:docMk/>
-            <pc:sldMk cId="0" sldId="295"/>
-            <ac:spMk id="3" creationId="{00000000-0000-0000-0000-000000000000}"/>
-          </ac:spMkLst>
-        </pc:spChg>
-      </pc:sldChg>
-      <pc:sldChg chg="modSp modAnim">
-        <pc:chgData name="william a" userId="c66c7249b60d4ab2" providerId="LiveId" clId="{E43EA3F4-5CFF-4A8A-9561-5E0414B33ACD}" dt="2019-06-29T03:38:10.258" v="4501" actId="6549"/>
-        <pc:sldMkLst>
-          <pc:docMk/>
-          <pc:sldMk cId="0" sldId="296"/>
-        </pc:sldMkLst>
-        <pc:spChg chg="mod">
-          <ac:chgData name="william a" userId="c66c7249b60d4ab2" providerId="LiveId" clId="{E43EA3F4-5CFF-4A8A-9561-5E0414B33ACD}" dt="2019-06-29T03:38:10.258" v="4501" actId="6549"/>
-          <ac:spMkLst>
-            <pc:docMk/>
-            <pc:sldMk cId="0" sldId="296"/>
-            <ac:spMk id="3" creationId="{00000000-0000-0000-0000-000000000000}"/>
-          </ac:spMkLst>
-        </pc:spChg>
-      </pc:sldChg>
-      <pc:sldChg chg="modSp">
-        <pc:chgData name="william a" userId="c66c7249b60d4ab2" providerId="LiveId" clId="{E43EA3F4-5CFF-4A8A-9561-5E0414B33ACD}" dt="2019-06-29T02:50:01.504" v="2508" actId="20577"/>
-        <pc:sldMkLst>
-          <pc:docMk/>
-          <pc:sldMk cId="0" sldId="297"/>
-        </pc:sldMkLst>
-        <pc:spChg chg="mod">
-          <ac:chgData name="william a" userId="c66c7249b60d4ab2" providerId="LiveId" clId="{E43EA3F4-5CFF-4A8A-9561-5E0414B33ACD}" dt="2019-06-29T02:50:01.504" v="2508" actId="20577"/>
-          <ac:spMkLst>
-            <pc:docMk/>
-            <pc:sldMk cId="0" sldId="297"/>
-            <ac:spMk id="3" creationId="{00000000-0000-0000-0000-000000000000}"/>
-          </ac:spMkLst>
-        </pc:spChg>
-      </pc:sldChg>
-      <pc:sldChg chg="delSp del modAnim">
-        <pc:chgData name="william a" userId="c66c7249b60d4ab2" providerId="LiveId" clId="{E43EA3F4-5CFF-4A8A-9561-5E0414B33ACD}" dt="2019-06-29T03:12:41.379" v="3313" actId="2696"/>
-        <pc:sldMkLst>
-          <pc:docMk/>
-          <pc:sldMk cId="0" sldId="298"/>
-        </pc:sldMkLst>
-        <pc:picChg chg="del">
-          <ac:chgData name="william a" userId="c66c7249b60d4ab2" providerId="LiveId" clId="{E43EA3F4-5CFF-4A8A-9561-5E0414B33ACD}" dt="2019-06-29T03:12:37.773" v="3312"/>
-          <ac:picMkLst>
-            <pc:docMk/>
-            <pc:sldMk cId="0" sldId="298"/>
-            <ac:picMk id="1030" creationId="{00000000-0000-0000-0000-000000000000}"/>
-          </ac:picMkLst>
-        </pc:picChg>
-      </pc:sldChg>
-      <pc:sldChg chg="modSp">
-        <pc:chgData name="william a" userId="c66c7249b60d4ab2" providerId="LiveId" clId="{E43EA3F4-5CFF-4A8A-9561-5E0414B33ACD}" dt="2019-06-29T03:36:40.126" v="4492" actId="403"/>
-        <pc:sldMkLst>
-          <pc:docMk/>
-          <pc:sldMk cId="2095978093" sldId="307"/>
-        </pc:sldMkLst>
-        <pc:spChg chg="mod">
-          <ac:chgData name="william a" userId="c66c7249b60d4ab2" providerId="LiveId" clId="{E43EA3F4-5CFF-4A8A-9561-5E0414B33ACD}" dt="2019-06-29T03:36:40.126" v="4492" actId="403"/>
-          <ac:spMkLst>
-            <pc:docMk/>
-            <pc:sldMk cId="2095978093" sldId="307"/>
-            <ac:spMk id="3" creationId="{00000000-0000-0000-0000-000000000000}"/>
-          </ac:spMkLst>
-        </pc:spChg>
-      </pc:sldChg>
-      <pc:sldChg chg="modSp">
-        <pc:chgData name="william a" userId="c66c7249b60d4ab2" providerId="LiveId" clId="{E43EA3F4-5CFF-4A8A-9561-5E0414B33ACD}" dt="2019-06-29T03:28:05.824" v="4205" actId="20577"/>
-        <pc:sldMkLst>
-          <pc:docMk/>
-          <pc:sldMk cId="4142047571" sldId="317"/>
-        </pc:sldMkLst>
-        <pc:spChg chg="mod">
-          <ac:chgData name="william a" userId="c66c7249b60d4ab2" providerId="LiveId" clId="{E43EA3F4-5CFF-4A8A-9561-5E0414B33ACD}" dt="2019-06-29T03:28:05.824" v="4205" actId="20577"/>
-          <ac:spMkLst>
-            <pc:docMk/>
-            <pc:sldMk cId="4142047571" sldId="317"/>
-            <ac:spMk id="3" creationId="{00000000-0000-0000-0000-000000000000}"/>
-          </ac:spMkLst>
-        </pc:spChg>
-      </pc:sldChg>
-      <pc:sldChg chg="modSp ord">
-        <pc:chgData name="william a" userId="c66c7249b60d4ab2" providerId="LiveId" clId="{E43EA3F4-5CFF-4A8A-9561-5E0414B33ACD}" dt="2019-06-24T20:13:11.857" v="1134" actId="20577"/>
-        <pc:sldMkLst>
-          <pc:docMk/>
-          <pc:sldMk cId="1369847391" sldId="318"/>
-        </pc:sldMkLst>
-        <pc:spChg chg="mod">
-          <ac:chgData name="william a" userId="c66c7249b60d4ab2" providerId="LiveId" clId="{E43EA3F4-5CFF-4A8A-9561-5E0414B33ACD}" dt="2019-06-24T20:13:11.857" v="1134" actId="20577"/>
-          <ac:spMkLst>
-            <pc:docMk/>
-            <pc:sldMk cId="1369847391" sldId="318"/>
+            <pc:sldMk cId="1487812985" sldId="425"/>
             <ac:spMk id="2" creationId="{00000000-0000-0000-0000-000000000000}"/>
           </ac:spMkLst>
         </pc:spChg>
         <pc:spChg chg="mod">
-          <ac:chgData name="william a" userId="c66c7249b60d4ab2" providerId="LiveId" clId="{E43EA3F4-5CFF-4A8A-9561-5E0414B33ACD}" dt="2019-06-24T20:00:38.176" v="568" actId="20577"/>
+          <ac:chgData name="william a" userId="c66c7249b60d4ab2" providerId="LiveId" clId="{BADA0C79-E504-4993-B00D-9734B7A44D50}" dt="2019-10-10T17:03:49.819" v="311" actId="113"/>
           <ac:spMkLst>
             <pc:docMk/>
-            <pc:sldMk cId="1369847391" sldId="318"/>
+            <pc:sldMk cId="1487812985" sldId="425"/>
             <ac:spMk id="3" creationId="{00000000-0000-0000-0000-000000000000}"/>
           </ac:spMkLst>
         </pc:spChg>
-      </pc:sldChg>
-      <pc:sldChg chg="modSp modTransition">
-        <pc:chgData name="william a" userId="c66c7249b60d4ab2" providerId="LiveId" clId="{E43EA3F4-5CFF-4A8A-9561-5E0414B33ACD}" dt="2019-06-24T19:07:17.726" v="2"/>
-        <pc:sldMkLst>
-          <pc:docMk/>
-          <pc:sldMk cId="3238583444" sldId="323"/>
-        </pc:sldMkLst>
-        <pc:spChg chg="mod">
-          <ac:chgData name="william a" userId="c66c7249b60d4ab2" providerId="LiveId" clId="{E43EA3F4-5CFF-4A8A-9561-5E0414B33ACD}" dt="2019-06-24T19:07:12.197" v="1" actId="33524"/>
-          <ac:spMkLst>
-            <pc:docMk/>
-            <pc:sldMk cId="3238583444" sldId="323"/>
-            <ac:spMk id="2" creationId="{00000000-0000-0000-0000-000000000000}"/>
-          </ac:spMkLst>
-        </pc:spChg>
-      </pc:sldChg>
-      <pc:sldChg chg="modSp">
-        <pc:chgData name="william a" userId="c66c7249b60d4ab2" providerId="LiveId" clId="{E43EA3F4-5CFF-4A8A-9561-5E0414B33ACD}" dt="2019-06-24T19:42:31.524" v="405" actId="20577"/>
-        <pc:sldMkLst>
-          <pc:docMk/>
-          <pc:sldMk cId="3798850818" sldId="324"/>
-        </pc:sldMkLst>
-        <pc:spChg chg="mod">
-          <ac:chgData name="william a" userId="c66c7249b60d4ab2" providerId="LiveId" clId="{E43EA3F4-5CFF-4A8A-9561-5E0414B33ACD}" dt="2019-06-24T19:42:31.524" v="405" actId="20577"/>
-          <ac:spMkLst>
-            <pc:docMk/>
-            <pc:sldMk cId="3798850818" sldId="324"/>
-            <ac:spMk id="3" creationId="{00000000-0000-0000-0000-000000000000}"/>
-          </ac:spMkLst>
-        </pc:spChg>
-      </pc:sldChg>
-      <pc:sldChg chg="modSp ord">
-        <pc:chgData name="william a" userId="c66c7249b60d4ab2" providerId="LiveId" clId="{E43EA3F4-5CFF-4A8A-9561-5E0414B33ACD}" dt="2019-06-29T03:17:09.250" v="3611"/>
-        <pc:sldMkLst>
-          <pc:docMk/>
-          <pc:sldMk cId="3647655776" sldId="326"/>
-        </pc:sldMkLst>
-        <pc:spChg chg="mod">
-          <ac:chgData name="william a" userId="c66c7249b60d4ab2" providerId="LiveId" clId="{E43EA3F4-5CFF-4A8A-9561-5E0414B33ACD}" dt="2019-06-29T03:16:55.869" v="3608" actId="20577"/>
-          <ac:spMkLst>
-            <pc:docMk/>
-            <pc:sldMk cId="3647655776" sldId="326"/>
-            <ac:spMk id="2" creationId="{3A456A49-D9F1-4953-8152-0834928543C1}"/>
-          </ac:spMkLst>
-        </pc:spChg>
-      </pc:sldChg>
-      <pc:sldChg chg="addSp delSp modSp ord">
-        <pc:chgData name="william a" userId="c66c7249b60d4ab2" providerId="LiveId" clId="{E43EA3F4-5CFF-4A8A-9561-5E0414B33ACD}" dt="2019-06-29T03:25:36.873" v="4195" actId="14100"/>
-        <pc:sldMkLst>
-          <pc:docMk/>
-          <pc:sldMk cId="2539014857" sldId="327"/>
-        </pc:sldMkLst>
-        <pc:spChg chg="mod">
-          <ac:chgData name="william a" userId="c66c7249b60d4ab2" providerId="LiveId" clId="{E43EA3F4-5CFF-4A8A-9561-5E0414B33ACD}" dt="2019-06-29T03:24:00.293" v="4191" actId="20577"/>
-          <ac:spMkLst>
-            <pc:docMk/>
-            <pc:sldMk cId="2539014857" sldId="327"/>
-            <ac:spMk id="2" creationId="{3A456A49-D9F1-4953-8152-0834928543C1}"/>
-          </ac:spMkLst>
-        </pc:spChg>
-        <pc:picChg chg="del">
-          <ac:chgData name="william a" userId="c66c7249b60d4ab2" providerId="LiveId" clId="{E43EA3F4-5CFF-4A8A-9561-5E0414B33ACD}" dt="2019-06-29T03:25:28.197" v="4192" actId="478"/>
+        <pc:picChg chg="add del">
+          <ac:chgData name="william a" userId="c66c7249b60d4ab2" providerId="LiveId" clId="{BADA0C79-E504-4993-B00D-9734B7A44D50}" dt="2019-10-10T16:58:27.941" v="24"/>
           <ac:picMkLst>
             <pc:docMk/>
-            <pc:sldMk cId="2539014857" sldId="327"/>
-            <ac:picMk id="3" creationId="{3E554B8E-F21B-4143-BA9B-C2C52E093A35}"/>
+            <pc:sldMk cId="1487812985" sldId="425"/>
+            <ac:picMk id="4" creationId="{AEB86BEF-56BF-47F8-A4B0-16A60C8A2B91}"/>
+          </ac:picMkLst>
+        </pc:picChg>
+        <pc:picChg chg="add del">
+          <ac:chgData name="william a" userId="c66c7249b60d4ab2" providerId="LiveId" clId="{BADA0C79-E504-4993-B00D-9734B7A44D50}" dt="2019-10-10T16:58:47.814" v="76"/>
+          <ac:picMkLst>
+            <pc:docMk/>
+            <pc:sldMk cId="1487812985" sldId="425"/>
+            <ac:picMk id="5" creationId="{E7D4B14F-998F-4167-A50A-F86BCBF7B196}"/>
           </ac:picMkLst>
         </pc:picChg>
         <pc:picChg chg="add mod">
-          <ac:chgData name="william a" userId="c66c7249b60d4ab2" providerId="LiveId" clId="{E43EA3F4-5CFF-4A8A-9561-5E0414B33ACD}" dt="2019-06-29T03:25:36.873" v="4195" actId="14100"/>
+          <ac:chgData name="william a" userId="c66c7249b60d4ab2" providerId="LiveId" clId="{BADA0C79-E504-4993-B00D-9734B7A44D50}" dt="2019-10-10T17:03:28.151" v="277" actId="14100"/>
           <ac:picMkLst>
             <pc:docMk/>
-            <pc:sldMk cId="2539014857" sldId="327"/>
-            <ac:picMk id="5" creationId="{75201CCD-63FE-4213-A177-424B54419BC3}"/>
+            <pc:sldMk cId="1487812985" sldId="425"/>
+            <ac:picMk id="1026" creationId="{EC7CCFEC-7540-41C8-A24C-D79B0AEDD4AE}"/>
           </ac:picMkLst>
         </pc:picChg>
-      </pc:sldChg>
-      <pc:sldChg chg="modSp">
-        <pc:chgData name="william a" userId="c66c7249b60d4ab2" providerId="LiveId" clId="{E43EA3F4-5CFF-4A8A-9561-5E0414B33ACD}" dt="2019-06-29T15:45:18.693" v="4528" actId="1036"/>
-        <pc:sldMkLst>
-          <pc:docMk/>
-          <pc:sldMk cId="2243704929" sldId="328"/>
-        </pc:sldMkLst>
-        <pc:spChg chg="mod">
-          <ac:chgData name="william a" userId="c66c7249b60d4ab2" providerId="LiveId" clId="{E43EA3F4-5CFF-4A8A-9561-5E0414B33ACD}" dt="2019-06-29T15:45:18.693" v="4528" actId="1036"/>
-          <ac:spMkLst>
-            <pc:docMk/>
-            <pc:sldMk cId="2243704929" sldId="328"/>
-            <ac:spMk id="3" creationId="{00000000-0000-0000-0000-000000000000}"/>
-          </ac:spMkLst>
-        </pc:spChg>
-      </pc:sldChg>
-      <pc:sldChg chg="modSp">
-        <pc:chgData name="william a" userId="c66c7249b60d4ab2" providerId="LiveId" clId="{E43EA3F4-5CFF-4A8A-9561-5E0414B33ACD}" dt="2019-06-24T19:41:20.210" v="386" actId="1076"/>
-        <pc:sldMkLst>
-          <pc:docMk/>
-          <pc:sldMk cId="2451175654" sldId="329"/>
-        </pc:sldMkLst>
-        <pc:spChg chg="mod">
-          <ac:chgData name="william a" userId="c66c7249b60d4ab2" providerId="LiveId" clId="{E43EA3F4-5CFF-4A8A-9561-5E0414B33ACD}" dt="2019-06-24T19:41:17.927" v="385" actId="27636"/>
-          <ac:spMkLst>
-            <pc:docMk/>
-            <pc:sldMk cId="2451175654" sldId="329"/>
-            <ac:spMk id="3" creationId="{00000000-0000-0000-0000-000000000000}"/>
-          </ac:spMkLst>
-        </pc:spChg>
-        <pc:picChg chg="mod">
-          <ac:chgData name="william a" userId="c66c7249b60d4ab2" providerId="LiveId" clId="{E43EA3F4-5CFF-4A8A-9561-5E0414B33ACD}" dt="2019-06-24T19:41:20.210" v="386" actId="1076"/>
+        <pc:picChg chg="add mod">
+          <ac:chgData name="william a" userId="c66c7249b60d4ab2" providerId="LiveId" clId="{BADA0C79-E504-4993-B00D-9734B7A44D50}" dt="2019-10-10T17:03:31.946" v="278" actId="1076"/>
           <ac:picMkLst>
             <pc:docMk/>
-            <pc:sldMk cId="2451175654" sldId="329"/>
-            <ac:picMk id="4" creationId="{00000000-0000-0000-0000-000000000000}"/>
-          </ac:picMkLst>
-        </pc:picChg>
-      </pc:sldChg>
-      <pc:sldChg chg="add del modTransition">
-        <pc:chgData name="william a" userId="c66c7249b60d4ab2" providerId="LiveId" clId="{E43EA3F4-5CFF-4A8A-9561-5E0414B33ACD}" dt="2019-06-24T19:41:41.814" v="390"/>
-        <pc:sldMkLst>
-          <pc:docMk/>
-          <pc:sldMk cId="4135181844" sldId="333"/>
-        </pc:sldMkLst>
-      </pc:sldChg>
-      <pc:sldChg chg="modSp">
-        <pc:chgData name="william a" userId="c66c7249b60d4ab2" providerId="LiveId" clId="{E43EA3F4-5CFF-4A8A-9561-5E0414B33ACD}" dt="2019-06-29T03:26:39.640" v="4200" actId="6549"/>
-        <pc:sldMkLst>
-          <pc:docMk/>
-          <pc:sldMk cId="2906491736" sldId="336"/>
-        </pc:sldMkLst>
-        <pc:spChg chg="mod">
-          <ac:chgData name="william a" userId="c66c7249b60d4ab2" providerId="LiveId" clId="{E43EA3F4-5CFF-4A8A-9561-5E0414B33ACD}" dt="2019-06-29T03:26:39.640" v="4200" actId="6549"/>
-          <ac:spMkLst>
-            <pc:docMk/>
-            <pc:sldMk cId="2906491736" sldId="336"/>
-            <ac:spMk id="9" creationId="{D909863E-BC8D-42CC-B70A-1CA3DE56567F}"/>
-          </ac:spMkLst>
-        </pc:spChg>
-      </pc:sldChg>
-      <pc:sldChg chg="modSp modAnim">
-        <pc:chgData name="william a" userId="c66c7249b60d4ab2" providerId="LiveId" clId="{E43EA3F4-5CFF-4A8A-9561-5E0414B33ACD}" dt="2019-06-29T15:47:35.288" v="4545"/>
-        <pc:sldMkLst>
-          <pc:docMk/>
-          <pc:sldMk cId="2254391894" sldId="338"/>
-        </pc:sldMkLst>
-        <pc:spChg chg="mod">
-          <ac:chgData name="william a" userId="c66c7249b60d4ab2" providerId="LiveId" clId="{E43EA3F4-5CFF-4A8A-9561-5E0414B33ACD}" dt="2019-06-29T15:47:18.984" v="4544" actId="12"/>
-          <ac:spMkLst>
-            <pc:docMk/>
-            <pc:sldMk cId="2254391894" sldId="338"/>
-            <ac:spMk id="2" creationId="{00000000-0000-0000-0000-000000000000}"/>
-          </ac:spMkLst>
-        </pc:spChg>
-      </pc:sldChg>
-      <pc:sldChg chg="modSp ord">
-        <pc:chgData name="william a" userId="c66c7249b60d4ab2" providerId="LiveId" clId="{E43EA3F4-5CFF-4A8A-9561-5E0414B33ACD}" dt="2019-06-29T15:46:59.703" v="4543"/>
-        <pc:sldMkLst>
-          <pc:docMk/>
-          <pc:sldMk cId="3917590187" sldId="343"/>
-        </pc:sldMkLst>
-        <pc:spChg chg="mod">
-          <ac:chgData name="william a" userId="c66c7249b60d4ab2" providerId="LiveId" clId="{E43EA3F4-5CFF-4A8A-9561-5E0414B33ACD}" dt="2019-06-24T19:54:31.049" v="545" actId="27636"/>
-          <ac:spMkLst>
-            <pc:docMk/>
-            <pc:sldMk cId="3917590187" sldId="343"/>
-            <ac:spMk id="3" creationId="{00000000-0000-0000-0000-000000000000}"/>
-          </ac:spMkLst>
-        </pc:spChg>
-      </pc:sldChg>
-      <pc:sldChg chg="addSp delSp modSp modAnim">
-        <pc:chgData name="william a" userId="c66c7249b60d4ab2" providerId="LiveId" clId="{E43EA3F4-5CFF-4A8A-9561-5E0414B33ACD}" dt="2019-06-29T15:48:48.780" v="4549"/>
-        <pc:sldMkLst>
-          <pc:docMk/>
-          <pc:sldMk cId="871226382" sldId="345"/>
-        </pc:sldMkLst>
-        <pc:spChg chg="mod">
-          <ac:chgData name="william a" userId="c66c7249b60d4ab2" providerId="LiveId" clId="{E43EA3F4-5CFF-4A8A-9561-5E0414B33ACD}" dt="2019-06-24T19:45:47.126" v="467" actId="6549"/>
-          <ac:spMkLst>
-            <pc:docMk/>
-            <pc:sldMk cId="871226382" sldId="345"/>
-            <ac:spMk id="3" creationId="{00000000-0000-0000-0000-000000000000}"/>
-          </ac:spMkLst>
-        </pc:spChg>
-        <pc:spChg chg="del mod">
-          <ac:chgData name="william a" userId="c66c7249b60d4ab2" providerId="LiveId" clId="{E43EA3F4-5CFF-4A8A-9561-5E0414B33ACD}" dt="2019-06-24T19:54:12.042" v="531" actId="478"/>
-          <ac:spMkLst>
-            <pc:docMk/>
-            <pc:sldMk cId="871226382" sldId="345"/>
-            <ac:spMk id="4" creationId="{00000000-0000-0000-0000-000000000000}"/>
-          </ac:spMkLst>
-        </pc:spChg>
-        <pc:spChg chg="mod">
-          <ac:chgData name="william a" userId="c66c7249b60d4ab2" providerId="LiveId" clId="{E43EA3F4-5CFF-4A8A-9561-5E0414B33ACD}" dt="2019-06-24T19:54:08.171" v="530" actId="1036"/>
-          <ac:spMkLst>
-            <pc:docMk/>
-            <pc:sldMk cId="871226382" sldId="345"/>
-            <ac:spMk id="7" creationId="{00000000-0000-0000-0000-000000000000}"/>
-          </ac:spMkLst>
-        </pc:spChg>
-        <pc:spChg chg="mod">
-          <ac:chgData name="william a" userId="c66c7249b60d4ab2" providerId="LiveId" clId="{E43EA3F4-5CFF-4A8A-9561-5E0414B33ACD}" dt="2019-06-24T19:54:08.171" v="530" actId="1036"/>
-          <ac:spMkLst>
-            <pc:docMk/>
-            <pc:sldMk cId="871226382" sldId="345"/>
-            <ac:spMk id="13" creationId="{80A4B527-055A-42D8-B8E5-34D0A6763AFC}"/>
-          </ac:spMkLst>
-        </pc:spChg>
-        <pc:picChg chg="del mod modCrop">
-          <ac:chgData name="william a" userId="c66c7249b60d4ab2" providerId="LiveId" clId="{E43EA3F4-5CFF-4A8A-9561-5E0414B33ACD}" dt="2019-06-24T19:48:13.384" v="489" actId="478"/>
-          <ac:picMkLst>
-            <pc:docMk/>
-            <pc:sldMk cId="871226382" sldId="345"/>
-            <ac:picMk id="5" creationId="{00000000-0000-0000-0000-000000000000}"/>
-          </ac:picMkLst>
-        </pc:picChg>
-        <pc:picChg chg="add del mod">
-          <ac:chgData name="william a" userId="c66c7249b60d4ab2" providerId="LiveId" clId="{E43EA3F4-5CFF-4A8A-9561-5E0414B33ACD}" dt="2019-06-24T19:48:18.072" v="493"/>
-          <ac:picMkLst>
-            <pc:docMk/>
-            <pc:sldMk cId="871226382" sldId="345"/>
-            <ac:picMk id="6" creationId="{9E96FD13-B5FF-43C7-A170-AB3A4A483A11}"/>
-          </ac:picMkLst>
-        </pc:picChg>
-        <pc:picChg chg="add mod ord">
-          <ac:chgData name="william a" userId="c66c7249b60d4ab2" providerId="LiveId" clId="{E43EA3F4-5CFF-4A8A-9561-5E0414B33ACD}" dt="2019-06-24T19:54:08.171" v="530" actId="1036"/>
-          <ac:picMkLst>
-            <pc:docMk/>
-            <pc:sldMk cId="871226382" sldId="345"/>
-            <ac:picMk id="8" creationId="{E88376E5-3143-47A1-B90A-DC5845D8FEA2}"/>
-          </ac:picMkLst>
-        </pc:picChg>
-      </pc:sldChg>
-      <pc:sldChg chg="modTransition">
-        <pc:chgData name="william a" userId="c66c7249b60d4ab2" providerId="LiveId" clId="{E43EA3F4-5CFF-4A8A-9561-5E0414B33ACD}" dt="2019-06-24T19:24:40.932" v="118"/>
-        <pc:sldMkLst>
-          <pc:docMk/>
-          <pc:sldMk cId="428579510" sldId="353"/>
-        </pc:sldMkLst>
-      </pc:sldChg>
-      <pc:sldChg chg="modSp">
-        <pc:chgData name="william a" userId="c66c7249b60d4ab2" providerId="LiveId" clId="{E43EA3F4-5CFF-4A8A-9561-5E0414B33ACD}" dt="2019-06-24T19:28:09.073" v="237" actId="15"/>
-        <pc:sldMkLst>
-          <pc:docMk/>
-          <pc:sldMk cId="4088082566" sldId="360"/>
-        </pc:sldMkLst>
-        <pc:spChg chg="mod">
-          <ac:chgData name="william a" userId="c66c7249b60d4ab2" providerId="LiveId" clId="{E43EA3F4-5CFF-4A8A-9561-5E0414B33ACD}" dt="2019-06-24T19:28:09.073" v="237" actId="15"/>
-          <ac:spMkLst>
-            <pc:docMk/>
-            <pc:sldMk cId="4088082566" sldId="360"/>
-            <ac:spMk id="3" creationId="{00000000-0000-0000-0000-000000000000}"/>
-          </ac:spMkLst>
-        </pc:spChg>
-      </pc:sldChg>
-      <pc:sldChg chg="modTransition">
-        <pc:chgData name="william a" userId="c66c7249b60d4ab2" providerId="LiveId" clId="{E43EA3F4-5CFF-4A8A-9561-5E0414B33ACD}" dt="2019-06-29T02:46:55.968" v="2352"/>
-        <pc:sldMkLst>
-          <pc:docMk/>
-          <pc:sldMk cId="1985756114" sldId="362"/>
-        </pc:sldMkLst>
-      </pc:sldChg>
-      <pc:sldChg chg="modSp">
-        <pc:chgData name="william a" userId="c66c7249b60d4ab2" providerId="LiveId" clId="{E43EA3F4-5CFF-4A8A-9561-5E0414B33ACD}" dt="2019-06-29T02:47:46.781" v="2360" actId="1035"/>
-        <pc:sldMkLst>
-          <pc:docMk/>
-          <pc:sldMk cId="361452273" sldId="363"/>
-        </pc:sldMkLst>
-        <pc:spChg chg="mod">
-          <ac:chgData name="william a" userId="c66c7249b60d4ab2" providerId="LiveId" clId="{E43EA3F4-5CFF-4A8A-9561-5E0414B33ACD}" dt="2019-06-29T02:47:46.781" v="2360" actId="1035"/>
-          <ac:spMkLst>
-            <pc:docMk/>
-            <pc:sldMk cId="361452273" sldId="363"/>
-            <ac:spMk id="3" creationId="{00000000-0000-0000-0000-000000000000}"/>
-          </ac:spMkLst>
-        </pc:spChg>
-      </pc:sldChg>
-      <pc:sldChg chg="modSp">
-        <pc:chgData name="william a" userId="c66c7249b60d4ab2" providerId="LiveId" clId="{E43EA3F4-5CFF-4A8A-9561-5E0414B33ACD}" dt="2019-06-29T02:54:15.802" v="2716" actId="20577"/>
-        <pc:sldMkLst>
-          <pc:docMk/>
-          <pc:sldMk cId="1952350759" sldId="366"/>
-        </pc:sldMkLst>
-        <pc:spChg chg="mod">
-          <ac:chgData name="william a" userId="c66c7249b60d4ab2" providerId="LiveId" clId="{E43EA3F4-5CFF-4A8A-9561-5E0414B33ACD}" dt="2019-06-29T02:54:15.802" v="2716" actId="20577"/>
-          <ac:spMkLst>
-            <pc:docMk/>
-            <pc:sldMk cId="1952350759" sldId="366"/>
-            <ac:spMk id="3" creationId="{00000000-0000-0000-0000-000000000000}"/>
-          </ac:spMkLst>
-        </pc:spChg>
-      </pc:sldChg>
-      <pc:sldChg chg="modSp">
-        <pc:chgData name="william a" userId="c66c7249b60d4ab2" providerId="LiveId" clId="{E43EA3F4-5CFF-4A8A-9561-5E0414B33ACD}" dt="2019-06-29T02:37:38.001" v="1694" actId="403"/>
-        <pc:sldMkLst>
-          <pc:docMk/>
-          <pc:sldMk cId="140071778" sldId="368"/>
-        </pc:sldMkLst>
-        <pc:spChg chg="mod">
-          <ac:chgData name="william a" userId="c66c7249b60d4ab2" providerId="LiveId" clId="{E43EA3F4-5CFF-4A8A-9561-5E0414B33ACD}" dt="2019-06-29T02:37:38.001" v="1694" actId="403"/>
-          <ac:spMkLst>
-            <pc:docMk/>
-            <pc:sldMk cId="140071778" sldId="368"/>
-            <ac:spMk id="3" creationId="{00000000-0000-0000-0000-000000000000}"/>
-          </ac:spMkLst>
-        </pc:spChg>
-      </pc:sldChg>
-      <pc:sldChg chg="modSp">
-        <pc:chgData name="william a" userId="c66c7249b60d4ab2" providerId="LiveId" clId="{E43EA3F4-5CFF-4A8A-9561-5E0414B33ACD}" dt="2019-06-24T19:27:09.979" v="154" actId="20577"/>
-        <pc:sldMkLst>
-          <pc:docMk/>
-          <pc:sldMk cId="870192496" sldId="371"/>
-        </pc:sldMkLst>
-        <pc:spChg chg="mod">
-          <ac:chgData name="william a" userId="c66c7249b60d4ab2" providerId="LiveId" clId="{E43EA3F4-5CFF-4A8A-9561-5E0414B33ACD}" dt="2019-06-24T19:27:09.979" v="154" actId="20577"/>
-          <ac:spMkLst>
-            <pc:docMk/>
-            <pc:sldMk cId="870192496" sldId="371"/>
-            <ac:spMk id="3" creationId="{00000000-0000-0000-0000-000000000000}"/>
-          </ac:spMkLst>
-        </pc:spChg>
-      </pc:sldChg>
-      <pc:sldChg chg="modSp ord">
-        <pc:chgData name="william a" userId="c66c7249b60d4ab2" providerId="LiveId" clId="{E43EA3F4-5CFF-4A8A-9561-5E0414B33ACD}" dt="2019-06-29T15:46:51.228" v="4542"/>
-        <pc:sldMkLst>
-          <pc:docMk/>
-          <pc:sldMk cId="1000541029" sldId="374"/>
-        </pc:sldMkLst>
-        <pc:spChg chg="mod">
-          <ac:chgData name="william a" userId="c66c7249b60d4ab2" providerId="LiveId" clId="{E43EA3F4-5CFF-4A8A-9561-5E0414B33ACD}" dt="2019-06-29T15:46:36.397" v="4541" actId="20577"/>
-          <ac:spMkLst>
-            <pc:docMk/>
-            <pc:sldMk cId="1000541029" sldId="374"/>
-            <ac:spMk id="3" creationId="{00000000-0000-0000-0000-000000000000}"/>
-          </ac:spMkLst>
-        </pc:spChg>
-      </pc:sldChg>
-      <pc:sldChg chg="modSp">
-        <pc:chgData name="william a" userId="c66c7249b60d4ab2" providerId="LiveId" clId="{E43EA3F4-5CFF-4A8A-9561-5E0414B33ACD}" dt="2019-06-24T19:29:47.433" v="375" actId="27636"/>
-        <pc:sldMkLst>
-          <pc:docMk/>
-          <pc:sldMk cId="847228155" sldId="380"/>
-        </pc:sldMkLst>
-        <pc:spChg chg="mod">
-          <ac:chgData name="william a" userId="c66c7249b60d4ab2" providerId="LiveId" clId="{E43EA3F4-5CFF-4A8A-9561-5E0414B33ACD}" dt="2019-06-24T19:29:47.433" v="375" actId="27636"/>
-          <ac:spMkLst>
-            <pc:docMk/>
-            <pc:sldMk cId="847228155" sldId="380"/>
-            <ac:spMk id="3" creationId="{00000000-0000-0000-0000-000000000000}"/>
-          </ac:spMkLst>
-        </pc:spChg>
-      </pc:sldChg>
-      <pc:sldChg chg="modSp">
-        <pc:chgData name="william a" userId="c66c7249b60d4ab2" providerId="LiveId" clId="{E43EA3F4-5CFF-4A8A-9561-5E0414B33ACD}" dt="2019-06-29T03:30:23.641" v="4266" actId="403"/>
-        <pc:sldMkLst>
-          <pc:docMk/>
-          <pc:sldMk cId="1794747222" sldId="384"/>
-        </pc:sldMkLst>
-        <pc:spChg chg="mod">
-          <ac:chgData name="william a" userId="c66c7249b60d4ab2" providerId="LiveId" clId="{E43EA3F4-5CFF-4A8A-9561-5E0414B33ACD}" dt="2019-06-29T03:30:23.641" v="4266" actId="403"/>
-          <ac:spMkLst>
-            <pc:docMk/>
-            <pc:sldMk cId="1794747222" sldId="384"/>
-            <ac:spMk id="3" creationId="{37511EB7-F0FB-452B-9183-F3E8CC5A75FB}"/>
-          </ac:spMkLst>
-        </pc:spChg>
-      </pc:sldChg>
-      <pc:sldChg chg="delSp">
-        <pc:chgData name="william a" userId="c66c7249b60d4ab2" providerId="LiveId" clId="{E43EA3F4-5CFF-4A8A-9561-5E0414B33ACD}" dt="2019-06-24T19:42:17.189" v="398" actId="478"/>
-        <pc:sldMkLst>
-          <pc:docMk/>
-          <pc:sldMk cId="3776688288" sldId="385"/>
-        </pc:sldMkLst>
-        <pc:spChg chg="del">
-          <ac:chgData name="william a" userId="c66c7249b60d4ab2" providerId="LiveId" clId="{E43EA3F4-5CFF-4A8A-9561-5E0414B33ACD}" dt="2019-06-24T19:42:17.189" v="398" actId="478"/>
-          <ac:spMkLst>
-            <pc:docMk/>
-            <pc:sldMk cId="3776688288" sldId="385"/>
-            <ac:spMk id="3" creationId="{BF21EC9F-82A9-44A3-ACCC-354C0E5F24BF}"/>
-          </ac:spMkLst>
-        </pc:spChg>
-      </pc:sldChg>
-      <pc:sldChg chg="modSp">
-        <pc:chgData name="william a" userId="c66c7249b60d4ab2" providerId="LiveId" clId="{E43EA3F4-5CFF-4A8A-9561-5E0414B33ACD}" dt="2019-06-29T15:43:54.591" v="4509" actId="12"/>
-        <pc:sldMkLst>
-          <pc:docMk/>
-          <pc:sldMk cId="2805776003" sldId="389"/>
-        </pc:sldMkLst>
-        <pc:spChg chg="mod">
-          <ac:chgData name="william a" userId="c66c7249b60d4ab2" providerId="LiveId" clId="{E43EA3F4-5CFF-4A8A-9561-5E0414B33ACD}" dt="2019-06-29T15:43:54.591" v="4509" actId="12"/>
-          <ac:spMkLst>
-            <pc:docMk/>
-            <pc:sldMk cId="2805776003" sldId="389"/>
-            <ac:spMk id="3" creationId="{00000000-0000-0000-0000-000000000000}"/>
-          </ac:spMkLst>
-        </pc:spChg>
-      </pc:sldChg>
-      <pc:sldChg chg="modTransition">
-        <pc:chgData name="william a" userId="c66c7249b60d4ab2" providerId="LiveId" clId="{E43EA3F4-5CFF-4A8A-9561-5E0414B33ACD}" dt="2019-06-29T03:27:15.143" v="4201"/>
-        <pc:sldMkLst>
-          <pc:docMk/>
-          <pc:sldMk cId="2719412598" sldId="392"/>
-        </pc:sldMkLst>
-      </pc:sldChg>
-      <pc:sldChg chg="modSp modAnim">
-        <pc:chgData name="william a" userId="c66c7249b60d4ab2" providerId="LiveId" clId="{E43EA3F4-5CFF-4A8A-9561-5E0414B33ACD}" dt="2019-06-29T15:48:37.118" v="4547"/>
-        <pc:sldMkLst>
-          <pc:docMk/>
-          <pc:sldMk cId="1686395800" sldId="395"/>
-        </pc:sldMkLst>
-        <pc:spChg chg="mod">
-          <ac:chgData name="william a" userId="c66c7249b60d4ab2" providerId="LiveId" clId="{E43EA3F4-5CFF-4A8A-9561-5E0414B33ACD}" dt="2019-06-29T03:26:23.477" v="4197" actId="404"/>
-          <ac:spMkLst>
-            <pc:docMk/>
-            <pc:sldMk cId="1686395800" sldId="395"/>
-            <ac:spMk id="9" creationId="{D909863E-BC8D-42CC-B70A-1CA3DE56567F}"/>
-          </ac:spMkLst>
-        </pc:spChg>
-      </pc:sldChg>
-      <pc:sldChg chg="modSp">
-        <pc:chgData name="william a" userId="c66c7249b60d4ab2" providerId="LiveId" clId="{E43EA3F4-5CFF-4A8A-9561-5E0414B33ACD}" dt="2019-06-29T15:45:50.514" v="4531" actId="404"/>
-        <pc:sldMkLst>
-          <pc:docMk/>
-          <pc:sldMk cId="2193851596" sldId="396"/>
-        </pc:sldMkLst>
-        <pc:spChg chg="mod">
-          <ac:chgData name="william a" userId="c66c7249b60d4ab2" providerId="LiveId" clId="{E43EA3F4-5CFF-4A8A-9561-5E0414B33ACD}" dt="2019-06-29T15:45:50.514" v="4531" actId="404"/>
-          <ac:spMkLst>
-            <pc:docMk/>
-            <pc:sldMk cId="2193851596" sldId="396"/>
-            <ac:spMk id="9" creationId="{D909863E-BC8D-42CC-B70A-1CA3DE56567F}"/>
-          </ac:spMkLst>
-        </pc:spChg>
-      </pc:sldChg>
-      <pc:sldChg chg="ord">
-        <pc:chgData name="william a" userId="c66c7249b60d4ab2" providerId="LiveId" clId="{E43EA3F4-5CFF-4A8A-9561-5E0414B33ACD}" dt="2019-06-29T03:37:21.035" v="4493"/>
-        <pc:sldMkLst>
-          <pc:docMk/>
-          <pc:sldMk cId="3065506444" sldId="412"/>
-        </pc:sldMkLst>
-      </pc:sldChg>
-      <pc:sldChg chg="addSp delSp modSp add del modTransition">
-        <pc:chgData name="william a" userId="c66c7249b60d4ab2" providerId="LiveId" clId="{E43EA3F4-5CFF-4A8A-9561-5E0414B33ACD}" dt="2019-06-24T20:12:52.384" v="1115" actId="20577"/>
-        <pc:sldMkLst>
-          <pc:docMk/>
-          <pc:sldMk cId="1387534095" sldId="417"/>
-        </pc:sldMkLst>
-        <pc:spChg chg="add mod">
-          <ac:chgData name="william a" userId="c66c7249b60d4ab2" providerId="LiveId" clId="{E43EA3F4-5CFF-4A8A-9561-5E0414B33ACD}" dt="2019-06-24T20:03:11.947" v="736" actId="478"/>
-          <ac:spMkLst>
-            <pc:docMk/>
-            <pc:sldMk cId="1387534095" sldId="417"/>
-            <ac:spMk id="3" creationId="{4BC99724-87B4-4279-9E00-1104F3DA7919}"/>
-          </ac:spMkLst>
-        </pc:spChg>
-        <pc:spChg chg="del">
-          <ac:chgData name="william a" userId="c66c7249b60d4ab2" providerId="LiveId" clId="{E43EA3F4-5CFF-4A8A-9561-5E0414B33ACD}" dt="2019-06-24T20:03:11.947" v="736" actId="478"/>
-          <ac:spMkLst>
-            <pc:docMk/>
-            <pc:sldMk cId="1387534095" sldId="417"/>
-            <ac:spMk id="4" creationId="{00000000-0000-0000-0000-000000000000}"/>
-          </ac:spMkLst>
-        </pc:spChg>
-        <pc:spChg chg="add del">
-          <ac:chgData name="william a" userId="c66c7249b60d4ab2" providerId="LiveId" clId="{E43EA3F4-5CFF-4A8A-9561-5E0414B33ACD}" dt="2019-06-24T20:02:29.118" v="724"/>
-          <ac:spMkLst>
-            <pc:docMk/>
-            <pc:sldMk cId="1387534095" sldId="417"/>
-            <ac:spMk id="6" creationId="{1B05D764-0F54-422E-86AC-85E6F06B6AB1}"/>
-          </ac:spMkLst>
-        </pc:spChg>
-        <pc:spChg chg="mod">
-          <ac:chgData name="william a" userId="c66c7249b60d4ab2" providerId="LiveId" clId="{E43EA3F4-5CFF-4A8A-9561-5E0414B33ACD}" dt="2019-06-24T20:05:45.162" v="793" actId="1076"/>
-          <ac:spMkLst>
-            <pc:docMk/>
-            <pc:sldMk cId="1387534095" sldId="417"/>
-            <ac:spMk id="7" creationId="{13427966-EC4E-4EB0-8FDC-07FC122433C2}"/>
-          </ac:spMkLst>
-        </pc:spChg>
-        <pc:spChg chg="add mod">
-          <ac:chgData name="william a" userId="c66c7249b60d4ab2" providerId="LiveId" clId="{E43EA3F4-5CFF-4A8A-9561-5E0414B33ACD}" dt="2019-06-24T20:12:52.384" v="1115" actId="20577"/>
-          <ac:spMkLst>
-            <pc:docMk/>
-            <pc:sldMk cId="1387534095" sldId="417"/>
-            <ac:spMk id="9" creationId="{2D226F2D-BA1D-4640-908E-0525F20DF626}"/>
-          </ac:spMkLst>
-        </pc:spChg>
-        <pc:spChg chg="add del mod">
-          <ac:chgData name="william a" userId="c66c7249b60d4ab2" providerId="LiveId" clId="{E43EA3F4-5CFF-4A8A-9561-5E0414B33ACD}" dt="2019-06-24T20:05:26.104" v="765"/>
-          <ac:spMkLst>
-            <pc:docMk/>
-            <pc:sldMk cId="1387534095" sldId="417"/>
-            <ac:spMk id="10" creationId="{EEECEA67-2AA9-401F-A382-F0CF189CAF5F}"/>
-          </ac:spMkLst>
-        </pc:spChg>
-        <pc:picChg chg="mod">
-          <ac:chgData name="william a" userId="c66c7249b60d4ab2" providerId="LiveId" clId="{E43EA3F4-5CFF-4A8A-9561-5E0414B33ACD}" dt="2019-06-24T20:05:10.637" v="761" actId="14100"/>
-          <ac:picMkLst>
-            <pc:docMk/>
-            <pc:sldMk cId="1387534095" sldId="417"/>
-            <ac:picMk id="5" creationId="{93B9AE32-94F5-4BC4-834E-98833E008AB2}"/>
-          </ac:picMkLst>
-        </pc:picChg>
-        <pc:picChg chg="mod">
-          <ac:chgData name="william a" userId="c66c7249b60d4ab2" providerId="LiveId" clId="{E43EA3F4-5CFF-4A8A-9561-5E0414B33ACD}" dt="2019-06-24T20:05:48.602" v="794" actId="1076"/>
-          <ac:picMkLst>
-            <pc:docMk/>
-            <pc:sldMk cId="1387534095" sldId="417"/>
-            <ac:picMk id="8" creationId="{DD966F39-4A86-48DC-AB70-1D9F158CF488}"/>
-          </ac:picMkLst>
-        </pc:picChg>
-      </pc:sldChg>
-      <pc:sldChg chg="modSp add">
-        <pc:chgData name="william a" userId="c66c7249b60d4ab2" providerId="LiveId" clId="{E43EA3F4-5CFF-4A8A-9561-5E0414B33ACD}" dt="2019-06-29T03:28:58.757" v="4262" actId="20577"/>
-        <pc:sldMkLst>
-          <pc:docMk/>
-          <pc:sldMk cId="1599106219" sldId="418"/>
-        </pc:sldMkLst>
-        <pc:spChg chg="mod">
-          <ac:chgData name="william a" userId="c66c7249b60d4ab2" providerId="LiveId" clId="{E43EA3F4-5CFF-4A8A-9561-5E0414B33ACD}" dt="2019-06-29T03:28:58.757" v="4262" actId="20577"/>
-          <ac:spMkLst>
-            <pc:docMk/>
-            <pc:sldMk cId="1599106219" sldId="418"/>
-            <ac:spMk id="3" creationId="{00000000-0000-0000-0000-000000000000}"/>
-          </ac:spMkLst>
-        </pc:spChg>
-      </pc:sldChg>
-      <pc:sldChg chg="modSp add ord">
-        <pc:chgData name="william a" userId="c66c7249b60d4ab2" providerId="LiveId" clId="{E43EA3F4-5CFF-4A8A-9561-5E0414B33ACD}" dt="2019-06-29T03:20:25.733" v="3871"/>
-        <pc:sldMkLst>
-          <pc:docMk/>
-          <pc:sldMk cId="3140931035" sldId="419"/>
-        </pc:sldMkLst>
-        <pc:spChg chg="mod">
-          <ac:chgData name="william a" userId="c66c7249b60d4ab2" providerId="LiveId" clId="{E43EA3F4-5CFF-4A8A-9561-5E0414B33ACD}" dt="2019-06-29T02:49:12.300" v="2501" actId="27636"/>
-          <ac:spMkLst>
-            <pc:docMk/>
-            <pc:sldMk cId="3140931035" sldId="419"/>
-            <ac:spMk id="3" creationId="{00000000-0000-0000-0000-000000000000}"/>
-          </ac:spMkLst>
-        </pc:spChg>
-      </pc:sldChg>
-      <pc:sldChg chg="addSp modSp add modAnim">
-        <pc:chgData name="william a" userId="c66c7249b60d4ab2" providerId="LiveId" clId="{E43EA3F4-5CFF-4A8A-9561-5E0414B33ACD}" dt="2019-06-29T15:48:12.014" v="4546"/>
-        <pc:sldMkLst>
-          <pc:docMk/>
-          <pc:sldMk cId="1556883112" sldId="420"/>
-        </pc:sldMkLst>
-        <pc:spChg chg="mod">
-          <ac:chgData name="william a" userId="c66c7249b60d4ab2" providerId="LiveId" clId="{E43EA3F4-5CFF-4A8A-9561-5E0414B33ACD}" dt="2019-06-29T03:14:25.622" v="3456" actId="20577"/>
-          <ac:spMkLst>
-            <pc:docMk/>
-            <pc:sldMk cId="1556883112" sldId="420"/>
-            <ac:spMk id="3" creationId="{00000000-0000-0000-0000-000000000000}"/>
-          </ac:spMkLst>
-        </pc:spChg>
-        <pc:picChg chg="add mod">
-          <ac:chgData name="william a" userId="c66c7249b60d4ab2" providerId="LiveId" clId="{E43EA3F4-5CFF-4A8A-9561-5E0414B33ACD}" dt="2019-06-29T03:14:32.493" v="3457" actId="1076"/>
-          <ac:picMkLst>
-            <pc:docMk/>
-            <pc:sldMk cId="1556883112" sldId="420"/>
-            <ac:picMk id="5" creationId="{FF0E237D-5D34-4914-8F02-AAAC6CA41611}"/>
+            <pc:sldMk cId="1487812985" sldId="425"/>
+            <ac:picMk id="1028" creationId="{CE28B9D9-B8AC-42AC-9E1F-F1CE679CCAF5}"/>
           </ac:picMkLst>
         </pc:picChg>
       </pc:sldChg>
@@ -2466,7 +2594,7 @@
           <a:p>
             <a:fld id="{7865AD6C-5B00-4F17-BE9F-19DCC670802B}" type="datetimeFigureOut">
               <a:rPr lang="en-US" smtClean="0"/>
-              <a:t>10/7/2019</a:t>
+              <a:t>10/10/2019</a:t>
             </a:fld>
             <a:endParaRPr lang="en-US"/>
           </a:p>
@@ -3037,7 +3165,7 @@
             <a:fld id="{18501692-B899-4C77-BF47-5D6E94D5293B}" type="datetimeFigureOut">
               <a:rPr lang="en-US" smtClean="0"/>
               <a:pPr/>
-              <a:t>10/7/2019</a:t>
+              <a:t>10/10/2019</a:t>
             </a:fld>
             <a:endParaRPr lang="en-US"/>
           </a:p>
@@ -3922,7 +4050,7 @@
           <a:p>
             <a:fld id="{2169F59F-0EB0-7641-AD82-6C091FC4275B}" type="slidenum">
               <a:rPr lang="en-US" smtClean="0"/>
-              <a:t>81</a:t>
+              <a:t>83</a:t>
             </a:fld>
             <a:endParaRPr lang="en-US"/>
           </a:p>
@@ -4006,7 +4134,7 @@
           <a:p>
             <a:fld id="{2169F59F-0EB0-7641-AD82-6C091FC4275B}" type="slidenum">
               <a:rPr lang="en-US" smtClean="0"/>
-              <a:t>82</a:t>
+              <a:t>84</a:t>
             </a:fld>
             <a:endParaRPr lang="en-US"/>
           </a:p>
@@ -4090,7 +4218,7 @@
           <a:p>
             <a:fld id="{2169F59F-0EB0-7641-AD82-6C091FC4275B}" type="slidenum">
               <a:rPr lang="en-US" smtClean="0"/>
-              <a:t>83</a:t>
+              <a:t>85</a:t>
             </a:fld>
             <a:endParaRPr lang="en-US"/>
           </a:p>
@@ -4174,7 +4302,7 @@
           <a:p>
             <a:fld id="{2169F59F-0EB0-7641-AD82-6C091FC4275B}" type="slidenum">
               <a:rPr lang="en-US" smtClean="0"/>
-              <a:t>84</a:t>
+              <a:t>86</a:t>
             </a:fld>
             <a:endParaRPr lang="en-US"/>
           </a:p>
@@ -4258,7 +4386,7 @@
           <a:p>
             <a:fld id="{2169F59F-0EB0-7641-AD82-6C091FC4275B}" type="slidenum">
               <a:rPr lang="en-US" smtClean="0"/>
-              <a:t>85</a:t>
+              <a:t>87</a:t>
             </a:fld>
             <a:endParaRPr lang="en-US"/>
           </a:p>
@@ -5459,7 +5587,7 @@
           <a:p>
             <a:fld id="{3FAA6659-066F-4E7F-BD92-0981E5430CBE}" type="datetimeFigureOut">
               <a:rPr lang="en-US" smtClean="0"/>
-              <a:t>10/7/2019</a:t>
+              <a:t>10/10/2019</a:t>
             </a:fld>
             <a:endParaRPr lang="en-US"/>
           </a:p>
@@ -5576,7 +5704,7 @@
           <a:p>
             <a:fld id="{3FAA6659-066F-4E7F-BD92-0981E5430CBE}" type="datetimeFigureOut">
               <a:rPr lang="en-US" smtClean="0"/>
-              <a:t>10/7/2019</a:t>
+              <a:t>10/10/2019</a:t>
             </a:fld>
             <a:endParaRPr lang="en-US"/>
           </a:p>
@@ -5671,7 +5799,7 @@
           <a:p>
             <a:fld id="{3FAA6659-066F-4E7F-BD92-0981E5430CBE}" type="datetimeFigureOut">
               <a:rPr lang="en-US" smtClean="0"/>
-              <a:t>10/7/2019</a:t>
+              <a:t>10/10/2019</a:t>
             </a:fld>
             <a:endParaRPr lang="en-US"/>
           </a:p>
@@ -5946,7 +6074,7 @@
           <a:p>
             <a:fld id="{3FAA6659-066F-4E7F-BD92-0981E5430CBE}" type="datetimeFigureOut">
               <a:rPr lang="en-US" smtClean="0"/>
-              <a:t>10/7/2019</a:t>
+              <a:t>10/10/2019</a:t>
             </a:fld>
             <a:endParaRPr lang="en-US"/>
           </a:p>
@@ -6198,7 +6326,7 @@
           <a:p>
             <a:fld id="{3FAA6659-066F-4E7F-BD92-0981E5430CBE}" type="datetimeFigureOut">
               <a:rPr lang="en-US" smtClean="0"/>
-              <a:t>10/7/2019</a:t>
+              <a:t>10/10/2019</a:t>
             </a:fld>
             <a:endParaRPr lang="en-US"/>
           </a:p>
@@ -6366,7 +6494,7 @@
           <a:p>
             <a:fld id="{3FAA6659-066F-4E7F-BD92-0981E5430CBE}" type="datetimeFigureOut">
               <a:rPr lang="en-US" smtClean="0"/>
-              <a:t>10/7/2019</a:t>
+              <a:t>10/10/2019</a:t>
             </a:fld>
             <a:endParaRPr lang="en-US"/>
           </a:p>
@@ -6544,7 +6672,7 @@
           <a:p>
             <a:fld id="{3FAA6659-066F-4E7F-BD92-0981E5430CBE}" type="datetimeFigureOut">
               <a:rPr lang="en-US" smtClean="0"/>
-              <a:t>10/7/2019</a:t>
+              <a:t>10/10/2019</a:t>
             </a:fld>
             <a:endParaRPr lang="en-US"/>
           </a:p>
@@ -6802,7 +6930,7 @@
           <a:p>
             <a:fld id="{DF1B7059-9994-452B-97D3-B9424BDCF679}" type="datetimeFigureOut">
               <a:rPr lang="en-US" smtClean="0"/>
-              <a:t>10/7/2019</a:t>
+              <a:t>10/10/2019</a:t>
             </a:fld>
             <a:endParaRPr lang="en-US" dirty="0"/>
           </a:p>
@@ -6972,7 +7100,7 @@
           <a:p>
             <a:fld id="{DF1B7059-9994-452B-97D3-B9424BDCF679}" type="datetimeFigureOut">
               <a:rPr lang="en-US" smtClean="0"/>
-              <a:t>10/7/2019</a:t>
+              <a:t>10/10/2019</a:t>
             </a:fld>
             <a:endParaRPr lang="en-US" dirty="0"/>
           </a:p>
@@ -7368,7 +7496,7 @@
           <a:p>
             <a:fld id="{DF1B7059-9994-452B-97D3-B9424BDCF679}" type="datetimeFigureOut">
               <a:rPr lang="en-US" smtClean="0"/>
-              <a:t>10/7/2019</a:t>
+              <a:t>10/10/2019</a:t>
             </a:fld>
             <a:endParaRPr lang="en-US" dirty="0"/>
           </a:p>
@@ -7600,7 +7728,7 @@
           <a:p>
             <a:fld id="{DF1B7059-9994-452B-97D3-B9424BDCF679}" type="datetimeFigureOut">
               <a:rPr lang="en-US" smtClean="0"/>
-              <a:t>10/7/2019</a:t>
+              <a:t>10/10/2019</a:t>
             </a:fld>
             <a:endParaRPr lang="en-US" dirty="0"/>
           </a:p>
@@ -7967,7 +8095,7 @@
           <a:p>
             <a:fld id="{DF1B7059-9994-452B-97D3-B9424BDCF679}" type="datetimeFigureOut">
               <a:rPr lang="en-US" smtClean="0"/>
-              <a:t>10/7/2019</a:t>
+              <a:t>10/10/2019</a:t>
             </a:fld>
             <a:endParaRPr lang="en-US" dirty="0"/>
           </a:p>
@@ -8085,7 +8213,7 @@
           <a:p>
             <a:fld id="{DF1B7059-9994-452B-97D3-B9424BDCF679}" type="datetimeFigureOut">
               <a:rPr lang="en-US" smtClean="0"/>
-              <a:t>10/7/2019</a:t>
+              <a:t>10/10/2019</a:t>
             </a:fld>
             <a:endParaRPr lang="en-US" dirty="0"/>
           </a:p>
@@ -8180,7 +8308,7 @@
           <a:p>
             <a:fld id="{DF1B7059-9994-452B-97D3-B9424BDCF679}" type="datetimeFigureOut">
               <a:rPr lang="en-US" smtClean="0"/>
-              <a:t>10/7/2019</a:t>
+              <a:t>10/10/2019</a:t>
             </a:fld>
             <a:endParaRPr lang="en-US" dirty="0"/>
           </a:p>
@@ -8457,7 +8585,7 @@
           <a:p>
             <a:fld id="{DF1B7059-9994-452B-97D3-B9424BDCF679}" type="datetimeFigureOut">
               <a:rPr lang="en-US" smtClean="0"/>
-              <a:t>10/7/2019</a:t>
+              <a:t>10/10/2019</a:t>
             </a:fld>
             <a:endParaRPr lang="en-US" dirty="0"/>
           </a:p>
@@ -8713,7 +8841,7 @@
           <a:p>
             <a:fld id="{DF1B7059-9994-452B-97D3-B9424BDCF679}" type="datetimeFigureOut">
               <a:rPr lang="en-US" smtClean="0"/>
-              <a:t>10/7/2019</a:t>
+              <a:t>10/10/2019</a:t>
             </a:fld>
             <a:endParaRPr lang="en-US" dirty="0"/>
           </a:p>
@@ -8883,7 +9011,7 @@
           <a:p>
             <a:fld id="{DF1B7059-9994-452B-97D3-B9424BDCF679}" type="datetimeFigureOut">
               <a:rPr lang="en-US" smtClean="0"/>
-              <a:t>10/7/2019</a:t>
+              <a:t>10/10/2019</a:t>
             </a:fld>
             <a:endParaRPr lang="en-US" dirty="0"/>
           </a:p>
@@ -9063,7 +9191,7 @@
           <a:p>
             <a:fld id="{DF1B7059-9994-452B-97D3-B9424BDCF679}" type="datetimeFigureOut">
               <a:rPr lang="en-US" smtClean="0"/>
-              <a:t>10/7/2019</a:t>
+              <a:t>10/10/2019</a:t>
             </a:fld>
             <a:endParaRPr lang="en-US" dirty="0"/>
           </a:p>
@@ -11316,7 +11444,7 @@
             <a:fld id="{3FAA6659-066F-4E7F-BD92-0981E5430CBE}" type="datetimeFigureOut">
               <a:rPr lang="en-US" smtClean="0"/>
               <a:pPr/>
-              <a:t>10/7/2019</a:t>
+              <a:t>10/10/2019</a:t>
             </a:fld>
             <a:endParaRPr lang="en-US"/>
           </a:p>
@@ -11499,7 +11627,7 @@
           <a:p>
             <a:fld id="{3FAA6659-066F-4E7F-BD92-0981E5430CBE}" type="datetimeFigureOut">
               <a:rPr lang="en-US" smtClean="0"/>
-              <a:t>10/7/2019</a:t>
+              <a:t>10/10/2019</a:t>
             </a:fld>
             <a:endParaRPr lang="en-US"/>
           </a:p>
@@ -11744,7 +11872,7 @@
           <a:p>
             <a:fld id="{3FAA6659-066F-4E7F-BD92-0981E5430CBE}" type="datetimeFigureOut">
               <a:rPr lang="en-US" smtClean="0"/>
-              <a:t>10/7/2019</a:t>
+              <a:t>10/10/2019</a:t>
             </a:fld>
             <a:endParaRPr lang="en-US"/>
           </a:p>
@@ -11973,7 +12101,7 @@
           <a:p>
             <a:fld id="{3FAA6659-066F-4E7F-BD92-0981E5430CBE}" type="datetimeFigureOut">
               <a:rPr lang="en-US" smtClean="0"/>
-              <a:t>10/7/2019</a:t>
+              <a:t>10/10/2019</a:t>
             </a:fld>
             <a:endParaRPr lang="en-US"/>
           </a:p>
@@ -12567,7 +12695,7 @@
             <a:fld id="{3FAA6659-066F-4E7F-BD92-0981E5430CBE}" type="datetimeFigureOut">
               <a:rPr lang="en-US" smtClean="0"/>
               <a:pPr/>
-              <a:t>10/7/2019</a:t>
+              <a:t>10/10/2019</a:t>
             </a:fld>
             <a:endParaRPr lang="en-US"/>
           </a:p>
@@ -13113,7 +13241,7 @@
           <a:p>
             <a:fld id="{DF1B7059-9994-452B-97D3-B9424BDCF679}" type="datetimeFigureOut">
               <a:rPr lang="en-US" smtClean="0"/>
-              <a:t>10/7/2019</a:t>
+              <a:t>10/10/2019</a:t>
             </a:fld>
             <a:endParaRPr lang="en-US" dirty="0"/>
           </a:p>
@@ -18653,8 +18781,8 @@
           </a:p>
         </p:txBody>
       </p:sp>
-      <mc:AlternateContent xmlns:mc="http://schemas.openxmlformats.org/markup-compatibility/2006">
-        <mc:Choice xmlns:p14="http://schemas.microsoft.com/office/powerpoint/2010/main" Requires="p14">
+      <mc:AlternateContent xmlns:mc="http://schemas.openxmlformats.org/markup-compatibility/2006" xmlns:p14="http://schemas.microsoft.com/office/powerpoint/2010/main">
+        <mc:Choice Requires="p14">
           <p:contentPart p14:bwMode="auto" r:id="rId2">
             <p14:nvContentPartPr>
               <p14:cNvPr id="6" name="Ink 5">
@@ -18673,7 +18801,7 @@
             </p14:xfrm>
           </p:contentPart>
         </mc:Choice>
-        <mc:Fallback>
+        <mc:Fallback xmlns="">
           <p:pic>
             <p:nvPicPr>
               <p:cNvPr id="6" name="Ink 5">
@@ -18704,8 +18832,8 @@
           </p:pic>
         </mc:Fallback>
       </mc:AlternateContent>
-      <mc:AlternateContent xmlns:mc="http://schemas.openxmlformats.org/markup-compatibility/2006">
-        <mc:Choice xmlns:p14="http://schemas.microsoft.com/office/powerpoint/2010/main" Requires="p14">
+      <mc:AlternateContent xmlns:mc="http://schemas.openxmlformats.org/markup-compatibility/2006" xmlns:p14="http://schemas.microsoft.com/office/powerpoint/2010/main">
+        <mc:Choice Requires="p14">
           <p:contentPart p14:bwMode="auto" r:id="rId4">
             <p14:nvContentPartPr>
               <p14:cNvPr id="11" name="Ink 10">
@@ -18724,7 +18852,7 @@
             </p14:xfrm>
           </p:contentPart>
         </mc:Choice>
-        <mc:Fallback>
+        <mc:Fallback xmlns="">
           <p:pic>
             <p:nvPicPr>
               <p:cNvPr id="11" name="Ink 10">
@@ -18755,8 +18883,8 @@
           </p:pic>
         </mc:Fallback>
       </mc:AlternateContent>
-      <mc:AlternateContent xmlns:mc="http://schemas.openxmlformats.org/markup-compatibility/2006">
-        <mc:Choice xmlns:p14="http://schemas.microsoft.com/office/powerpoint/2010/main" Requires="p14">
+      <mc:AlternateContent xmlns:mc="http://schemas.openxmlformats.org/markup-compatibility/2006" xmlns:p14="http://schemas.microsoft.com/office/powerpoint/2010/main">
+        <mc:Choice Requires="p14">
           <p:contentPart p14:bwMode="auto" r:id="rId5">
             <p14:nvContentPartPr>
               <p14:cNvPr id="13" name="Ink 12">
@@ -18775,7 +18903,7 @@
             </p14:xfrm>
           </p:contentPart>
         </mc:Choice>
-        <mc:Fallback>
+        <mc:Fallback xmlns="">
           <p:pic>
             <p:nvPicPr>
               <p:cNvPr id="13" name="Ink 12">
@@ -28942,6 +29070,335 @@
       </p:grpSpPr>
       <p:sp>
         <p:nvSpPr>
+          <p:cNvPr id="2" name="Title 1">
+            <a:extLst>
+              <a:ext uri="{FF2B5EF4-FFF2-40B4-BE49-F238E27FC236}">
+                <a16:creationId xmlns:a16="http://schemas.microsoft.com/office/drawing/2014/main" id="{700E7978-6161-4C1D-855C-6B6FCC522E49}"/>
+              </a:ext>
+            </a:extLst>
+          </p:cNvPr>
+          <p:cNvSpPr>
+            <a:spLocks noGrp="1"/>
+          </p:cNvSpPr>
+          <p:nvPr>
+            <p:ph type="title"/>
+          </p:nvPr>
+        </p:nvSpPr>
+        <p:spPr/>
+        <p:txBody>
+          <a:bodyPr/>
+          <a:lstStyle/>
+          <a:p>
+            <a:r>
+              <a:rPr lang="en-US" dirty="0"/>
+              <a:t>RAPID FIRE STAGE</a:t>
+            </a:r>
+          </a:p>
+        </p:txBody>
+      </p:sp>
+    </p:spTree>
+    <p:extLst>
+      <p:ext uri="{BB962C8B-B14F-4D97-AF65-F5344CB8AC3E}">
+        <p14:creationId xmlns:p14="http://schemas.microsoft.com/office/powerpoint/2010/main" val="3388669171"/>
+      </p:ext>
+    </p:extLst>
+  </p:cSld>
+  <p:clrMapOvr>
+    <a:masterClrMapping/>
+  </p:clrMapOvr>
+</p:sld>
+</file>
+
+<file path=ppt/slides/slide72.xml><?xml version="1.0" encoding="utf-8"?>
+<p:sld xmlns:a="http://schemas.openxmlformats.org/drawingml/2006/main" xmlns:r="http://schemas.openxmlformats.org/officeDocument/2006/relationships" xmlns:p="http://schemas.openxmlformats.org/presentationml/2006/main">
+  <p:cSld>
+    <p:spTree>
+      <p:nvGrpSpPr>
+        <p:cNvPr id="1" name=""/>
+        <p:cNvGrpSpPr/>
+        <p:nvPr/>
+      </p:nvGrpSpPr>
+      <p:grpSpPr>
+        <a:xfrm>
+          <a:off x="0" y="0"/>
+          <a:ext cx="0" cy="0"/>
+          <a:chOff x="0" y="0"/>
+          <a:chExt cx="0" cy="0"/>
+        </a:xfrm>
+      </p:grpSpPr>
+      <p:sp>
+        <p:nvSpPr>
+          <p:cNvPr id="2" name="Title 1"/>
+          <p:cNvSpPr>
+            <a:spLocks noGrp="1"/>
+          </p:cNvSpPr>
+          <p:nvPr>
+            <p:ph type="title"/>
+          </p:nvPr>
+        </p:nvSpPr>
+        <p:spPr/>
+        <p:txBody>
+          <a:bodyPr/>
+          <a:lstStyle/>
+          <a:p>
+            <a:r>
+              <a:rPr lang="en-US" b="1" dirty="0" err="1"/>
+              <a:t>sys.</a:t>
+            </a:r>
+            <a:r>
+              <a:rPr lang="en-US" dirty="0" err="1"/>
+              <a:t>dm_os_host_info</a:t>
+            </a:r>
+            <a:endParaRPr lang="en-US" dirty="0"/>
+          </a:p>
+        </p:txBody>
+      </p:sp>
+      <p:sp>
+        <p:nvSpPr>
+          <p:cNvPr id="3" name="Content Placeholder 2"/>
+          <p:cNvSpPr>
+            <a:spLocks noGrp="1"/>
+          </p:cNvSpPr>
+          <p:nvPr>
+            <p:ph idx="1"/>
+          </p:nvPr>
+        </p:nvSpPr>
+        <p:spPr>
+          <a:xfrm>
+            <a:off x="304800" y="990600"/>
+            <a:ext cx="11734800" cy="5562599"/>
+          </a:xfrm>
+        </p:spPr>
+        <p:txBody>
+          <a:bodyPr>
+            <a:normAutofit/>
+          </a:bodyPr>
+          <a:lstStyle/>
+          <a:p>
+            <a:pPr marL="457200" indent="-457200">
+              <a:buFont typeface="Arial" panose="020B0604020202020204" pitchFamily="34" charset="0"/>
+              <a:buChar char="•"/>
+            </a:pPr>
+            <a:r>
+              <a:rPr lang="en-US" sz="3600" b="0" dirty="0"/>
+              <a:t>Host server information including version info for both </a:t>
+            </a:r>
+            <a:r>
+              <a:rPr lang="en-US" sz="3600" dirty="0"/>
+              <a:t>Windows</a:t>
+            </a:r>
+            <a:r>
+              <a:rPr lang="en-US" sz="3600" b="0" dirty="0"/>
+              <a:t> and </a:t>
+            </a:r>
+            <a:r>
+              <a:rPr lang="en-US" sz="3600" dirty="0"/>
+              <a:t>Linux</a:t>
+            </a:r>
+            <a:r>
+              <a:rPr lang="en-US" sz="3600" b="0" dirty="0"/>
+              <a:t>, new to SQL Server 2017.</a:t>
+            </a:r>
+          </a:p>
+          <a:p>
+            <a:pPr marL="457200" indent="-457200">
+              <a:buFont typeface="Arial" panose="020B0604020202020204" pitchFamily="34" charset="0"/>
+              <a:buChar char="•"/>
+            </a:pPr>
+            <a:r>
+              <a:rPr lang="en-US" sz="3600" b="0" dirty="0"/>
+              <a:t>In your inventory or diagnostic queries, replace </a:t>
+            </a:r>
+            <a:r>
+              <a:rPr lang="en-US" sz="3600" dirty="0" err="1"/>
+              <a:t>sys.dm_os_windows_info</a:t>
+            </a:r>
+            <a:r>
+              <a:rPr lang="en-US" sz="3600" dirty="0"/>
+              <a:t>.</a:t>
+            </a:r>
+          </a:p>
+          <a:p>
+            <a:pPr marL="457200" indent="-457200">
+              <a:buFont typeface="Arial" panose="020B0604020202020204" pitchFamily="34" charset="0"/>
+              <a:buChar char="•"/>
+            </a:pPr>
+            <a:endParaRPr lang="en-US" sz="3600" dirty="0"/>
+          </a:p>
+          <a:p>
+            <a:pPr marL="457200" indent="-457200">
+              <a:buFont typeface="Arial" panose="020B0604020202020204" pitchFamily="34" charset="0"/>
+              <a:buChar char="•"/>
+            </a:pPr>
+            <a:endParaRPr lang="en-US" sz="3600" dirty="0"/>
+          </a:p>
+          <a:p>
+            <a:pPr marL="457200" indent="-457200">
+              <a:buFont typeface="Arial" panose="020B0604020202020204" pitchFamily="34" charset="0"/>
+              <a:buChar char="•"/>
+            </a:pPr>
+            <a:endParaRPr lang="en-US" sz="3600" dirty="0"/>
+          </a:p>
+          <a:p>
+            <a:pPr marL="457200" indent="-457200">
+              <a:buFont typeface="Arial" panose="020B0604020202020204" pitchFamily="34" charset="0"/>
+              <a:buChar char="•"/>
+            </a:pPr>
+            <a:endParaRPr lang="en-US" sz="1400" dirty="0"/>
+          </a:p>
+          <a:p>
+            <a:pPr marL="0" indent="0"/>
+            <a:endParaRPr lang="en-US" sz="1400" dirty="0"/>
+          </a:p>
+          <a:p>
+            <a:pPr marL="0" indent="0"/>
+            <a:r>
+              <a:rPr lang="en-US" sz="1400" dirty="0"/>
+              <a:t>Screenshots: </a:t>
+            </a:r>
+            <a:r>
+              <a:rPr lang="en-US" sz="1400" dirty="0">
+                <a:hlinkClick r:id="rId2"/>
+              </a:rPr>
+              <a:t>https://sqlxpertise.com/2017/10/16/sys-dm_os_host_info-dmv-to-find-operating-system-information-in-sql-server-2017/</a:t>
+            </a:r>
+            <a:endParaRPr lang="en-US" sz="1400" dirty="0"/>
+          </a:p>
+          <a:p>
+            <a:pPr marL="457200" indent="-457200">
+              <a:buFont typeface="Arial" panose="020B0604020202020204" pitchFamily="34" charset="0"/>
+              <a:buChar char="•"/>
+            </a:pPr>
+            <a:endParaRPr lang="en-US" sz="3600" b="0" dirty="0"/>
+          </a:p>
+        </p:txBody>
+      </p:sp>
+      <p:pic>
+        <p:nvPicPr>
+          <p:cNvPr id="1026" name="Picture 2" descr="capture20171016105801406">
+            <a:extLst>
+              <a:ext uri="{FF2B5EF4-FFF2-40B4-BE49-F238E27FC236}">
+                <a16:creationId xmlns:a16="http://schemas.microsoft.com/office/drawing/2014/main" id="{EC7CCFEC-7540-41C8-A24C-D79B0AEDD4AE}"/>
+              </a:ext>
+            </a:extLst>
+          </p:cNvPr>
+          <p:cNvPicPr>
+            <a:picLocks noChangeAspect="1" noChangeArrowheads="1"/>
+          </p:cNvPicPr>
+          <p:nvPr/>
+        </p:nvPicPr>
+        <p:blipFill>
+          <a:blip r:embed="rId3">
+            <a:extLst>
+              <a:ext uri="{28A0092B-C50C-407E-A947-70E740481C1C}">
+                <a14:useLocalDpi xmlns:a14="http://schemas.microsoft.com/office/drawing/2010/main" val="0"/>
+              </a:ext>
+            </a:extLst>
+          </a:blip>
+          <a:srcRect/>
+          <a:stretch>
+            <a:fillRect/>
+          </a:stretch>
+        </p:blipFill>
+        <p:spPr bwMode="auto">
+          <a:xfrm>
+            <a:off x="809625" y="3400425"/>
+            <a:ext cx="6825224" cy="975032"/>
+          </a:xfrm>
+          <a:prstGeom prst="rect">
+            <a:avLst/>
+          </a:prstGeom>
+          <a:noFill/>
+          <a:extLst>
+            <a:ext uri="{909E8E84-426E-40DD-AFC4-6F175D3DCCD1}">
+              <a14:hiddenFill xmlns:a14="http://schemas.microsoft.com/office/drawing/2010/main">
+                <a:solidFill>
+                  <a:srgbClr val="FFFFFF"/>
+                </a:solidFill>
+              </a14:hiddenFill>
+            </a:ext>
+          </a:extLst>
+        </p:spPr>
+      </p:pic>
+      <p:pic>
+        <p:nvPicPr>
+          <p:cNvPr id="1028" name="Picture 4" descr="capture20171016105834926">
+            <a:extLst>
+              <a:ext uri="{FF2B5EF4-FFF2-40B4-BE49-F238E27FC236}">
+                <a16:creationId xmlns:a16="http://schemas.microsoft.com/office/drawing/2014/main" id="{CE28B9D9-B8AC-42AC-9E1F-F1CE679CCAF5}"/>
+              </a:ext>
+            </a:extLst>
+          </p:cNvPr>
+          <p:cNvPicPr>
+            <a:picLocks noChangeAspect="1" noChangeArrowheads="1"/>
+          </p:cNvPicPr>
+          <p:nvPr/>
+        </p:nvPicPr>
+        <p:blipFill>
+          <a:blip r:embed="rId4">
+            <a:extLst>
+              <a:ext uri="{28A0092B-C50C-407E-A947-70E740481C1C}">
+                <a14:useLocalDpi xmlns:a14="http://schemas.microsoft.com/office/drawing/2010/main" val="0"/>
+              </a:ext>
+            </a:extLst>
+          </a:blip>
+          <a:srcRect/>
+          <a:stretch>
+            <a:fillRect/>
+          </a:stretch>
+        </p:blipFill>
+        <p:spPr bwMode="auto">
+          <a:xfrm>
+            <a:off x="809625" y="4495800"/>
+            <a:ext cx="6882581" cy="1066800"/>
+          </a:xfrm>
+          <a:prstGeom prst="rect">
+            <a:avLst/>
+          </a:prstGeom>
+          <a:noFill/>
+          <a:extLst>
+            <a:ext uri="{909E8E84-426E-40DD-AFC4-6F175D3DCCD1}">
+              <a14:hiddenFill xmlns:a14="http://schemas.microsoft.com/office/drawing/2010/main">
+                <a:solidFill>
+                  <a:srgbClr val="FFFFFF"/>
+                </a:solidFill>
+              </a14:hiddenFill>
+            </a:ext>
+          </a:extLst>
+        </p:spPr>
+      </p:pic>
+    </p:spTree>
+    <p:extLst>
+      <p:ext uri="{BB962C8B-B14F-4D97-AF65-F5344CB8AC3E}">
+        <p14:creationId xmlns:p14="http://schemas.microsoft.com/office/powerpoint/2010/main" val="1487812985"/>
+      </p:ext>
+    </p:extLst>
+  </p:cSld>
+  <p:clrMapOvr>
+    <a:masterClrMapping/>
+  </p:clrMapOvr>
+</p:sld>
+</file>
+
+<file path=ppt/slides/slide73.xml><?xml version="1.0" encoding="utf-8"?>
+<p:sld xmlns:a="http://schemas.openxmlformats.org/drawingml/2006/main" xmlns:r="http://schemas.openxmlformats.org/officeDocument/2006/relationships" xmlns:p="http://schemas.openxmlformats.org/presentationml/2006/main">
+  <p:cSld>
+    <p:spTree>
+      <p:nvGrpSpPr>
+        <p:cNvPr id="1" name=""/>
+        <p:cNvGrpSpPr/>
+        <p:nvPr/>
+      </p:nvGrpSpPr>
+      <p:grpSpPr>
+        <a:xfrm>
+          <a:off x="0" y="0"/>
+          <a:ext cx="0" cy="0"/>
+          <a:chOff x="0" y="0"/>
+          <a:chExt cx="0" cy="0"/>
+        </a:xfrm>
+      </p:grpSpPr>
+      <p:sp>
+        <p:nvSpPr>
           <p:cNvPr id="2" name="Title 1"/>
           <p:cNvSpPr>
             <a:spLocks noGrp="1"/>
@@ -29406,7 +29863,7 @@
 </p:sld>
 </file>
 
-<file path=ppt/slides/slide72.xml><?xml version="1.0" encoding="utf-8"?>
+<file path=ppt/slides/slide74.xml><?xml version="1.0" encoding="utf-8"?>
 <p:sld xmlns:a="http://schemas.openxmlformats.org/drawingml/2006/main" xmlns:r="http://schemas.openxmlformats.org/officeDocument/2006/relationships" xmlns:p="http://schemas.openxmlformats.org/presentationml/2006/main">
   <p:cSld>
     <p:spTree>
@@ -29979,7 +30436,7 @@
 </p:sld>
 </file>
 
-<file path=ppt/slides/slide73.xml><?xml version="1.0" encoding="utf-8"?>
+<file path=ppt/slides/slide75.xml><?xml version="1.0" encoding="utf-8"?>
 <p:sld xmlns:a="http://schemas.openxmlformats.org/drawingml/2006/main" xmlns:r="http://schemas.openxmlformats.org/officeDocument/2006/relationships" xmlns:p="http://schemas.openxmlformats.org/presentationml/2006/main">
   <p:cSld>
     <p:spTree>
@@ -30194,322 +30651,6 @@
 </p:sld>
 </file>
 
-<file path=ppt/slides/slide74.xml><?xml version="1.0" encoding="utf-8"?>
-<p:sld xmlns:a="http://schemas.openxmlformats.org/drawingml/2006/main" xmlns:r="http://schemas.openxmlformats.org/officeDocument/2006/relationships" xmlns:p="http://schemas.openxmlformats.org/presentationml/2006/main">
-  <p:cSld>
-    <p:spTree>
-      <p:nvGrpSpPr>
-        <p:cNvPr id="1" name=""/>
-        <p:cNvGrpSpPr/>
-        <p:nvPr/>
-      </p:nvGrpSpPr>
-      <p:grpSpPr>
-        <a:xfrm>
-          <a:off x="0" y="0"/>
-          <a:ext cx="0" cy="0"/>
-          <a:chOff x="0" y="0"/>
-          <a:chExt cx="0" cy="0"/>
-        </a:xfrm>
-      </p:grpSpPr>
-      <p:sp>
-        <p:nvSpPr>
-          <p:cNvPr id="2" name="Title 1"/>
-          <p:cNvSpPr>
-            <a:spLocks noGrp="1"/>
-          </p:cNvSpPr>
-          <p:nvPr>
-            <p:ph type="title"/>
-          </p:nvPr>
-        </p:nvSpPr>
-        <p:spPr/>
-        <p:txBody>
-          <a:bodyPr/>
-          <a:lstStyle/>
-          <a:p>
-            <a:r>
-              <a:rPr lang="en-US" b="1" dirty="0" err="1"/>
-              <a:t>sys.dm_DB_LOG_STATS</a:t>
-            </a:r>
-            <a:endParaRPr lang="en-US" dirty="0"/>
-          </a:p>
-        </p:txBody>
-      </p:sp>
-      <p:sp>
-        <p:nvSpPr>
-          <p:cNvPr id="3" name="Content Placeholder 2"/>
-          <p:cNvSpPr>
-            <a:spLocks noGrp="1"/>
-          </p:cNvSpPr>
-          <p:nvPr>
-            <p:ph idx="1"/>
-          </p:nvPr>
-        </p:nvSpPr>
-        <p:spPr>
-          <a:xfrm>
-            <a:off x="609600" y="838201"/>
-            <a:ext cx="10972800" cy="5638799"/>
-          </a:xfrm>
-        </p:spPr>
-        <p:txBody>
-          <a:bodyPr>
-            <a:normAutofit/>
-          </a:bodyPr>
-          <a:lstStyle/>
-          <a:p>
-            <a:pPr marL="571500" indent="-571500">
-              <a:buFont typeface="Arial" panose="020B0604020202020204" pitchFamily="34" charset="0"/>
-              <a:buChar char="•"/>
-            </a:pPr>
-            <a:r>
-              <a:rPr lang="en-US" sz="4000" b="0" dirty="0"/>
-              <a:t>New for SQL 2016 SP2+ and SQL 2017</a:t>
-            </a:r>
-          </a:p>
-          <a:p>
-            <a:pPr marL="571500" indent="-571500">
-              <a:buFont typeface="Arial" panose="020B0604020202020204" pitchFamily="34" charset="0"/>
-              <a:buChar char="•"/>
-            </a:pPr>
-            <a:r>
-              <a:rPr lang="en-US" sz="4000" b="0" dirty="0"/>
-              <a:t>A handy DBA-friendly </a:t>
-            </a:r>
-            <a:r>
-              <a:rPr lang="en-US" sz="4000" dirty="0"/>
-              <a:t>one-stop-shop</a:t>
-            </a:r>
-            <a:r>
-              <a:rPr lang="en-US" sz="4000" b="0" dirty="0"/>
-              <a:t> dashboard of </a:t>
-            </a:r>
-            <a:r>
-              <a:rPr lang="en-US" sz="4000" dirty="0"/>
-              <a:t>transaction log</a:t>
-            </a:r>
-            <a:r>
-              <a:rPr lang="en-US" sz="4000" b="0" dirty="0"/>
-              <a:t> metrics including:</a:t>
-            </a:r>
-          </a:p>
-          <a:p>
-            <a:pPr marL="971550" lvl="1" indent="-571500">
-              <a:buFont typeface="Arial" panose="020B0604020202020204" pitchFamily="34" charset="0"/>
-              <a:buChar char="•"/>
-            </a:pPr>
-            <a:r>
-              <a:rPr lang="en-US" sz="3600" b="0" dirty="0"/>
-              <a:t>	VLF size and counts</a:t>
-            </a:r>
-          </a:p>
-          <a:p>
-            <a:pPr marL="971550" lvl="1" indent="-571500">
-              <a:buFont typeface="Arial" panose="020B0604020202020204" pitchFamily="34" charset="0"/>
-              <a:buChar char="•"/>
-            </a:pPr>
-            <a:r>
-              <a:rPr lang="en-US" sz="3600" b="0" dirty="0"/>
-              <a:t>	log reuse reason</a:t>
-            </a:r>
-          </a:p>
-          <a:p>
-            <a:pPr marL="971550" lvl="1" indent="-571500">
-              <a:buFont typeface="Arial" panose="020B0604020202020204" pitchFamily="34" charset="0"/>
-              <a:buChar char="•"/>
-            </a:pPr>
-            <a:r>
-              <a:rPr lang="en-US" sz="3600" b="0" dirty="0"/>
-              <a:t>	backups</a:t>
-            </a:r>
-          </a:p>
-          <a:p>
-            <a:pPr marL="571500" indent="-571500">
-              <a:buFont typeface="Arial" panose="020B0604020202020204" pitchFamily="34" charset="0"/>
-              <a:buChar char="•"/>
-            </a:pPr>
-            <a:r>
-              <a:rPr lang="en-US" sz="3600" b="0" dirty="0"/>
-              <a:t>Use this instead of </a:t>
-            </a:r>
-            <a:r>
-              <a:rPr lang="en-US" sz="3600" dirty="0"/>
-              <a:t>DBCC </a:t>
-            </a:r>
-            <a:r>
-              <a:rPr lang="en-US" sz="3600" dirty="0" err="1"/>
-              <a:t>LogInfo</a:t>
-            </a:r>
-            <a:r>
-              <a:rPr lang="en-US" sz="3600" dirty="0"/>
-              <a:t> </a:t>
-            </a:r>
-            <a:r>
-              <a:rPr lang="en-US" sz="3600" b="0" dirty="0"/>
-              <a:t>(deprecated)</a:t>
-            </a:r>
-          </a:p>
-        </p:txBody>
-      </p:sp>
-    </p:spTree>
-    <p:extLst>
-      <p:ext uri="{BB962C8B-B14F-4D97-AF65-F5344CB8AC3E}">
-        <p14:creationId xmlns:p14="http://schemas.microsoft.com/office/powerpoint/2010/main" val="3087763764"/>
-      </p:ext>
-    </p:extLst>
-  </p:cSld>
-  <p:clrMapOvr>
-    <a:masterClrMapping/>
-  </p:clrMapOvr>
-</p:sld>
-</file>
-
-<file path=ppt/slides/slide75.xml><?xml version="1.0" encoding="utf-8"?>
-<p:sld xmlns:a="http://schemas.openxmlformats.org/drawingml/2006/main" xmlns:r="http://schemas.openxmlformats.org/officeDocument/2006/relationships" xmlns:p="http://schemas.openxmlformats.org/presentationml/2006/main">
-  <p:cSld>
-    <p:spTree>
-      <p:nvGrpSpPr>
-        <p:cNvPr id="1" name=""/>
-        <p:cNvGrpSpPr/>
-        <p:nvPr/>
-      </p:nvGrpSpPr>
-      <p:grpSpPr>
-        <a:xfrm>
-          <a:off x="0" y="0"/>
-          <a:ext cx="0" cy="0"/>
-          <a:chOff x="0" y="0"/>
-          <a:chExt cx="0" cy="0"/>
-        </a:xfrm>
-      </p:grpSpPr>
-      <p:sp>
-        <p:nvSpPr>
-          <p:cNvPr id="2" name="Title 1"/>
-          <p:cNvSpPr>
-            <a:spLocks noGrp="1"/>
-          </p:cNvSpPr>
-          <p:nvPr>
-            <p:ph type="title"/>
-          </p:nvPr>
-        </p:nvSpPr>
-        <p:spPr/>
-        <p:txBody>
-          <a:bodyPr/>
-          <a:lstStyle/>
-          <a:p>
-            <a:r>
-              <a:rPr lang="en-US" dirty="0" err="1"/>
-              <a:t>Sys.dm_io_virtual_file_stats</a:t>
-            </a:r>
-            <a:endParaRPr lang="en-US" dirty="0"/>
-          </a:p>
-        </p:txBody>
-      </p:sp>
-      <p:sp>
-        <p:nvSpPr>
-          <p:cNvPr id="3" name="Content Placeholder 2"/>
-          <p:cNvSpPr>
-            <a:spLocks noGrp="1"/>
-          </p:cNvSpPr>
-          <p:nvPr>
-            <p:ph idx="1"/>
-          </p:nvPr>
-        </p:nvSpPr>
-        <p:spPr/>
-        <p:txBody>
-          <a:bodyPr>
-            <a:normAutofit fontScale="92500" lnSpcReduction="20000"/>
-          </a:bodyPr>
-          <a:lstStyle/>
-          <a:p>
-            <a:pPr marL="571500" indent="-571500">
-              <a:buFont typeface="Arial" panose="020B0604020202020204" pitchFamily="34" charset="0"/>
-              <a:buChar char="•"/>
-            </a:pPr>
-            <a:r>
-              <a:rPr lang="en-US" sz="3600" b="0" dirty="0"/>
-              <a:t>Includes an ascending counter that can be used to measure the data volume over intervals </a:t>
-            </a:r>
-          </a:p>
-          <a:p>
-            <a:pPr marL="571500" indent="-571500">
-              <a:buFont typeface="Arial" panose="020B0604020202020204" pitchFamily="34" charset="0"/>
-              <a:buChar char="•"/>
-            </a:pPr>
-            <a:r>
-              <a:rPr lang="en-US" sz="3600" b="0" dirty="0"/>
-              <a:t>For example:</a:t>
-            </a:r>
-          </a:p>
-          <a:p>
-            <a:pPr marL="971550" lvl="1" indent="-571500">
-              <a:buFont typeface="Arial" panose="020B0604020202020204" pitchFamily="34" charset="0"/>
-              <a:buChar char="•"/>
-            </a:pPr>
-            <a:r>
-              <a:rPr lang="en-US" sz="3200" b="0" dirty="0"/>
-              <a:t>Number of reads/writes issued to a file</a:t>
-            </a:r>
-          </a:p>
-          <a:p>
-            <a:pPr marL="971550" lvl="1" indent="-571500">
-              <a:buFont typeface="Arial" panose="020B0604020202020204" pitchFamily="34" charset="0"/>
-              <a:buChar char="•"/>
-            </a:pPr>
-            <a:r>
-              <a:rPr lang="en-US" sz="3200" b="0" dirty="0"/>
-              <a:t>Read/writes volume in bytes</a:t>
-            </a:r>
-          </a:p>
-          <a:p>
-            <a:pPr marL="971550" lvl="1" indent="-571500">
-              <a:buFont typeface="Arial" panose="020B0604020202020204" pitchFamily="34" charset="0"/>
-              <a:buChar char="•"/>
-            </a:pPr>
-            <a:r>
-              <a:rPr lang="en-US" sz="3200" b="0" dirty="0"/>
-              <a:t>IO waits/stall per file </a:t>
-            </a:r>
-          </a:p>
-          <a:p>
-            <a:pPr marL="971550" lvl="1" indent="-571500">
-              <a:buFont typeface="Arial" panose="020B0604020202020204" pitchFamily="34" charset="0"/>
-              <a:buChar char="•"/>
-            </a:pPr>
-            <a:r>
-              <a:rPr lang="en-US" sz="3200" b="0" dirty="0"/>
-              <a:t>overall IO latency for reads/writes</a:t>
-            </a:r>
-          </a:p>
-          <a:p>
-            <a:endParaRPr lang="en-US" sz="3600" dirty="0"/>
-          </a:p>
-          <a:p>
-            <a:r>
-              <a:rPr lang="en-US" sz="3600" dirty="0"/>
-              <a:t>Lab:</a:t>
-            </a:r>
-          </a:p>
-          <a:p>
-            <a:pPr lvl="1"/>
-            <a:r>
-              <a:rPr lang="en-US" sz="3200" dirty="0" err="1"/>
-              <a:t>record_dm_io_virtual_file_stats.sql</a:t>
-            </a:r>
-            <a:endParaRPr lang="en-US" sz="3200" dirty="0"/>
-          </a:p>
-        </p:txBody>
-      </p:sp>
-    </p:spTree>
-    <p:extLst>
-      <p:ext uri="{BB962C8B-B14F-4D97-AF65-F5344CB8AC3E}">
-        <p14:creationId xmlns:p14="http://schemas.microsoft.com/office/powerpoint/2010/main" val="3973702991"/>
-      </p:ext>
-    </p:extLst>
-  </p:cSld>
-  <p:clrMapOvr>
-    <a:masterClrMapping/>
-  </p:clrMapOvr>
-</p:sld>
-</file>
-
 <file path=ppt/slides/slide76.xml><?xml version="1.0" encoding="utf-8"?>
 <p:sld xmlns:a="http://schemas.openxmlformats.org/drawingml/2006/main" xmlns:r="http://schemas.openxmlformats.org/officeDocument/2006/relationships" xmlns:p="http://schemas.openxmlformats.org/presentationml/2006/main">
   <p:cSld>
@@ -30543,8 +30684,8 @@
           <a:lstStyle/>
           <a:p>
             <a:r>
-              <a:rPr lang="en-US" dirty="0" err="1"/>
-              <a:t>Sys.dm_OS_RING_BUFFERS</a:t>
+              <a:rPr lang="en-US" b="1" dirty="0" err="1"/>
+              <a:t>sys.dm_DB_LOG_STATS</a:t>
             </a:r>
             <a:endParaRPr lang="en-US" dirty="0"/>
           </a:p>
@@ -30562,152 +30703,113 @@
         </p:nvSpPr>
         <p:spPr>
           <a:xfrm>
-            <a:off x="304800" y="838201"/>
-            <a:ext cx="11582400" cy="5714999"/>
+            <a:off x="609600" y="838201"/>
+            <a:ext cx="10972800" cy="5638799"/>
           </a:xfrm>
         </p:spPr>
         <p:txBody>
           <a:bodyPr>
-            <a:normAutofit fontScale="92500"/>
+            <a:normAutofit/>
           </a:bodyPr>
           <a:lstStyle/>
           <a:p>
+            <a:pPr marL="571500" indent="-571500">
+              <a:buFont typeface="Arial" panose="020B0604020202020204" pitchFamily="34" charset="0"/>
+              <a:buChar char="•"/>
+            </a:pPr>
+            <a:r>
+              <a:rPr lang="en-US" sz="4000" b="0" dirty="0"/>
+              <a:t>New for SQL 2016 SP2+ and SQL 2017</a:t>
+            </a:r>
+          </a:p>
+          <a:p>
+            <a:pPr marL="571500" indent="-571500">
+              <a:buFont typeface="Arial" panose="020B0604020202020204" pitchFamily="34" charset="0"/>
+              <a:buChar char="•"/>
+            </a:pPr>
+            <a:r>
+              <a:rPr lang="en-US" sz="4000" b="0" dirty="0"/>
+              <a:t>A handy DBA-friendly </a:t>
+            </a:r>
+            <a:r>
+              <a:rPr lang="en-US" sz="4000" dirty="0"/>
+              <a:t>one-stop-shop</a:t>
+            </a:r>
+            <a:r>
+              <a:rPr lang="en-US" sz="4000" b="0" dirty="0"/>
+              <a:t> dashboard of </a:t>
+            </a:r>
+            <a:r>
+              <a:rPr lang="en-US" sz="4000" dirty="0"/>
+              <a:t>transaction log</a:t>
+            </a:r>
+            <a:r>
+              <a:rPr lang="en-US" sz="4000" b="0" dirty="0"/>
+              <a:t> metrics including:</a:t>
+            </a:r>
+          </a:p>
+          <a:p>
+            <a:pPr marL="971550" lvl="1" indent="-571500">
+              <a:buFont typeface="Arial" panose="020B0604020202020204" pitchFamily="34" charset="0"/>
+              <a:buChar char="•"/>
+            </a:pPr>
             <a:r>
               <a:rPr lang="en-US" sz="3600" b="0" dirty="0"/>
-              <a:t>Access to ring buffer endpoints of </a:t>
+              <a:t>	VLF size and counts</a:t>
+            </a:r>
+          </a:p>
+          <a:p>
+            <a:pPr marL="971550" lvl="1" indent="-571500">
+              <a:buFont typeface="Arial" panose="020B0604020202020204" pitchFamily="34" charset="0"/>
+              <a:buChar char="•"/>
+            </a:pPr>
+            <a:r>
+              <a:rPr lang="en-US" sz="3600" b="0" dirty="0"/>
+              <a:t>	log reuse reason</a:t>
+            </a:r>
+          </a:p>
+          <a:p>
+            <a:pPr marL="971550" lvl="1" indent="-571500">
+              <a:buFont typeface="Arial" panose="020B0604020202020204" pitchFamily="34" charset="0"/>
+              <a:buChar char="•"/>
+            </a:pPr>
+            <a:r>
+              <a:rPr lang="en-US" sz="3600" b="0" dirty="0"/>
+              <a:t>	backups</a:t>
+            </a:r>
+          </a:p>
+          <a:p>
+            <a:pPr marL="571500" indent="-571500">
+              <a:buFont typeface="Arial" panose="020B0604020202020204" pitchFamily="34" charset="0"/>
+              <a:buChar char="•"/>
+            </a:pPr>
+            <a:r>
+              <a:rPr lang="en-US" sz="3600" b="0" dirty="0"/>
+              <a:t>Use this instead of </a:t>
+            </a:r>
+            <a:r>
+              <a:rPr lang="en-US" sz="3600" dirty="0"/>
+              <a:t>DBCC </a:t>
             </a:r>
             <a:r>
               <a:rPr lang="en-US" sz="3600" dirty="0" err="1"/>
-              <a:t>XEvents</a:t>
-            </a:r>
-            <a:r>
-              <a:rPr lang="en-US" sz="3600" b="0" dirty="0"/>
-              <a:t> sessions</a:t>
-            </a:r>
-          </a:p>
-          <a:p>
-            <a:r>
-              <a:rPr lang="en-US" sz="3600" b="0" dirty="0"/>
-              <a:t>The System Health session already gathers a lot of data, including a history of </a:t>
-            </a:r>
-            <a:r>
-              <a:rPr lang="en-US" sz="3600" dirty="0"/>
-              <a:t>CPU,</a:t>
-            </a:r>
-            <a:r>
-              <a:rPr lang="en-US" sz="3600" b="0" dirty="0"/>
-              <a:t> </a:t>
-            </a:r>
-            <a:r>
-              <a:rPr lang="en-US" sz="3600" dirty="0"/>
-              <a:t>Memory</a:t>
-            </a:r>
-            <a:r>
-              <a:rPr lang="en-US" sz="3600" b="0" dirty="0"/>
-              <a:t> utilization.</a:t>
-            </a:r>
-          </a:p>
-          <a:p>
-            <a:r>
-              <a:rPr lang="en-US" sz="3600" b="0" dirty="0"/>
-              <a:t>The default </a:t>
-            </a:r>
-            <a:r>
-              <a:rPr lang="en-US" sz="3600" dirty="0" err="1"/>
-              <a:t>system_health</a:t>
+              <a:t>LogInfo</a:t>
             </a:r>
             <a:r>
               <a:rPr lang="en-US" sz="3600" dirty="0"/>
               <a:t> </a:t>
             </a:r>
             <a:r>
-              <a:rPr lang="en-US" sz="3600" dirty="0" err="1"/>
-              <a:t>xevent</a:t>
-            </a:r>
-            <a:r>
-              <a:rPr lang="en-US" sz="3600" dirty="0"/>
-              <a:t> session </a:t>
-            </a:r>
-            <a:r>
               <a:rPr lang="en-US" sz="3600" b="0" dirty="0"/>
-              <a:t>the only way to find </a:t>
-            </a:r>
-            <a:r>
-              <a:rPr lang="en-US" sz="3600" dirty="0"/>
-              <a:t>Deadlocks</a:t>
-            </a:r>
-            <a:r>
-              <a:rPr lang="en-US" sz="3600" b="0" dirty="0"/>
-              <a:t> in the recent past without having set up anything to capture them. It writes to </a:t>
-            </a:r>
-            <a:r>
-              <a:rPr lang="en-US" sz="3600" b="0" dirty="0" err="1"/>
-              <a:t>ring_buffer</a:t>
-            </a:r>
-            <a:r>
-              <a:rPr lang="en-US" sz="3600" b="0" dirty="0"/>
-              <a:t> and .</a:t>
-            </a:r>
-            <a:r>
-              <a:rPr lang="en-US" sz="3600" b="0" dirty="0" err="1"/>
-              <a:t>xel</a:t>
-            </a:r>
-            <a:r>
-              <a:rPr lang="en-US" sz="3600" b="0" dirty="0"/>
-              <a:t>.</a:t>
-            </a:r>
-          </a:p>
-          <a:p>
-            <a:r>
-              <a:rPr lang="en-US" sz="3600" dirty="0"/>
-              <a:t>Lab:</a:t>
-            </a:r>
-          </a:p>
-          <a:p>
-            <a:pPr lvl="1"/>
-            <a:r>
-              <a:rPr lang="da-DK" sz="3200" dirty="0"/>
-              <a:t>sys_dm_os_ring_buffers.sql </a:t>
-            </a:r>
-          </a:p>
-          <a:p>
-            <a:pPr lvl="1"/>
-            <a:r>
-              <a:rPr lang="en-US" sz="3200" dirty="0"/>
-              <a:t>deadlocks in </a:t>
-            </a:r>
-            <a:r>
-              <a:rPr lang="en-US" sz="3200" dirty="0" err="1"/>
-              <a:t>xevents.sql</a:t>
-            </a:r>
-            <a:endParaRPr lang="en-US" sz="3200" dirty="0"/>
-          </a:p>
-          <a:p>
-            <a:pPr lvl="1"/>
-            <a:r>
-              <a:rPr lang="en-US" sz="3200" dirty="0" err="1"/>
-              <a:t>cpu</a:t>
-            </a:r>
-            <a:r>
-              <a:rPr lang="en-US" sz="3200" dirty="0"/>
-              <a:t> </a:t>
-            </a:r>
-            <a:r>
-              <a:rPr lang="en-US" sz="3200" dirty="0" err="1"/>
-              <a:t>utilization.sql</a:t>
-            </a:r>
-            <a:endParaRPr lang="en-US" sz="3200" dirty="0"/>
-          </a:p>
-          <a:p>
-            <a:pPr lvl="1"/>
-            <a:endParaRPr lang="en-US" sz="3200" dirty="0"/>
+              <a:t>(deprecated)</a:t>
+            </a:r>
           </a:p>
         </p:txBody>
       </p:sp>
     </p:spTree>
     <p:extLst>
       <p:ext uri="{BB962C8B-B14F-4D97-AF65-F5344CB8AC3E}">
-        <p14:creationId xmlns:p14="http://schemas.microsoft.com/office/powerpoint/2010/main" val="847228155"/>
+        <p14:creationId xmlns:p14="http://schemas.microsoft.com/office/powerpoint/2010/main" val="3087763764"/>
       </p:ext>
     </p:extLst>
   </p:cSld>
@@ -30751,7 +30853,7 @@
           <a:p>
             <a:r>
               <a:rPr lang="en-US" dirty="0" err="1"/>
-              <a:t>sys.dm_hadr_cluster</a:t>
+              <a:t>Sys.dm_io_virtual_file_stats</a:t>
             </a:r>
             <a:endParaRPr lang="en-US" dirty="0"/>
           </a:p>
@@ -30767,104 +30869,95 @@
             <p:ph idx="1"/>
           </p:nvPr>
         </p:nvSpPr>
-        <p:spPr>
-          <a:xfrm>
-            <a:off x="304800" y="838200"/>
-            <a:ext cx="11582400" cy="5791200"/>
-          </a:xfrm>
-        </p:spPr>
+        <p:spPr/>
         <p:txBody>
           <a:bodyPr>
-            <a:normAutofit/>
+            <a:normAutofit fontScale="92500" lnSpcReduction="20000"/>
           </a:bodyPr>
           <a:lstStyle/>
           <a:p>
-            <a:r>
-              <a:rPr lang="en-US" sz="4000" b="0" dirty="0"/>
-              <a:t>Returns information about Availability Groups</a:t>
+            <a:pPr marL="571500" indent="-571500">
+              <a:buFont typeface="Arial" panose="020B0604020202020204" pitchFamily="34" charset="0"/>
+              <a:buChar char="•"/>
+            </a:pPr>
+            <a:r>
+              <a:rPr lang="en-US" sz="3600" b="0" dirty="0"/>
+              <a:t>Includes an ascending counter that can be used to measure the data volume over intervals </a:t>
+            </a:r>
+          </a:p>
+          <a:p>
+            <a:pPr marL="571500" indent="-571500">
+              <a:buFont typeface="Arial" panose="020B0604020202020204" pitchFamily="34" charset="0"/>
+              <a:buChar char="•"/>
+            </a:pPr>
+            <a:r>
+              <a:rPr lang="en-US" sz="3600" b="0" dirty="0"/>
+              <a:t>For example:</a:t>
+            </a:r>
+          </a:p>
+          <a:p>
+            <a:pPr marL="971550" lvl="1" indent="-571500">
+              <a:buFont typeface="Arial" panose="020B0604020202020204" pitchFamily="34" charset="0"/>
+              <a:buChar char="•"/>
+            </a:pPr>
+            <a:r>
+              <a:rPr lang="en-US" sz="3200" b="0" dirty="0"/>
+              <a:t>Number of reads/writes issued to a file</a:t>
+            </a:r>
+          </a:p>
+          <a:p>
+            <a:pPr marL="971550" lvl="1" indent="-571500">
+              <a:buFont typeface="Arial" panose="020B0604020202020204" pitchFamily="34" charset="0"/>
+              <a:buChar char="•"/>
+            </a:pPr>
+            <a:r>
+              <a:rPr lang="en-US" sz="3200" b="0" dirty="0"/>
+              <a:t>Read/writes volume in bytes</a:t>
+            </a:r>
+          </a:p>
+          <a:p>
+            <a:pPr marL="971550" lvl="1" indent="-571500">
+              <a:buFont typeface="Arial" panose="020B0604020202020204" pitchFamily="34" charset="0"/>
+              <a:buChar char="•"/>
+            </a:pPr>
+            <a:r>
+              <a:rPr lang="en-US" sz="3200" b="0" dirty="0"/>
+              <a:t>IO waits/stall per file </a:t>
+            </a:r>
+          </a:p>
+          <a:p>
+            <a:pPr marL="971550" lvl="1" indent="-571500">
+              <a:buFont typeface="Arial" panose="020B0604020202020204" pitchFamily="34" charset="0"/>
+              <a:buChar char="•"/>
+            </a:pPr>
+            <a:r>
+              <a:rPr lang="en-US" sz="3200" b="0" dirty="0"/>
+              <a:t>overall IO latency for reads/writes</a:t>
+            </a:r>
+          </a:p>
+          <a:p>
+            <a:endParaRPr lang="en-US" sz="3600" dirty="0"/>
+          </a:p>
+          <a:p>
+            <a:r>
+              <a:rPr lang="en-US" sz="3600" dirty="0"/>
+              <a:t>Lab:</a:t>
             </a:r>
           </a:p>
           <a:p>
             <a:pPr lvl="1"/>
             <a:r>
-              <a:rPr lang="en-US" sz="3600" b="0" i="1" dirty="0"/>
-              <a:t>Not </a:t>
-            </a:r>
-            <a:r>
-              <a:rPr lang="en-US" sz="3600" b="0" i="1" dirty="0" err="1"/>
-              <a:t>AlwaysOn</a:t>
-            </a:r>
-            <a:r>
-              <a:rPr lang="en-US" sz="3600" b="0" i="1" dirty="0"/>
-              <a:t> cluster, not DAG… Availability Groups.</a:t>
-            </a:r>
-          </a:p>
-          <a:p>
-            <a:r>
-              <a:rPr lang="en-US" sz="4000" b="0" dirty="0"/>
-              <a:t>Doesn’t matter if primary or secondary, but many DMV’s </a:t>
-            </a:r>
-            <a:r>
-              <a:rPr lang="en-US" sz="4000" dirty="0"/>
-              <a:t>require you to run on the current primary</a:t>
-            </a:r>
-            <a:r>
-              <a:rPr lang="en-US" sz="4000" b="0" dirty="0"/>
-              <a:t> </a:t>
-            </a:r>
-            <a:r>
-              <a:rPr lang="en-US" sz="4000" dirty="0"/>
-              <a:t>replica </a:t>
-            </a:r>
-            <a:r>
-              <a:rPr lang="en-US" sz="4000" b="0" dirty="0"/>
-              <a:t>for an AG to see complete information.</a:t>
-            </a:r>
-          </a:p>
-          <a:p>
-            <a:r>
-              <a:rPr lang="en-US" sz="4000" b="0" dirty="0"/>
-              <a:t>Also use </a:t>
-            </a:r>
-            <a:r>
-              <a:rPr lang="en-US" sz="4000" dirty="0" err="1"/>
-              <a:t>sys.dm_hadr_cluster_members</a:t>
-            </a:r>
-            <a:r>
-              <a:rPr lang="en-US" sz="4000" b="0" dirty="0"/>
-              <a:t> to see members.</a:t>
-            </a:r>
-          </a:p>
-          <a:p>
-            <a:endParaRPr lang="en-US" sz="4000" b="0" dirty="0"/>
-          </a:p>
-          <a:p>
-            <a:endParaRPr lang="en-US" sz="4000" b="0" dirty="0"/>
-          </a:p>
-          <a:p>
-            <a:endParaRPr lang="en-US" sz="4000" b="0" dirty="0"/>
-          </a:p>
-          <a:p>
-            <a:endParaRPr lang="en-US" sz="4000" b="0" dirty="0"/>
-          </a:p>
-          <a:p>
-            <a:endParaRPr lang="en-US" sz="4000" b="0" dirty="0"/>
-          </a:p>
-          <a:p>
-            <a:endParaRPr lang="en-US" sz="4000" b="0" dirty="0"/>
-          </a:p>
-          <a:p>
-            <a:endParaRPr lang="en-US" sz="4000" b="0" dirty="0"/>
-          </a:p>
-          <a:p>
-            <a:endParaRPr lang="en-US" sz="4000" dirty="0"/>
+              <a:rPr lang="en-US" sz="3200" dirty="0" err="1"/>
+              <a:t>record_dm_io_virtual_file_stats.sql</a:t>
+            </a:r>
+            <a:endParaRPr lang="en-US" sz="3200" dirty="0"/>
           </a:p>
         </p:txBody>
       </p:sp>
     </p:spTree>
     <p:extLst>
       <p:ext uri="{BB962C8B-B14F-4D97-AF65-F5344CB8AC3E}">
-        <p14:creationId xmlns:p14="http://schemas.microsoft.com/office/powerpoint/2010/main" val="4088082566"/>
+        <p14:creationId xmlns:p14="http://schemas.microsoft.com/office/powerpoint/2010/main" val="3973702991"/>
       </p:ext>
     </p:extLst>
   </p:cSld>
@@ -30908,7 +31001,7 @@
           <a:p>
             <a:r>
               <a:rPr lang="en-US" dirty="0" err="1"/>
-              <a:t>sys.dm_hadr_cluster</a:t>
+              <a:t>Sys.dm_OS_RING_BUFFERS</a:t>
             </a:r>
             <a:endParaRPr lang="en-US" dirty="0"/>
           </a:p>
@@ -30926,100 +31019,152 @@
         </p:nvSpPr>
         <p:spPr>
           <a:xfrm>
-            <a:off x="228600" y="838200"/>
-            <a:ext cx="11811000" cy="5791200"/>
+            <a:off x="304800" y="838201"/>
+            <a:ext cx="11582400" cy="5714999"/>
           </a:xfrm>
         </p:spPr>
         <p:txBody>
           <a:bodyPr>
-            <a:noAutofit/>
+            <a:normAutofit fontScale="92500"/>
           </a:bodyPr>
           <a:lstStyle/>
           <a:p>
             <a:r>
               <a:rPr lang="en-US" sz="3600" b="0" dirty="0"/>
-              <a:t>Combine with </a:t>
+              <a:t>Access to ring buffer endpoints of </a:t>
             </a:r>
             <a:r>
               <a:rPr lang="en-US" sz="3600" dirty="0" err="1"/>
-              <a:t>Sys.dm_hadr_database_replica_states</a:t>
+              <a:t>XEvents</a:t>
+            </a:r>
+            <a:r>
+              <a:rPr lang="en-US" sz="3600" b="0" dirty="0"/>
+              <a:t> sessions</a:t>
+            </a:r>
+          </a:p>
+          <a:p>
+            <a:r>
+              <a:rPr lang="en-US" sz="3600" b="0" dirty="0"/>
+              <a:t>The System Health session already gathers a lot of data, including a history of </a:t>
             </a:r>
             <a:r>
               <a:rPr lang="en-US" sz="3600" dirty="0"/>
-              <a:t>, </a:t>
-            </a:r>
-          </a:p>
-          <a:p>
-            <a:r>
-              <a:rPr lang="en-US" sz="3600" b="0" dirty="0"/>
-              <a:t>and </a:t>
-            </a:r>
-            <a:r>
-              <a:rPr lang="en-US" sz="3600" dirty="0" err="1"/>
-              <a:t>sys.dm_os_performance_counters</a:t>
-            </a:r>
-            <a:endParaRPr lang="en-US" sz="3600" dirty="0"/>
-          </a:p>
-          <a:p>
-            <a:r>
-              <a:rPr lang="en-US" sz="3600" b="0" dirty="0"/>
-              <a:t>for a performance snapshot of Availability Groups, </a:t>
-            </a:r>
-          </a:p>
-          <a:p>
-            <a:pPr marL="571500" indent="-571500">
-              <a:buFont typeface="Arial" panose="020B0604020202020204" pitchFamily="34" charset="0"/>
-              <a:buChar char="•"/>
-            </a:pPr>
-            <a:r>
-              <a:rPr lang="en-US" sz="3600" b="0" dirty="0"/>
-              <a:t>Including all current configuration, and endpoints</a:t>
-            </a:r>
-          </a:p>
-          <a:p>
-            <a:pPr marL="571500" indent="-571500">
-              <a:buFont typeface="Arial" panose="020B0604020202020204" pitchFamily="34" charset="0"/>
-              <a:buChar char="•"/>
-            </a:pPr>
-            <a:r>
-              <a:rPr lang="en-US" sz="3600" b="0" dirty="0"/>
-              <a:t>Including your current RPO/RTO (especially useful for asynchronous replicas) and last commits</a:t>
-            </a:r>
-          </a:p>
-          <a:p>
-            <a:r>
-              <a:rPr lang="en-US" sz="4000" dirty="0"/>
-              <a:t>Lab: </a:t>
-            </a:r>
-          </a:p>
-          <a:p>
-            <a:r>
-              <a:rPr lang="en-US" sz="4000" b="0" dirty="0"/>
-              <a:t>	</a:t>
-            </a:r>
-            <a:r>
-              <a:rPr lang="en-US" sz="3600" b="0" dirty="0"/>
-              <a:t>AG - </a:t>
-            </a:r>
-            <a:r>
-              <a:rPr lang="en-US" sz="3600" b="0" dirty="0" err="1"/>
-              <a:t>Monitor.sql</a:t>
+              <a:t>CPU,</a:t>
             </a:r>
             <a:r>
               <a:rPr lang="en-US" sz="3600" b="0" dirty="0"/>
               <a:t> </a:t>
             </a:r>
-          </a:p>
-          <a:p>
-            <a:pPr marL="0" indent="0"/>
-            <a:endParaRPr lang="en-US" sz="3600" b="0" dirty="0"/>
+            <a:r>
+              <a:rPr lang="en-US" sz="3600" dirty="0"/>
+              <a:t>Memory</a:t>
+            </a:r>
+            <a:r>
+              <a:rPr lang="en-US" sz="3600" b="0" dirty="0"/>
+              <a:t> utilization.</a:t>
+            </a:r>
+          </a:p>
+          <a:p>
+            <a:r>
+              <a:rPr lang="en-US" sz="3600" b="0" dirty="0"/>
+              <a:t>The default </a:t>
+            </a:r>
+            <a:r>
+              <a:rPr lang="en-US" sz="3600" dirty="0" err="1"/>
+              <a:t>system_health</a:t>
+            </a:r>
+            <a:r>
+              <a:rPr lang="en-US" sz="3600" dirty="0"/>
+              <a:t> </a:t>
+            </a:r>
+            <a:r>
+              <a:rPr lang="en-US" sz="3600" dirty="0" err="1"/>
+              <a:t>xevent</a:t>
+            </a:r>
+            <a:r>
+              <a:rPr lang="en-US" sz="3600" dirty="0"/>
+              <a:t> session </a:t>
+            </a:r>
+            <a:r>
+              <a:rPr lang="en-US" sz="3600" b="0" dirty="0"/>
+              <a:t>the only way to find </a:t>
+            </a:r>
+            <a:r>
+              <a:rPr lang="en-US" sz="3600" dirty="0"/>
+              <a:t>Deadlocks</a:t>
+            </a:r>
+            <a:r>
+              <a:rPr lang="en-US" sz="3600" b="0" dirty="0"/>
+              <a:t> in the recent past without having set up anything to capture them. It writes to </a:t>
+            </a:r>
+            <a:r>
+              <a:rPr lang="en-US" sz="3600" b="0" dirty="0" err="1"/>
+              <a:t>ring_buffer</a:t>
+            </a:r>
+            <a:r>
+              <a:rPr lang="en-US" sz="3600" b="0" dirty="0"/>
+              <a:t> and .</a:t>
+            </a:r>
+            <a:r>
+              <a:rPr lang="en-US" sz="3600" b="0" dirty="0" err="1"/>
+              <a:t>xel</a:t>
+            </a:r>
+            <a:r>
+              <a:rPr lang="en-US" sz="3600" b="0" dirty="0"/>
+              <a:t>.</a:t>
+            </a:r>
+          </a:p>
+          <a:p>
+            <a:r>
+              <a:rPr lang="en-US" sz="3600" dirty="0"/>
+              <a:t>Lab:</a:t>
+            </a:r>
+          </a:p>
+          <a:p>
+            <a:pPr lvl="1"/>
+            <a:r>
+              <a:rPr lang="da-DK" sz="3200" dirty="0"/>
+              <a:t>sys_dm_os_ring_buffers.sql </a:t>
+            </a:r>
+          </a:p>
+          <a:p>
+            <a:pPr lvl="1"/>
+            <a:r>
+              <a:rPr lang="en-US" sz="3200" dirty="0"/>
+              <a:t>deadlocks in </a:t>
+            </a:r>
+            <a:r>
+              <a:rPr lang="en-US" sz="3200" dirty="0" err="1"/>
+              <a:t>xevents.sql</a:t>
+            </a:r>
+            <a:endParaRPr lang="en-US" sz="3200" dirty="0"/>
+          </a:p>
+          <a:p>
+            <a:pPr lvl="1"/>
+            <a:r>
+              <a:rPr lang="en-US" sz="3200" dirty="0" err="1"/>
+              <a:t>cpu</a:t>
+            </a:r>
+            <a:r>
+              <a:rPr lang="en-US" sz="3200" dirty="0"/>
+              <a:t> </a:t>
+            </a:r>
+            <a:r>
+              <a:rPr lang="en-US" sz="3200" dirty="0" err="1"/>
+              <a:t>utilization.sql</a:t>
+            </a:r>
+            <a:endParaRPr lang="en-US" sz="3200" dirty="0"/>
+          </a:p>
+          <a:p>
+            <a:pPr lvl="1"/>
+            <a:endParaRPr lang="en-US" sz="3200" dirty="0"/>
           </a:p>
         </p:txBody>
       </p:sp>
     </p:spTree>
     <p:extLst>
       <p:ext uri="{BB962C8B-B14F-4D97-AF65-F5344CB8AC3E}">
-        <p14:creationId xmlns:p14="http://schemas.microsoft.com/office/powerpoint/2010/main" val="870192496"/>
+        <p14:creationId xmlns:p14="http://schemas.microsoft.com/office/powerpoint/2010/main" val="847228155"/>
       </p:ext>
     </p:extLst>
   </p:cSld>
@@ -31048,13 +31193,7 @@
       </p:grpSpPr>
       <p:sp>
         <p:nvSpPr>
-          <p:cNvPr id="2" name="Title 1">
-            <a:extLst>
-              <a:ext uri="{FF2B5EF4-FFF2-40B4-BE49-F238E27FC236}">
-                <a16:creationId xmlns:a16="http://schemas.microsoft.com/office/drawing/2014/main" id="{A0C9B3E2-ECEF-40CF-81BA-8E84CCCA5AC3}"/>
-              </a:ext>
-            </a:extLst>
-          </p:cNvPr>
+          <p:cNvPr id="2" name="Title 1"/>
           <p:cNvSpPr>
             <a:spLocks noGrp="1"/>
           </p:cNvSpPr>
@@ -31069,7 +31208,7 @@
           <a:p>
             <a:r>
               <a:rPr lang="en-US" dirty="0" err="1"/>
-              <a:t>Sys.dm_db_page_info</a:t>
+              <a:t>sys.dm_hadr_cluster</a:t>
             </a:r>
             <a:endParaRPr lang="en-US" dirty="0"/>
           </a:p>
@@ -31077,13 +31216,7 @@
       </p:sp>
       <p:sp>
         <p:nvSpPr>
-          <p:cNvPr id="3" name="Content Placeholder 2">
-            <a:extLst>
-              <a:ext uri="{FF2B5EF4-FFF2-40B4-BE49-F238E27FC236}">
-                <a16:creationId xmlns:a16="http://schemas.microsoft.com/office/drawing/2014/main" id="{8E0160BC-4DE6-42EB-9F8A-A2601FB8BEBA}"/>
-              </a:ext>
-            </a:extLst>
-          </p:cNvPr>
+          <p:cNvPr id="3" name="Content Placeholder 2"/>
           <p:cNvSpPr>
             <a:spLocks noGrp="1"/>
           </p:cNvSpPr>
@@ -31093,111 +31226,102 @@
         </p:nvSpPr>
         <p:spPr>
           <a:xfrm>
-            <a:off x="609600" y="838201"/>
-            <a:ext cx="10972800" cy="5791199"/>
+            <a:off x="304800" y="838200"/>
+            <a:ext cx="11582400" cy="5791200"/>
           </a:xfrm>
         </p:spPr>
         <p:txBody>
           <a:bodyPr>
-            <a:noAutofit/>
+            <a:normAutofit/>
           </a:bodyPr>
           <a:lstStyle/>
           <a:p>
-            <a:pPr>
-              <a:buFont typeface="Arial" panose="020B0604020202020204" pitchFamily="34" charset="0"/>
-              <a:buChar char="•"/>
-            </a:pPr>
-            <a:r>
-              <a:rPr lang="en-US" sz="3600" b="0" dirty="0"/>
-              <a:t>New in SQL 2019, replaces most of DBCC Page</a:t>
-            </a:r>
-          </a:p>
-          <a:p>
-            <a:pPr lvl="1">
-              <a:buFont typeface="Arial" panose="020B0604020202020204" pitchFamily="34" charset="0"/>
-              <a:buChar char="•"/>
-            </a:pPr>
-            <a:r>
-              <a:rPr lang="en-US" sz="3200" dirty="0"/>
-              <a:t>No need for trace flag 3604 to see data</a:t>
-            </a:r>
-          </a:p>
-          <a:p>
-            <a:pPr>
-              <a:buFont typeface="Arial" panose="020B0604020202020204" pitchFamily="34" charset="0"/>
-              <a:buChar char="•"/>
-            </a:pPr>
-            <a:r>
-              <a:rPr lang="en-US" sz="3600" b="0" dirty="0"/>
-              <a:t>DMF – can be joined to other DMO’s</a:t>
-            </a:r>
-          </a:p>
-          <a:p>
-            <a:pPr>
-              <a:buFont typeface="Arial" panose="020B0604020202020204" pitchFamily="34" charset="0"/>
-              <a:buChar char="•"/>
-            </a:pPr>
-            <a:r>
-              <a:rPr lang="en-US" sz="3600" b="0" dirty="0"/>
-              <a:t>Also new in SQL 2019, </a:t>
-            </a:r>
-            <a:r>
-              <a:rPr lang="en-US" sz="3600" dirty="0" err="1"/>
-              <a:t>sys.fn_PageResCracker</a:t>
-            </a:r>
-            <a:r>
-              <a:rPr lang="en-US" sz="3600" dirty="0"/>
-              <a:t>,</a:t>
-            </a:r>
-            <a:r>
-              <a:rPr lang="en-US" sz="3600" b="0" dirty="0"/>
-              <a:t> which accepts a hexadecimal from </a:t>
-            </a:r>
-            <a:r>
-              <a:rPr lang="en-US" sz="3600" dirty="0" err="1"/>
-              <a:t>sys.dm_exec_requests.page_resource</a:t>
-            </a:r>
-            <a:r>
-              <a:rPr lang="en-US" sz="3600" dirty="0"/>
+            <a:r>
+              <a:rPr lang="en-US" sz="4000" b="0" dirty="0"/>
+              <a:t>Returns information about Availability Groups</a:t>
+            </a:r>
+          </a:p>
+          <a:p>
+            <a:pPr lvl="1"/>
+            <a:r>
+              <a:rPr lang="en-US" sz="3600" b="0" i="1" dirty="0"/>
+              <a:t>Not </a:t>
+            </a:r>
+            <a:r>
+              <a:rPr lang="en-US" sz="3600" b="0" i="1" dirty="0" err="1"/>
+              <a:t>AlwaysOn</a:t>
+            </a:r>
+            <a:r>
+              <a:rPr lang="en-US" sz="3600" b="0" i="1" dirty="0"/>
+              <a:t> cluster, not DAG… Availability Groups.</a:t>
+            </a:r>
+          </a:p>
+          <a:p>
+            <a:r>
+              <a:rPr lang="en-US" sz="4000" b="0" dirty="0"/>
+              <a:t>Doesn’t matter if primary or secondary, but many DMV’s </a:t>
+            </a:r>
+            <a:r>
+              <a:rPr lang="en-US" sz="4000" dirty="0"/>
+              <a:t>require you to run on the current primary</a:t>
+            </a:r>
+            <a:r>
+              <a:rPr lang="en-US" sz="4000" b="0" dirty="0"/>
               <a:t> </a:t>
             </a:r>
             <a:r>
-              <a:rPr lang="en-US" sz="3600" b="0" dirty="0"/>
-              <a:t>if the </a:t>
-            </a:r>
-            <a:r>
-              <a:rPr lang="en-US" sz="3600" b="0" dirty="0" err="1"/>
-              <a:t>wait_resource</a:t>
-            </a:r>
-            <a:r>
-              <a:rPr lang="en-US" sz="3600" b="0" dirty="0"/>
-              <a:t> type is PAGE, to help you investigate.</a:t>
-            </a:r>
-          </a:p>
-          <a:p>
-            <a:pPr lvl="1">
-              <a:buFont typeface="Arial" panose="020B0604020202020204" pitchFamily="34" charset="0"/>
-              <a:buChar char="•"/>
-            </a:pPr>
-            <a:r>
-              <a:rPr lang="en-US" sz="3600" dirty="0"/>
-              <a:t>So, it’s limited. Doesn’t return info for other </a:t>
-            </a:r>
-            <a:r>
-              <a:rPr lang="en-US" sz="3600" dirty="0" err="1"/>
-              <a:t>wait_resources</a:t>
-            </a:r>
-            <a:r>
-              <a:rPr lang="en-US" sz="3600" dirty="0"/>
-              <a:t> like KEY.</a:t>
-            </a:r>
+              <a:rPr lang="en-US" sz="4000" dirty="0"/>
+              <a:t>replica </a:t>
+            </a:r>
+            <a:r>
+              <a:rPr lang="en-US" sz="4000" b="0" dirty="0"/>
+              <a:t>for an AG to see complete information.</a:t>
+            </a:r>
+          </a:p>
+          <a:p>
+            <a:r>
+              <a:rPr lang="en-US" sz="4000" b="0" dirty="0"/>
+              <a:t>Also use </a:t>
+            </a:r>
+            <a:r>
+              <a:rPr lang="en-US" sz="4000" dirty="0" err="1"/>
+              <a:t>sys.dm_hadr_cluster_members</a:t>
+            </a:r>
+            <a:r>
+              <a:rPr lang="en-US" sz="4000" b="0" dirty="0"/>
+              <a:t> to see members.</a:t>
+            </a:r>
+          </a:p>
+          <a:p>
+            <a:endParaRPr lang="en-US" sz="4000" b="0" dirty="0"/>
+          </a:p>
+          <a:p>
+            <a:endParaRPr lang="en-US" sz="4000" b="0" dirty="0"/>
+          </a:p>
+          <a:p>
+            <a:endParaRPr lang="en-US" sz="4000" b="0" dirty="0"/>
+          </a:p>
+          <a:p>
+            <a:endParaRPr lang="en-US" sz="4000" b="0" dirty="0"/>
+          </a:p>
+          <a:p>
+            <a:endParaRPr lang="en-US" sz="4000" b="0" dirty="0"/>
+          </a:p>
+          <a:p>
+            <a:endParaRPr lang="en-US" sz="4000" b="0" dirty="0"/>
+          </a:p>
+          <a:p>
+            <a:endParaRPr lang="en-US" sz="4000" b="0" dirty="0"/>
+          </a:p>
+          <a:p>
+            <a:endParaRPr lang="en-US" sz="4000" dirty="0"/>
           </a:p>
         </p:txBody>
       </p:sp>
     </p:spTree>
     <p:extLst>
       <p:ext uri="{BB962C8B-B14F-4D97-AF65-F5344CB8AC3E}">
-        <p14:creationId xmlns:p14="http://schemas.microsoft.com/office/powerpoint/2010/main" val="761558038"/>
+        <p14:creationId xmlns:p14="http://schemas.microsoft.com/office/powerpoint/2010/main" val="4088082566"/>
       </p:ext>
     </p:extLst>
   </p:cSld>
@@ -31697,6 +31821,339 @@
       </p:grpSpPr>
       <p:sp>
         <p:nvSpPr>
+          <p:cNvPr id="2" name="Title 1"/>
+          <p:cNvSpPr>
+            <a:spLocks noGrp="1"/>
+          </p:cNvSpPr>
+          <p:nvPr>
+            <p:ph type="title"/>
+          </p:nvPr>
+        </p:nvSpPr>
+        <p:spPr/>
+        <p:txBody>
+          <a:bodyPr/>
+          <a:lstStyle/>
+          <a:p>
+            <a:r>
+              <a:rPr lang="en-US" dirty="0" err="1"/>
+              <a:t>sys.dm_hadr_cluster</a:t>
+            </a:r>
+            <a:endParaRPr lang="en-US" dirty="0"/>
+          </a:p>
+        </p:txBody>
+      </p:sp>
+      <p:sp>
+        <p:nvSpPr>
+          <p:cNvPr id="3" name="Content Placeholder 2"/>
+          <p:cNvSpPr>
+            <a:spLocks noGrp="1"/>
+          </p:cNvSpPr>
+          <p:nvPr>
+            <p:ph idx="1"/>
+          </p:nvPr>
+        </p:nvSpPr>
+        <p:spPr>
+          <a:xfrm>
+            <a:off x="228600" y="838200"/>
+            <a:ext cx="11811000" cy="5791200"/>
+          </a:xfrm>
+        </p:spPr>
+        <p:txBody>
+          <a:bodyPr>
+            <a:noAutofit/>
+          </a:bodyPr>
+          <a:lstStyle/>
+          <a:p>
+            <a:r>
+              <a:rPr lang="en-US" sz="3600" b="0" dirty="0"/>
+              <a:t>Combine with </a:t>
+            </a:r>
+            <a:r>
+              <a:rPr lang="en-US" sz="3600" dirty="0" err="1"/>
+              <a:t>Sys.dm_hadr_database_replica_states</a:t>
+            </a:r>
+            <a:r>
+              <a:rPr lang="en-US" sz="3600" dirty="0"/>
+              <a:t>, </a:t>
+            </a:r>
+          </a:p>
+          <a:p>
+            <a:r>
+              <a:rPr lang="en-US" sz="3600" b="0" dirty="0"/>
+              <a:t>and </a:t>
+            </a:r>
+            <a:r>
+              <a:rPr lang="en-US" sz="3600" dirty="0" err="1"/>
+              <a:t>sys.dm_os_performance_counters</a:t>
+            </a:r>
+            <a:endParaRPr lang="en-US" sz="3600" dirty="0"/>
+          </a:p>
+          <a:p>
+            <a:r>
+              <a:rPr lang="en-US" sz="3600" b="0" dirty="0"/>
+              <a:t>for a performance snapshot of Availability Groups, </a:t>
+            </a:r>
+          </a:p>
+          <a:p>
+            <a:pPr marL="571500" indent="-571500">
+              <a:buFont typeface="Arial" panose="020B0604020202020204" pitchFamily="34" charset="0"/>
+              <a:buChar char="•"/>
+            </a:pPr>
+            <a:r>
+              <a:rPr lang="en-US" sz="3600" b="0" dirty="0"/>
+              <a:t>Including all current configuration, and endpoints</a:t>
+            </a:r>
+          </a:p>
+          <a:p>
+            <a:pPr marL="571500" indent="-571500">
+              <a:buFont typeface="Arial" panose="020B0604020202020204" pitchFamily="34" charset="0"/>
+              <a:buChar char="•"/>
+            </a:pPr>
+            <a:r>
+              <a:rPr lang="en-US" sz="3600" b="0" dirty="0"/>
+              <a:t>Including your current RPO/RTO (especially useful for asynchronous replicas) and last commits</a:t>
+            </a:r>
+          </a:p>
+          <a:p>
+            <a:r>
+              <a:rPr lang="en-US" sz="4000" dirty="0"/>
+              <a:t>Lab: </a:t>
+            </a:r>
+          </a:p>
+          <a:p>
+            <a:r>
+              <a:rPr lang="en-US" sz="4000" b="0" dirty="0"/>
+              <a:t>	</a:t>
+            </a:r>
+            <a:r>
+              <a:rPr lang="en-US" sz="3600" b="0" dirty="0"/>
+              <a:t>AG - </a:t>
+            </a:r>
+            <a:r>
+              <a:rPr lang="en-US" sz="3600" b="0" dirty="0" err="1"/>
+              <a:t>Monitor.sql</a:t>
+            </a:r>
+            <a:r>
+              <a:rPr lang="en-US" sz="3600" b="0" dirty="0"/>
+              <a:t> </a:t>
+            </a:r>
+          </a:p>
+          <a:p>
+            <a:pPr marL="0" indent="0"/>
+            <a:endParaRPr lang="en-US" sz="3600" b="0" dirty="0"/>
+          </a:p>
+        </p:txBody>
+      </p:sp>
+    </p:spTree>
+    <p:extLst>
+      <p:ext uri="{BB962C8B-B14F-4D97-AF65-F5344CB8AC3E}">
+        <p14:creationId xmlns:p14="http://schemas.microsoft.com/office/powerpoint/2010/main" val="870192496"/>
+      </p:ext>
+    </p:extLst>
+  </p:cSld>
+  <p:clrMapOvr>
+    <a:masterClrMapping/>
+  </p:clrMapOvr>
+</p:sld>
+</file>
+
+<file path=ppt/slides/slide81.xml><?xml version="1.0" encoding="utf-8"?>
+<p:sld xmlns:a="http://schemas.openxmlformats.org/drawingml/2006/main" xmlns:r="http://schemas.openxmlformats.org/officeDocument/2006/relationships" xmlns:p="http://schemas.openxmlformats.org/presentationml/2006/main">
+  <p:cSld>
+    <p:spTree>
+      <p:nvGrpSpPr>
+        <p:cNvPr id="1" name=""/>
+        <p:cNvGrpSpPr/>
+        <p:nvPr/>
+      </p:nvGrpSpPr>
+      <p:grpSpPr>
+        <a:xfrm>
+          <a:off x="0" y="0"/>
+          <a:ext cx="0" cy="0"/>
+          <a:chOff x="0" y="0"/>
+          <a:chExt cx="0" cy="0"/>
+        </a:xfrm>
+      </p:grpSpPr>
+      <p:sp>
+        <p:nvSpPr>
+          <p:cNvPr id="2" name="Title 1">
+            <a:extLst>
+              <a:ext uri="{FF2B5EF4-FFF2-40B4-BE49-F238E27FC236}">
+                <a16:creationId xmlns:a16="http://schemas.microsoft.com/office/drawing/2014/main" id="{A0C9B3E2-ECEF-40CF-81BA-8E84CCCA5AC3}"/>
+              </a:ext>
+            </a:extLst>
+          </p:cNvPr>
+          <p:cNvSpPr>
+            <a:spLocks noGrp="1"/>
+          </p:cNvSpPr>
+          <p:nvPr>
+            <p:ph type="title"/>
+          </p:nvPr>
+        </p:nvSpPr>
+        <p:spPr/>
+        <p:txBody>
+          <a:bodyPr/>
+          <a:lstStyle/>
+          <a:p>
+            <a:r>
+              <a:rPr lang="en-US" dirty="0" err="1"/>
+              <a:t>Sys.dm_db_page_info</a:t>
+            </a:r>
+            <a:endParaRPr lang="en-US" dirty="0"/>
+          </a:p>
+        </p:txBody>
+      </p:sp>
+      <p:sp>
+        <p:nvSpPr>
+          <p:cNvPr id="3" name="Content Placeholder 2">
+            <a:extLst>
+              <a:ext uri="{FF2B5EF4-FFF2-40B4-BE49-F238E27FC236}">
+                <a16:creationId xmlns:a16="http://schemas.microsoft.com/office/drawing/2014/main" id="{8E0160BC-4DE6-42EB-9F8A-A2601FB8BEBA}"/>
+              </a:ext>
+            </a:extLst>
+          </p:cNvPr>
+          <p:cNvSpPr>
+            <a:spLocks noGrp="1"/>
+          </p:cNvSpPr>
+          <p:nvPr>
+            <p:ph idx="1"/>
+          </p:nvPr>
+        </p:nvSpPr>
+        <p:spPr>
+          <a:xfrm>
+            <a:off x="609600" y="838201"/>
+            <a:ext cx="10972800" cy="5791199"/>
+          </a:xfrm>
+        </p:spPr>
+        <p:txBody>
+          <a:bodyPr>
+            <a:noAutofit/>
+          </a:bodyPr>
+          <a:lstStyle/>
+          <a:p>
+            <a:pPr>
+              <a:buFont typeface="Arial" panose="020B0604020202020204" pitchFamily="34" charset="0"/>
+              <a:buChar char="•"/>
+            </a:pPr>
+            <a:r>
+              <a:rPr lang="en-US" sz="3600" b="0" dirty="0"/>
+              <a:t>New in SQL 2019, replaces most of DBCC Page</a:t>
+            </a:r>
+          </a:p>
+          <a:p>
+            <a:pPr lvl="1">
+              <a:buFont typeface="Arial" panose="020B0604020202020204" pitchFamily="34" charset="0"/>
+              <a:buChar char="•"/>
+            </a:pPr>
+            <a:r>
+              <a:rPr lang="en-US" sz="3200" dirty="0"/>
+              <a:t>No need for trace flag 3604 to see data</a:t>
+            </a:r>
+          </a:p>
+          <a:p>
+            <a:pPr>
+              <a:buFont typeface="Arial" panose="020B0604020202020204" pitchFamily="34" charset="0"/>
+              <a:buChar char="•"/>
+            </a:pPr>
+            <a:r>
+              <a:rPr lang="en-US" sz="3600" b="0" dirty="0"/>
+              <a:t>DMF – can be joined to other DMO’s</a:t>
+            </a:r>
+          </a:p>
+          <a:p>
+            <a:pPr>
+              <a:buFont typeface="Arial" panose="020B0604020202020204" pitchFamily="34" charset="0"/>
+              <a:buChar char="•"/>
+            </a:pPr>
+            <a:r>
+              <a:rPr lang="en-US" sz="3600" b="0" dirty="0"/>
+              <a:t>Also new in SQL 2019, </a:t>
+            </a:r>
+            <a:r>
+              <a:rPr lang="en-US" sz="3600" dirty="0" err="1"/>
+              <a:t>sys.fn_PageResCracker</a:t>
+            </a:r>
+            <a:r>
+              <a:rPr lang="en-US" sz="3600" dirty="0"/>
+              <a:t>,</a:t>
+            </a:r>
+            <a:r>
+              <a:rPr lang="en-US" sz="3600" b="0" dirty="0"/>
+              <a:t> which accepts a hexadecimal from </a:t>
+            </a:r>
+            <a:r>
+              <a:rPr lang="en-US" sz="3600" dirty="0" err="1"/>
+              <a:t>sys.dm_exec_requests.page_resource</a:t>
+            </a:r>
+            <a:r>
+              <a:rPr lang="en-US" sz="3600" dirty="0"/>
+              <a:t> </a:t>
+            </a:r>
+            <a:r>
+              <a:rPr lang="en-US" sz="3600" b="0" dirty="0"/>
+              <a:t>if the </a:t>
+            </a:r>
+            <a:r>
+              <a:rPr lang="en-US" sz="3600" b="0" dirty="0" err="1"/>
+              <a:t>wait_resource</a:t>
+            </a:r>
+            <a:r>
+              <a:rPr lang="en-US" sz="3600" b="0" dirty="0"/>
+              <a:t> type is PAGE, to help you investigate.</a:t>
+            </a:r>
+          </a:p>
+          <a:p>
+            <a:pPr lvl="1">
+              <a:buFont typeface="Arial" panose="020B0604020202020204" pitchFamily="34" charset="0"/>
+              <a:buChar char="•"/>
+            </a:pPr>
+            <a:r>
+              <a:rPr lang="en-US" sz="3600" dirty="0"/>
+              <a:t>So, it’s limited. Doesn’t return info for other </a:t>
+            </a:r>
+            <a:r>
+              <a:rPr lang="en-US" sz="3600" dirty="0" err="1"/>
+              <a:t>wait_resources</a:t>
+            </a:r>
+            <a:r>
+              <a:rPr lang="en-US" sz="3600" dirty="0"/>
+              <a:t> like KEY.</a:t>
+            </a:r>
+          </a:p>
+        </p:txBody>
+      </p:sp>
+    </p:spTree>
+    <p:extLst>
+      <p:ext uri="{BB962C8B-B14F-4D97-AF65-F5344CB8AC3E}">
+        <p14:creationId xmlns:p14="http://schemas.microsoft.com/office/powerpoint/2010/main" val="761558038"/>
+      </p:ext>
+    </p:extLst>
+  </p:cSld>
+  <p:clrMapOvr>
+    <a:masterClrMapping/>
+  </p:clrMapOvr>
+</p:sld>
+</file>
+
+<file path=ppt/slides/slide82.xml><?xml version="1.0" encoding="utf-8"?>
+<p:sld xmlns:a="http://schemas.openxmlformats.org/drawingml/2006/main" xmlns:r="http://schemas.openxmlformats.org/officeDocument/2006/relationships" xmlns:p="http://schemas.openxmlformats.org/presentationml/2006/main">
+  <p:cSld>
+    <p:spTree>
+      <p:nvGrpSpPr>
+        <p:cNvPr id="1" name=""/>
+        <p:cNvGrpSpPr/>
+        <p:nvPr/>
+      </p:nvGrpSpPr>
+      <p:grpSpPr>
+        <a:xfrm>
+          <a:off x="0" y="0"/>
+          <a:ext cx="0" cy="0"/>
+          <a:chOff x="0" y="0"/>
+          <a:chExt cx="0" cy="0"/>
+        </a:xfrm>
+      </p:grpSpPr>
+      <p:sp>
+        <p:nvSpPr>
           <p:cNvPr id="3" name="Content Placeholder 2"/>
           <p:cNvSpPr>
             <a:spLocks noGrp="1"/>
@@ -31952,7 +32409,7 @@
             <a:fld id="{B33938D9-6682-4BB5-AE7E-A07F086A6D58}" type="slidenum">
               <a:rPr lang="en-US" smtClean="0"/>
               <a:pPr/>
-              <a:t>80</a:t>
+              <a:t>82</a:t>
             </a:fld>
             <a:endParaRPr lang="en-US"/>
           </a:p>
@@ -31966,7 +32423,7 @@
 </p:sld>
 </file>
 
-<file path=ppt/slides/slide81.xml><?xml version="1.0" encoding="utf-8"?>
+<file path=ppt/slides/slide83.xml><?xml version="1.0" encoding="utf-8"?>
 <p:sld xmlns:a="http://schemas.openxmlformats.org/drawingml/2006/main" xmlns:r="http://schemas.openxmlformats.org/officeDocument/2006/relationships" xmlns:p="http://schemas.openxmlformats.org/presentationml/2006/main" show="0">
   <p:cSld>
     <p:spTree>
@@ -32009,7 +32466,7 @@
                   <a:srgbClr val="82BC00"/>
                 </a:solidFill>
               </a:rPr>
-              <a:t>81</a:t>
+              <a:t>83</a:t>
             </a:fld>
             <a:endParaRPr lang="en-US">
               <a:solidFill>
@@ -32583,7 +33040,7 @@
 </p:sld>
 </file>
 
-<file path=ppt/slides/slide82.xml><?xml version="1.0" encoding="utf-8"?>
+<file path=ppt/slides/slide84.xml><?xml version="1.0" encoding="utf-8"?>
 <p:sld xmlns:a="http://schemas.openxmlformats.org/drawingml/2006/main" xmlns:r="http://schemas.openxmlformats.org/officeDocument/2006/relationships" xmlns:p="http://schemas.openxmlformats.org/presentationml/2006/main" show="0">
   <p:cSld>
     <p:spTree>
@@ -32727,7 +33184,7 @@
                   <a:srgbClr val="82BC00"/>
                 </a:solidFill>
               </a:rPr>
-              <a:t>82</a:t>
+              <a:t>84</a:t>
             </a:fld>
             <a:endParaRPr lang="en-US">
               <a:solidFill>
@@ -33238,7 +33695,7 @@
 </p:sld>
 </file>
 
-<file path=ppt/slides/slide83.xml><?xml version="1.0" encoding="utf-8"?>
+<file path=ppt/slides/slide85.xml><?xml version="1.0" encoding="utf-8"?>
 <p:sld xmlns:a="http://schemas.openxmlformats.org/drawingml/2006/main" xmlns:r="http://schemas.openxmlformats.org/officeDocument/2006/relationships" xmlns:p="http://schemas.openxmlformats.org/presentationml/2006/main" show="0">
   <p:cSld>
     <p:spTree>
@@ -33382,7 +33839,7 @@
                   <a:srgbClr val="82BC00"/>
                 </a:solidFill>
               </a:rPr>
-              <a:t>83</a:t>
+              <a:t>85</a:t>
             </a:fld>
             <a:endParaRPr lang="en-US">
               <a:solidFill>
@@ -33924,7 +34381,7 @@
 </p:sld>
 </file>
 
-<file path=ppt/slides/slide84.xml><?xml version="1.0" encoding="utf-8"?>
+<file path=ppt/slides/slide86.xml><?xml version="1.0" encoding="utf-8"?>
 <p:sld xmlns:a="http://schemas.openxmlformats.org/drawingml/2006/main" xmlns:r="http://schemas.openxmlformats.org/officeDocument/2006/relationships" xmlns:p="http://schemas.openxmlformats.org/presentationml/2006/main" show="0">
   <p:cSld>
     <p:spTree>
@@ -33967,7 +34424,7 @@
                   <a:srgbClr val="82BC00"/>
                 </a:solidFill>
               </a:rPr>
-              <a:t>84</a:t>
+              <a:t>86</a:t>
             </a:fld>
             <a:endParaRPr lang="en-US">
               <a:solidFill>
@@ -34220,7 +34677,7 @@
 </p:sld>
 </file>
 
-<file path=ppt/slides/slide85.xml><?xml version="1.0" encoding="utf-8"?>
+<file path=ppt/slides/slide87.xml><?xml version="1.0" encoding="utf-8"?>
 <p:sld xmlns:a="http://schemas.openxmlformats.org/drawingml/2006/main" xmlns:r="http://schemas.openxmlformats.org/officeDocument/2006/relationships" xmlns:p="http://schemas.openxmlformats.org/presentationml/2006/main" show="0">
   <p:cSld>
     <p:spTree>
@@ -34263,7 +34720,7 @@
                   <a:srgbClr val="82BC00"/>
                 </a:solidFill>
               </a:rPr>
-              <a:t>85</a:t>
+              <a:t>87</a:t>
             </a:fld>
             <a:endParaRPr lang="en-US">
               <a:solidFill>
@@ -34409,7 +34866,7 @@
 </p:sld>
 </file>
 
-<file path=ppt/slides/slide86.xml><?xml version="1.0" encoding="utf-8"?>
+<file path=ppt/slides/slide88.xml><?xml version="1.0" encoding="utf-8"?>
 <p:sld xmlns:a="http://schemas.openxmlformats.org/drawingml/2006/main" xmlns:r="http://schemas.openxmlformats.org/officeDocument/2006/relationships" xmlns:p="http://schemas.openxmlformats.org/presentationml/2006/main">
   <p:cSld>
     <p:bg>
@@ -34814,7 +35271,7 @@
 </p:sld>
 </file>
 
-<file path=ppt/slides/slide87.xml><?xml version="1.0" encoding="utf-8"?>
+<file path=ppt/slides/slide89.xml><?xml version="1.0" encoding="utf-8"?>
 <p:sld xmlns:a="http://schemas.openxmlformats.org/drawingml/2006/main" xmlns:r="http://schemas.openxmlformats.org/officeDocument/2006/relationships" xmlns:p="http://schemas.openxmlformats.org/presentationml/2006/main">
   <p:cSld>
     <p:spTree>
@@ -34849,7 +35306,7 @@
         </p:spPr>
         <p:txBody>
           <a:bodyPr>
-            <a:normAutofit fontScale="92500"/>
+            <a:normAutofit/>
           </a:bodyPr>
           <a:lstStyle/>
           <a:p>
@@ -34857,15 +35314,24 @@
               <a:buNone/>
             </a:pPr>
             <a:r>
-              <a:rPr lang="en-US" sz="4000" dirty="0"/>
+              <a:rPr lang="en-US" sz="4000" dirty="0">
+                <a:latin typeface="Roboto" panose="02000000000000000000" pitchFamily="2" charset="0"/>
+                <a:ea typeface="Roboto" panose="02000000000000000000" pitchFamily="2" charset="0"/>
+              </a:rPr>
               <a:t>This presentation, including all source code, available at this </a:t>
             </a:r>
             <a:r>
-              <a:rPr lang="en-US" sz="4000" dirty="0" err="1"/>
+              <a:rPr lang="en-US" sz="4000" dirty="0" err="1">
+                <a:latin typeface="Roboto" panose="02000000000000000000" pitchFamily="2" charset="0"/>
+                <a:ea typeface="Roboto" panose="02000000000000000000" pitchFamily="2" charset="0"/>
+              </a:rPr>
               <a:t>SQLSaturday’s</a:t>
             </a:r>
             <a:r>
-              <a:rPr lang="en-US" sz="4000" dirty="0"/>
+              <a:rPr lang="en-US" sz="4000" dirty="0">
+                <a:latin typeface="Roboto" panose="02000000000000000000" pitchFamily="2" charset="0"/>
+                <a:ea typeface="Roboto" panose="02000000000000000000" pitchFamily="2" charset="0"/>
+              </a:rPr>
               <a:t> schedule page and at my blog:</a:t>
             </a:r>
           </a:p>
@@ -34875,17 +35341,28 @@
             </a:pPr>
             <a:r>
               <a:rPr lang="en-US" sz="6000" b="1" dirty="0">
+                <a:latin typeface="Roboto" panose="02000000000000000000" pitchFamily="2" charset="0"/>
+                <a:ea typeface="Roboto" panose="02000000000000000000" pitchFamily="2" charset="0"/>
                 <a:hlinkClick r:id="rId2"/>
               </a:rPr>
               <a:t>SQLTact.com</a:t>
             </a:r>
-            <a:endParaRPr lang="en-US" sz="6000" b="1" dirty="0"/>
-          </a:p>
-          <a:p>
-            <a:endParaRPr lang="en-US" sz="4800" dirty="0"/>
-          </a:p>
-          <a:p>
-            <a:endParaRPr lang="en-US" sz="4800" dirty="0"/>
+            <a:endParaRPr lang="en-US" sz="6000" b="1" dirty="0">
+              <a:latin typeface="Roboto" panose="02000000000000000000" pitchFamily="2" charset="0"/>
+              <a:ea typeface="Roboto" panose="02000000000000000000" pitchFamily="2" charset="0"/>
+            </a:endParaRPr>
+          </a:p>
+          <a:p>
+            <a:endParaRPr lang="en-US" sz="4800" dirty="0">
+              <a:latin typeface="Roboto" panose="02000000000000000000" pitchFamily="2" charset="0"/>
+              <a:ea typeface="Roboto" panose="02000000000000000000" pitchFamily="2" charset="0"/>
+            </a:endParaRPr>
+          </a:p>
+          <a:p>
+            <a:endParaRPr lang="en-US" sz="4800" dirty="0">
+              <a:latin typeface="Roboto" panose="02000000000000000000" pitchFamily="2" charset="0"/>
+              <a:ea typeface="Roboto" panose="02000000000000000000" pitchFamily="2" charset="0"/>
+            </a:endParaRPr>
           </a:p>
         </p:txBody>
       </p:sp>
@@ -34900,7 +35377,7 @@
         <p:spPr>
           <a:xfrm>
             <a:off x="692459" y="877224"/>
-            <a:ext cx="9061142" cy="2995390"/>
+            <a:ext cx="9061142" cy="3237576"/>
           </a:xfrm>
           <a:prstGeom prst="rect">
             <a:avLst/>
@@ -35066,7 +35543,7 @@
               <a:defRPr/>
             </a:pPr>
             <a:r>
-              <a:rPr kumimoji="0" lang="en-US" sz="3300" b="0" i="0" u="none" strike="noStrike" kern="1200" cap="none" spc="0" normalizeH="0" baseline="0" noProof="0" dirty="0">
+              <a:rPr kumimoji="0" lang="en-US" sz="3800" b="0" i="0" u="none" strike="noStrike" kern="1200" cap="none" spc="0" normalizeH="0" baseline="0" noProof="0" dirty="0">
                 <a:ln>
                   <a:noFill/>
                 </a:ln>
@@ -35076,9 +35553,8 @@
                 <a:effectLst/>
                 <a:uLnTx/>
                 <a:uFillTx/>
-                <a:latin typeface="Segoe UI"/>
-                <a:ea typeface="+mn-ea"/>
-                <a:cs typeface="+mn-cs"/>
+                <a:latin typeface="Roboto" panose="02000000000000000000" pitchFamily="2" charset="0"/>
+                <a:ea typeface="Roboto" panose="02000000000000000000" pitchFamily="2" charset="0"/>
               </a:rPr>
               <a:t>William D Assaf, MCSE</a:t>
             </a:r>
@@ -35102,7 +35578,7 @@
               <a:defRPr/>
             </a:pPr>
             <a:r>
-              <a:rPr kumimoji="0" lang="en-US" sz="3300" b="0" i="0" u="none" strike="noStrike" kern="1200" cap="none" spc="0" normalizeH="0" baseline="0" noProof="0" dirty="0">
+              <a:rPr kumimoji="0" lang="en-US" sz="3800" b="0" i="0" u="none" strike="noStrike" kern="1200" cap="none" spc="0" normalizeH="0" baseline="0" noProof="0" dirty="0">
                 <a:ln>
                   <a:noFill/>
                 </a:ln>
@@ -35112,14 +35588,13 @@
                 <a:effectLst/>
                 <a:uLnTx/>
                 <a:uFillTx/>
-                <a:latin typeface="Segoe UI"/>
-                <a:ea typeface="+mn-ea"/>
-                <a:cs typeface="+mn-cs"/>
+                <a:latin typeface="Roboto" panose="02000000000000000000" pitchFamily="2" charset="0"/>
+                <a:ea typeface="Roboto" panose="02000000000000000000" pitchFamily="2" charset="0"/>
               </a:rPr>
-              <a:t>Baton Rouge SQL Server UG board and </a:t>
-            </a:r>
-            <a:r>
-              <a:rPr kumimoji="0" lang="en-US" sz="3300" b="0" i="0" u="none" strike="noStrike" kern="1200" cap="none" spc="0" normalizeH="0" baseline="0" noProof="0" dirty="0" err="1">
+              <a:t>Baton Rouge SQL UG board, </a:t>
+            </a:r>
+            <a:r>
+              <a:rPr kumimoji="0" lang="en-US" sz="3800" b="0" i="0" u="none" strike="noStrike" kern="1200" cap="none" spc="0" normalizeH="0" baseline="0" noProof="0" dirty="0" err="1">
                 <a:ln>
                   <a:noFill/>
                 </a:ln>
@@ -35129,14 +35604,13 @@
                 <a:effectLst/>
                 <a:uLnTx/>
                 <a:uFillTx/>
-                <a:latin typeface="Segoe UI"/>
-                <a:ea typeface="+mn-ea"/>
-                <a:cs typeface="+mn-cs"/>
+                <a:latin typeface="Roboto" panose="02000000000000000000" pitchFamily="2" charset="0"/>
+                <a:ea typeface="Roboto" panose="02000000000000000000" pitchFamily="2" charset="0"/>
               </a:rPr>
               <a:t>SQLSat</a:t>
             </a:r>
             <a:r>
-              <a:rPr kumimoji="0" lang="en-US" sz="3300" b="0" i="0" u="none" strike="noStrike" kern="1200" cap="none" spc="0" normalizeH="0" baseline="0" noProof="0" dirty="0">
+              <a:rPr kumimoji="0" lang="en-US" sz="3800" b="0" i="0" u="none" strike="noStrike" kern="1200" cap="none" spc="0" normalizeH="0" baseline="0" noProof="0" dirty="0">
                 <a:ln>
                   <a:noFill/>
                 </a:ln>
@@ -35146,9 +35620,8 @@
                 <a:effectLst/>
                 <a:uLnTx/>
                 <a:uFillTx/>
-                <a:latin typeface="Segoe UI"/>
-                <a:ea typeface="+mn-ea"/>
-                <a:cs typeface="+mn-cs"/>
+                <a:latin typeface="Roboto" panose="02000000000000000000" pitchFamily="2" charset="0"/>
+                <a:ea typeface="Roboto" panose="02000000000000000000" pitchFamily="2" charset="0"/>
               </a:rPr>
               <a:t> organizer</a:t>
             </a:r>
@@ -35172,15 +35645,16 @@
               <a:defRPr/>
             </a:pPr>
             <a:r>
-              <a:rPr lang="en-US" sz="3300" dirty="0">
+              <a:rPr lang="en-US" sz="3800" dirty="0">
                 <a:solidFill>
                   <a:srgbClr val="101820"/>
                 </a:solidFill>
-                <a:latin typeface="Segoe UI"/>
+                <a:latin typeface="Roboto" panose="02000000000000000000" pitchFamily="2" charset="0"/>
+                <a:ea typeface="Roboto" panose="02000000000000000000" pitchFamily="2" charset="0"/>
               </a:rPr>
               <a:t>PASS Regional Mentor</a:t>
             </a:r>
-            <a:endParaRPr kumimoji="0" lang="en-US" sz="3300" b="0" i="0" u="none" strike="noStrike" kern="1200" cap="none" spc="0" normalizeH="0" baseline="0" noProof="0" dirty="0">
+            <a:endParaRPr kumimoji="0" lang="en-US" sz="3800" b="0" i="0" u="none" strike="noStrike" kern="1200" cap="none" spc="0" normalizeH="0" baseline="0" noProof="0" dirty="0">
               <a:ln>
                 <a:noFill/>
               </a:ln>
@@ -35190,9 +35664,8 @@
               <a:effectLst/>
               <a:uLnTx/>
               <a:uFillTx/>
-              <a:latin typeface="Segoe UI"/>
-              <a:ea typeface="+mn-ea"/>
-              <a:cs typeface="+mn-cs"/>
+              <a:latin typeface="Roboto" panose="02000000000000000000" pitchFamily="2" charset="0"/>
+              <a:ea typeface="Roboto" panose="02000000000000000000" pitchFamily="2" charset="0"/>
             </a:endParaRPr>
           </a:p>
           <a:p>
@@ -35214,7 +35687,7 @@
               <a:defRPr/>
             </a:pPr>
             <a:r>
-              <a:rPr kumimoji="0" lang="en-US" sz="3300" b="0" i="0" u="none" strike="noStrike" kern="1200" cap="none" spc="0" normalizeH="0" baseline="0" noProof="0" dirty="0">
+              <a:rPr kumimoji="0" lang="en-US" sz="3800" b="0" i="0" u="none" strike="noStrike" kern="1200" cap="none" spc="0" normalizeH="0" baseline="0" noProof="0" dirty="0">
                 <a:ln>
                   <a:noFill/>
                 </a:ln>
@@ -35224,11 +35697,10 @@
                 <a:effectLst/>
                 <a:uLnTx/>
                 <a:uFillTx/>
-                <a:latin typeface="Segoe UI"/>
-                <a:ea typeface="+mn-ea"/>
-                <a:cs typeface="+mn-cs"/>
+                <a:latin typeface="Roboto" panose="02000000000000000000" pitchFamily="2" charset="0"/>
+                <a:ea typeface="Roboto" panose="02000000000000000000" pitchFamily="2" charset="0"/>
               </a:rPr>
-              <a:t>Principal Consultant, Manager at Sparkhound Inc.  </a:t>
+              <a:t>Principal Consultant, Manager at Sparkhound</a:t>
             </a:r>
           </a:p>
           <a:p>
@@ -35250,7 +35722,7 @@
               <a:defRPr/>
             </a:pPr>
             <a:r>
-              <a:rPr kumimoji="0" lang="en-US" sz="3300" b="0" i="0" u="none" strike="noStrike" kern="1200" cap="none" spc="0" normalizeH="0" baseline="0" noProof="0" dirty="0">
+              <a:rPr kumimoji="0" lang="en-US" sz="3800" b="0" i="0" u="none" strike="noStrike" kern="1200" cap="none" spc="0" normalizeH="0" baseline="0" noProof="0" dirty="0">
                 <a:ln>
                   <a:noFill/>
                 </a:ln>
@@ -35260,14 +35732,13 @@
                 <a:effectLst/>
                 <a:uLnTx/>
                 <a:uFillTx/>
-                <a:latin typeface="Segoe UI"/>
-                <a:ea typeface="+mn-ea"/>
-                <a:cs typeface="+mn-cs"/>
+                <a:latin typeface="Roboto" panose="02000000000000000000" pitchFamily="2" charset="0"/>
+                <a:ea typeface="Roboto" panose="02000000000000000000" pitchFamily="2" charset="0"/>
               </a:rPr>
-              <a:t>Twitter: @</a:t>
-            </a:r>
-            <a:r>
-              <a:rPr kumimoji="0" lang="en-US" sz="3300" b="0" i="0" u="none" strike="noStrike" kern="1200" cap="none" spc="0" normalizeH="0" baseline="0" noProof="0" dirty="0" err="1">
+              <a:t>Twitter: </a:t>
+            </a:r>
+            <a:r>
+              <a:rPr kumimoji="0" lang="en-US" sz="3800" b="1" i="0" u="none" strike="noStrike" kern="1200" cap="none" spc="0" normalizeH="0" baseline="0" noProof="0" dirty="0">
                 <a:ln>
                   <a:noFill/>
                 </a:ln>
@@ -35277,13 +35748,28 @@
                 <a:effectLst/>
                 <a:uLnTx/>
                 <a:uFillTx/>
-                <a:latin typeface="Segoe UI"/>
-                <a:ea typeface="+mn-ea"/>
-                <a:cs typeface="+mn-cs"/>
+                <a:latin typeface="Roboto" panose="02000000000000000000" pitchFamily="2" charset="0"/>
+                <a:ea typeface="Roboto" panose="02000000000000000000" pitchFamily="2" charset="0"/>
+              </a:rPr>
+              <a:t>@</a:t>
+            </a:r>
+            <a:r>
+              <a:rPr kumimoji="0" lang="en-US" sz="3800" b="1" i="0" u="none" strike="noStrike" kern="1200" cap="none" spc="0" normalizeH="0" baseline="0" noProof="0" dirty="0" err="1">
+                <a:ln>
+                  <a:noFill/>
+                </a:ln>
+                <a:solidFill>
+                  <a:srgbClr val="101820"/>
+                </a:solidFill>
+                <a:effectLst/>
+                <a:uLnTx/>
+                <a:uFillTx/>
+                <a:latin typeface="Roboto" panose="02000000000000000000" pitchFamily="2" charset="0"/>
+                <a:ea typeface="Roboto" panose="02000000000000000000" pitchFamily="2" charset="0"/>
               </a:rPr>
               <a:t>william_a_dba</a:t>
             </a:r>
-            <a:endParaRPr kumimoji="0" lang="en-US" sz="3300" b="0" i="0" u="none" strike="noStrike" kern="1200" cap="none" spc="0" normalizeH="0" baseline="0" noProof="0" dirty="0">
+            <a:endParaRPr kumimoji="0" lang="en-US" sz="3800" b="1" i="0" u="none" strike="noStrike" kern="1200" cap="none" spc="0" normalizeH="0" baseline="0" noProof="0" dirty="0">
               <a:ln>
                 <a:noFill/>
               </a:ln>
@@ -35293,9 +35779,8 @@
               <a:effectLst/>
               <a:uLnTx/>
               <a:uFillTx/>
-              <a:latin typeface="Segoe UI"/>
-              <a:ea typeface="+mn-ea"/>
-              <a:cs typeface="+mn-cs"/>
+              <a:latin typeface="Roboto" panose="02000000000000000000" pitchFamily="2" charset="0"/>
+              <a:ea typeface="Roboto" panose="02000000000000000000" pitchFamily="2" charset="0"/>
             </a:endParaRPr>
           </a:p>
           <a:p>
@@ -35326,9 +35811,8 @@
               <a:effectLst/>
               <a:uLnTx/>
               <a:uFillTx/>
-              <a:latin typeface="Segoe UI"/>
-              <a:ea typeface="+mn-ea"/>
-              <a:cs typeface="+mn-cs"/>
+              <a:latin typeface="Roboto" panose="02000000000000000000" pitchFamily="2" charset="0"/>
+              <a:ea typeface="Roboto" panose="02000000000000000000" pitchFamily="2" charset="0"/>
             </a:endParaRPr>
           </a:p>
           <a:p>
@@ -35359,9 +35843,8 @@
               <a:effectLst/>
               <a:uLnTx/>
               <a:uFillTx/>
-              <a:latin typeface="Segoe UI"/>
-              <a:ea typeface="+mn-ea"/>
-              <a:cs typeface="+mn-cs"/>
+              <a:latin typeface="Roboto" panose="02000000000000000000" pitchFamily="2" charset="0"/>
+              <a:ea typeface="Roboto" panose="02000000000000000000" pitchFamily="2" charset="0"/>
             </a:endParaRPr>
           </a:p>
         </p:txBody>
@@ -35553,9 +36036,8 @@
                 <a:effectLst/>
                 <a:uLnTx/>
                 <a:uFillTx/>
-                <a:latin typeface="Segoe UI"/>
-                <a:ea typeface="+mn-ea"/>
-                <a:cs typeface="+mn-cs"/>
+                <a:latin typeface="Roboto" panose="02000000000000000000" pitchFamily="2" charset="0"/>
+                <a:ea typeface="Roboto" panose="02000000000000000000" pitchFamily="2" charset="0"/>
               </a:rPr>
               <a:t>Bio and contact</a:t>
             </a:r>

</xml_diff>